<commit_message>
some refactor and date serialize
</commit_message>
<xml_diff>
--- a/Spring MVC.pptx
+++ b/Spring MVC.pptx
@@ -5,7 +5,7 @@
     <p:sldMasterId id="2147483648" r:id="rId1"/>
   </p:sldMasterIdLst>
   <p:notesMasterIdLst>
-    <p:notesMasterId r:id="rId19"/>
+    <p:notesMasterId r:id="rId21"/>
   </p:notesMasterIdLst>
   <p:sldIdLst>
     <p:sldId id="319" r:id="rId2"/>
@@ -20,11 +20,13 @@
     <p:sldId id="387" r:id="rId11"/>
     <p:sldId id="395" r:id="rId12"/>
     <p:sldId id="396" r:id="rId13"/>
-    <p:sldId id="400" r:id="rId14"/>
-    <p:sldId id="398" r:id="rId15"/>
-    <p:sldId id="399" r:id="rId16"/>
-    <p:sldId id="401" r:id="rId17"/>
-    <p:sldId id="386" r:id="rId18"/>
+    <p:sldId id="403" r:id="rId14"/>
+    <p:sldId id="400" r:id="rId15"/>
+    <p:sldId id="398" r:id="rId16"/>
+    <p:sldId id="399" r:id="rId17"/>
+    <p:sldId id="401" r:id="rId18"/>
+    <p:sldId id="402" r:id="rId19"/>
+    <p:sldId id="386" r:id="rId20"/>
   </p:sldIdLst>
   <p:sldSz cx="9144000" cy="6858000" type="screen4x3"/>
   <p:notesSz cx="6858000" cy="9144000"/>
@@ -140,10 +142,12 @@
             <p14:sldId id="387"/>
             <p14:sldId id="395"/>
             <p14:sldId id="396"/>
+            <p14:sldId id="403"/>
             <p14:sldId id="400"/>
             <p14:sldId id="398"/>
             <p14:sldId id="399"/>
             <p14:sldId id="401"/>
+            <p14:sldId id="402"/>
             <p14:sldId id="386"/>
           </p14:sldIdLst>
         </p14:section>
@@ -252,7 +256,7 @@
           <a:p>
             <a:fld id="{18DA1CCD-4AB1-40EE-B21B-789687229DC3}" type="datetimeFigureOut">
               <a:rPr lang="pl-PL" smtClean="0"/>
-              <a:t>2017-04-05</a:t>
+              <a:t>2017-04-11</a:t>
             </a:fld>
             <a:endParaRPr lang="pl-PL"/>
           </a:p>
@@ -4695,330 +4699,144 @@
           <a:p>
             <a:r>
               <a:rPr lang="pl-PL" dirty="0" smtClean="0"/>
-              <a:t>REST </a:t>
-            </a:r>
+              <a:t>Uruchomienie Aplikacji</a:t>
+            </a:r>
+            <a:endParaRPr lang="pl-PL" dirty="0"/>
+          </a:p>
+        </p:txBody>
+      </p:sp>
+      <p:sp>
+        <p:nvSpPr>
+          <p:cNvPr id="3" name="pole tekstowe 2"/>
+          <p:cNvSpPr txBox="1"/>
+          <p:nvPr/>
+        </p:nvSpPr>
+        <p:spPr>
+          <a:xfrm>
+            <a:off x="465826" y="1043796"/>
+            <a:ext cx="8212347" cy="1477328"/>
+          </a:xfrm>
+          <a:prstGeom prst="rect">
+            <a:avLst/>
+          </a:prstGeom>
+          <a:noFill/>
+        </p:spPr>
+        <p:txBody>
+          <a:bodyPr wrap="square" rtlCol="0">
+            <a:spAutoFit/>
+          </a:bodyPr>
+          <a:lstStyle/>
+          <a:p>
+            <a:r>
+              <a:rPr lang="pl-PL" dirty="0" smtClean="0"/>
+              <a:t>Uruchomienie Aplikacji : </a:t>
+            </a:r>
+          </a:p>
+          <a:p>
+            <a:pPr marL="285750" indent="-285750">
+              <a:buFont typeface="Arial" panose="020B0604020202020204" pitchFamily="34" charset="0"/>
+              <a:buChar char="•"/>
+            </a:pPr>
             <a:r>
               <a:rPr lang="pl-PL" dirty="0" err="1" smtClean="0"/>
-              <a:t>Template</a:t>
+              <a:t>mvnw</a:t>
+            </a:r>
+            <a:r>
+              <a:rPr lang="pl-PL" dirty="0" smtClean="0"/>
+              <a:t> </a:t>
+            </a:r>
+            <a:r>
+              <a:rPr lang="pl-PL" dirty="0" err="1" smtClean="0"/>
+              <a:t>spring-boot:run</a:t>
+            </a:r>
+            <a:endParaRPr lang="pl-PL" dirty="0" smtClean="0"/>
+          </a:p>
+          <a:p>
+            <a:r>
+              <a:rPr lang="pl-PL" dirty="0" err="1" smtClean="0"/>
+              <a:t>Debug</a:t>
+            </a:r>
+            <a:r>
+              <a:rPr lang="pl-PL" dirty="0" smtClean="0"/>
+              <a:t>: </a:t>
+            </a:r>
+          </a:p>
+          <a:p>
+            <a:pPr marL="285750" indent="-285750">
+              <a:buFont typeface="Arial" panose="020B0604020202020204" pitchFamily="34" charset="0"/>
+              <a:buChar char="•"/>
+            </a:pPr>
+            <a:r>
+              <a:rPr lang="pl-PL" dirty="0" err="1"/>
+              <a:t>mvn</a:t>
+            </a:r>
+            <a:r>
+              <a:rPr lang="pl-PL" dirty="0"/>
+              <a:t> </a:t>
+            </a:r>
+            <a:r>
+              <a:rPr lang="pl-PL" dirty="0" err="1"/>
+              <a:t>spring-boot:run</a:t>
+            </a:r>
+            <a:r>
+              <a:rPr lang="pl-PL" dirty="0"/>
+              <a:t> -</a:t>
+            </a:r>
+            <a:r>
+              <a:rPr lang="pl-PL" dirty="0" err="1"/>
+              <a:t>Drun.jvmArguments</a:t>
+            </a:r>
+            <a:r>
+              <a:rPr lang="pl-PL" dirty="0"/>
+              <a:t>="-</a:t>
+            </a:r>
+            <a:r>
+              <a:rPr lang="pl-PL" dirty="0" err="1"/>
+              <a:t>Xdebug</a:t>
+            </a:r>
+            <a:r>
+              <a:rPr lang="pl-PL" dirty="0"/>
+              <a:t> -</a:t>
+            </a:r>
+            <a:r>
+              <a:rPr lang="pl-PL" dirty="0" err="1"/>
+              <a:t>Xrunjdwp:transport</a:t>
+            </a:r>
+            <a:r>
+              <a:rPr lang="pl-PL" dirty="0"/>
+              <a:t>=</a:t>
+            </a:r>
+            <a:r>
+              <a:rPr lang="pl-PL" dirty="0" err="1"/>
+              <a:t>dt_socket,server</a:t>
+            </a:r>
+            <a:r>
+              <a:rPr lang="pl-PL" dirty="0"/>
+              <a:t>=</a:t>
+            </a:r>
+            <a:r>
+              <a:rPr lang="pl-PL" dirty="0" err="1"/>
+              <a:t>y,suspend</a:t>
+            </a:r>
+            <a:r>
+              <a:rPr lang="pl-PL" dirty="0"/>
+              <a:t>=</a:t>
+            </a:r>
+            <a:r>
+              <a:rPr lang="pl-PL" dirty="0" err="1"/>
+              <a:t>y,address</a:t>
+            </a:r>
+            <a:r>
+              <a:rPr lang="pl-PL" dirty="0"/>
+              <a:t>=5005"</a:t>
             </a:r>
             <a:endParaRPr lang="pl-PL" dirty="0"/>
-          </a:p>
-        </p:txBody>
-      </p:sp>
-      <p:sp>
-        <p:nvSpPr>
-          <p:cNvPr id="8" name="Symbol zastępczy tekstu 2"/>
-          <p:cNvSpPr txBox="1">
-            <a:spLocks/>
-          </p:cNvSpPr>
-          <p:nvPr/>
-        </p:nvSpPr>
-        <p:spPr>
-          <a:xfrm>
-            <a:off x="0" y="1228158"/>
-            <a:ext cx="9144000" cy="4846148"/>
-          </a:xfrm>
-          <a:prstGeom prst="rect">
-            <a:avLst/>
-          </a:prstGeom>
-        </p:spPr>
-        <p:txBody>
-          <a:bodyPr>
-            <a:normAutofit/>
-          </a:bodyPr>
-          <a:lstStyle>
-            <a:lvl1pPr marL="342900" indent="-342900" algn="l" defTabSz="457200" rtl="0" eaLnBrk="1" latinLnBrk="0" hangingPunct="1">
-              <a:spcBef>
-                <a:spcPct val="20000"/>
-              </a:spcBef>
-              <a:buFont typeface="Arial"/>
-              <a:buChar char="•"/>
-              <a:defRPr sz="3200" kern="1200">
-                <a:solidFill>
-                  <a:schemeClr val="tx1"/>
-                </a:solidFill>
-                <a:latin typeface="+mn-lt"/>
-                <a:ea typeface="+mn-ea"/>
-                <a:cs typeface="+mn-cs"/>
-              </a:defRPr>
-            </a:lvl1pPr>
-            <a:lvl2pPr marL="742950" indent="-285750" algn="l" defTabSz="457200" rtl="0" eaLnBrk="1" latinLnBrk="0" hangingPunct="1">
-              <a:spcBef>
-                <a:spcPct val="20000"/>
-              </a:spcBef>
-              <a:buFont typeface="Arial"/>
-              <a:buChar char="–"/>
-              <a:defRPr sz="2800" kern="1200">
-                <a:solidFill>
-                  <a:schemeClr val="tx1"/>
-                </a:solidFill>
-                <a:latin typeface="+mn-lt"/>
-                <a:ea typeface="+mn-ea"/>
-                <a:cs typeface="+mn-cs"/>
-              </a:defRPr>
-            </a:lvl2pPr>
-            <a:lvl3pPr marL="1143000" indent="-228600" algn="l" defTabSz="457200" rtl="0" eaLnBrk="1" latinLnBrk="0" hangingPunct="1">
-              <a:spcBef>
-                <a:spcPct val="20000"/>
-              </a:spcBef>
-              <a:buFont typeface="Arial"/>
-              <a:buChar char="•"/>
-              <a:defRPr sz="2400" kern="1200">
-                <a:solidFill>
-                  <a:schemeClr val="tx1"/>
-                </a:solidFill>
-                <a:latin typeface="+mn-lt"/>
-                <a:ea typeface="+mn-ea"/>
-                <a:cs typeface="+mn-cs"/>
-              </a:defRPr>
-            </a:lvl3pPr>
-            <a:lvl4pPr marL="1600200" indent="-228600" algn="l" defTabSz="457200" rtl="0" eaLnBrk="1" latinLnBrk="0" hangingPunct="1">
-              <a:spcBef>
-                <a:spcPct val="20000"/>
-              </a:spcBef>
-              <a:buFont typeface="Arial"/>
-              <a:buChar char="–"/>
-              <a:defRPr sz="2000" kern="1200">
-                <a:solidFill>
-                  <a:schemeClr val="tx1"/>
-                </a:solidFill>
-                <a:latin typeface="+mn-lt"/>
-                <a:ea typeface="+mn-ea"/>
-                <a:cs typeface="+mn-cs"/>
-              </a:defRPr>
-            </a:lvl4pPr>
-            <a:lvl5pPr marL="2057400" indent="-228600" algn="l" defTabSz="457200" rtl="0" eaLnBrk="1" latinLnBrk="0" hangingPunct="1">
-              <a:spcBef>
-                <a:spcPct val="20000"/>
-              </a:spcBef>
-              <a:buFont typeface="Arial"/>
-              <a:buChar char="»"/>
-              <a:defRPr sz="2000" kern="1200">
-                <a:solidFill>
-                  <a:schemeClr val="tx1"/>
-                </a:solidFill>
-                <a:latin typeface="+mn-lt"/>
-                <a:ea typeface="+mn-ea"/>
-                <a:cs typeface="+mn-cs"/>
-              </a:defRPr>
-            </a:lvl5pPr>
-            <a:lvl6pPr marL="2514600" indent="-228600" algn="l" defTabSz="457200" rtl="0" eaLnBrk="1" latinLnBrk="0" hangingPunct="1">
-              <a:spcBef>
-                <a:spcPct val="20000"/>
-              </a:spcBef>
-              <a:buFont typeface="Arial"/>
-              <a:buChar char="•"/>
-              <a:defRPr sz="2000" kern="1200">
-                <a:solidFill>
-                  <a:schemeClr val="tx1"/>
-                </a:solidFill>
-                <a:latin typeface="+mn-lt"/>
-                <a:ea typeface="+mn-ea"/>
-                <a:cs typeface="+mn-cs"/>
-              </a:defRPr>
-            </a:lvl6pPr>
-            <a:lvl7pPr marL="2971800" indent="-228600" algn="l" defTabSz="457200" rtl="0" eaLnBrk="1" latinLnBrk="0" hangingPunct="1">
-              <a:spcBef>
-                <a:spcPct val="20000"/>
-              </a:spcBef>
-              <a:buFont typeface="Arial"/>
-              <a:buChar char="•"/>
-              <a:defRPr sz="2000" kern="1200">
-                <a:solidFill>
-                  <a:schemeClr val="tx1"/>
-                </a:solidFill>
-                <a:latin typeface="+mn-lt"/>
-                <a:ea typeface="+mn-ea"/>
-                <a:cs typeface="+mn-cs"/>
-              </a:defRPr>
-            </a:lvl7pPr>
-            <a:lvl8pPr marL="3429000" indent="-228600" algn="l" defTabSz="457200" rtl="0" eaLnBrk="1" latinLnBrk="0" hangingPunct="1">
-              <a:spcBef>
-                <a:spcPct val="20000"/>
-              </a:spcBef>
-              <a:buFont typeface="Arial"/>
-              <a:buChar char="•"/>
-              <a:defRPr sz="2000" kern="1200">
-                <a:solidFill>
-                  <a:schemeClr val="tx1"/>
-                </a:solidFill>
-                <a:latin typeface="+mn-lt"/>
-                <a:ea typeface="+mn-ea"/>
-                <a:cs typeface="+mn-cs"/>
-              </a:defRPr>
-            </a:lvl8pPr>
-            <a:lvl9pPr marL="3886200" indent="-228600" algn="l" defTabSz="457200" rtl="0" eaLnBrk="1" latinLnBrk="0" hangingPunct="1">
-              <a:spcBef>
-                <a:spcPct val="20000"/>
-              </a:spcBef>
-              <a:buFont typeface="Arial"/>
-              <a:buChar char="•"/>
-              <a:defRPr sz="2000" kern="1200">
-                <a:solidFill>
-                  <a:schemeClr val="tx1"/>
-                </a:solidFill>
-                <a:latin typeface="+mn-lt"/>
-                <a:ea typeface="+mn-ea"/>
-                <a:cs typeface="+mn-cs"/>
-              </a:defRPr>
-            </a:lvl9pPr>
-          </a:lstStyle>
-          <a:p>
-            <a:pPr marL="198900" indent="0" algn="just">
-              <a:buFont typeface="Arial"/>
-              <a:buNone/>
-            </a:pPr>
-            <a:endParaRPr lang="pl-PL" dirty="0" smtClean="0"/>
-          </a:p>
-          <a:p>
-            <a:pPr algn="just"/>
-            <a:r>
-              <a:rPr lang="pl-PL" sz="1800" dirty="0">
-                <a:solidFill>
-                  <a:srgbClr val="2D3E5C"/>
-                </a:solidFill>
-                <a:latin typeface=""/>
-              </a:rPr>
-              <a:t>Klasa wykorzystywana po stronie klienta do komunikacji </a:t>
-            </a:r>
-            <a:r>
-              <a:rPr lang="pl-PL" sz="1800" dirty="0" smtClean="0">
-                <a:solidFill>
-                  <a:srgbClr val="2D3E5C"/>
-                </a:solidFill>
-                <a:latin typeface=""/>
-              </a:rPr>
-              <a:t>serwerem </a:t>
-            </a:r>
-            <a:r>
-              <a:rPr lang="pl-PL" sz="1800" dirty="0">
-                <a:solidFill>
-                  <a:srgbClr val="2D3E5C"/>
-                </a:solidFill>
-                <a:latin typeface=""/>
-              </a:rPr>
-              <a:t>za pomocą protokołu HTTP</a:t>
-            </a:r>
-            <a:r>
-              <a:rPr lang="pl-PL" sz="1800" dirty="0" smtClean="0">
-                <a:solidFill>
-                  <a:srgbClr val="2D3E5C"/>
-                </a:solidFill>
-                <a:latin typeface=""/>
-              </a:rPr>
-              <a:t>.</a:t>
-            </a:r>
-            <a:endParaRPr lang="pl-PL" sz="1800" dirty="0" smtClean="0">
-              <a:solidFill>
-                <a:srgbClr val="2D3E5C"/>
-              </a:solidFill>
-              <a:latin typeface=""/>
-            </a:endParaRPr>
-          </a:p>
-          <a:p>
-            <a:pPr marL="0" indent="0" algn="just">
-              <a:buNone/>
-            </a:pPr>
-            <a:endParaRPr lang="pl-PL" sz="1800" dirty="0" smtClean="0">
-              <a:solidFill>
-                <a:srgbClr val="2D3E5C"/>
-              </a:solidFill>
-              <a:latin typeface=""/>
-            </a:endParaRPr>
-          </a:p>
-          <a:p>
-            <a:pPr algn="just"/>
-            <a:r>
-              <a:rPr lang="pl-PL" sz="1800" dirty="0">
-                <a:solidFill>
-                  <a:srgbClr val="2D3E5C"/>
-                </a:solidFill>
-                <a:latin typeface=""/>
-              </a:rPr>
-              <a:t>Żądania GET z wykorzystaniem metody </a:t>
-            </a:r>
-            <a:r>
-              <a:rPr lang="pl-PL" sz="1800" dirty="0" smtClean="0">
-                <a:solidFill>
-                  <a:srgbClr val="2D3E5C"/>
-                </a:solidFill>
-                <a:latin typeface=""/>
-              </a:rPr>
-              <a:t>„exchange”:</a:t>
-            </a:r>
-          </a:p>
-          <a:p>
-            <a:pPr algn="just"/>
-            <a:endParaRPr lang="pl-PL" sz="1800" dirty="0">
-              <a:solidFill>
-                <a:srgbClr val="2D3E5C"/>
-              </a:solidFill>
-              <a:latin typeface=""/>
-            </a:endParaRPr>
-          </a:p>
-          <a:p>
-            <a:pPr algn="just"/>
-            <a:endParaRPr lang="pl-PL" sz="1800" dirty="0">
-              <a:solidFill>
-                <a:srgbClr val="2D3E5C"/>
-              </a:solidFill>
-              <a:latin typeface=""/>
-            </a:endParaRPr>
-          </a:p>
-          <a:p>
-            <a:pPr algn="just"/>
-            <a:endParaRPr lang="pl-PL" sz="1800" dirty="0">
-              <a:solidFill>
-                <a:srgbClr val="2D3E5C"/>
-              </a:solidFill>
-              <a:latin typeface=""/>
-            </a:endParaRPr>
-          </a:p>
-          <a:p>
-            <a:pPr algn="just"/>
-            <a:endParaRPr lang="pl-PL" dirty="0" smtClean="0"/>
-          </a:p>
-          <a:p>
-            <a:pPr algn="just"/>
-            <a:r>
-              <a:rPr lang="pl-PL" sz="1800" dirty="0">
-                <a:solidFill>
-                  <a:srgbClr val="2D3E5C"/>
-                </a:solidFill>
-                <a:latin typeface=""/>
-              </a:rPr>
-              <a:t>REST </a:t>
-            </a:r>
-            <a:r>
-              <a:rPr lang="pl-PL" sz="1800" dirty="0" err="1" smtClean="0">
-                <a:solidFill>
-                  <a:srgbClr val="2D3E5C"/>
-                </a:solidFill>
-                <a:latin typeface=""/>
-              </a:rPr>
-              <a:t>Template</a:t>
-            </a:r>
-            <a:r>
-              <a:rPr lang="pl-PL" sz="1800" dirty="0" smtClean="0">
-                <a:solidFill>
-                  <a:srgbClr val="2D3E5C"/>
-                </a:solidFill>
-                <a:latin typeface=""/>
-              </a:rPr>
-              <a:t> :</a:t>
-            </a:r>
-            <a:endParaRPr lang="pl-PL" sz="1800" dirty="0">
-              <a:solidFill>
-                <a:srgbClr val="2D3E5C"/>
-              </a:solidFill>
-              <a:latin typeface=""/>
-            </a:endParaRPr>
           </a:p>
         </p:txBody>
       </p:sp>
       <p:pic>
         <p:nvPicPr>
-          <p:cNvPr id="3" name="Obraz 2"/>
+          <p:cNvPr id="8" name="Obraz 7"/>
           <p:cNvPicPr>
             <a:picLocks noChangeAspect="1"/>
           </p:cNvPicPr>
@@ -5032,32 +4850,8 @@
         </p:blipFill>
         <p:spPr>
           <a:xfrm>
-            <a:off x="392905" y="5193632"/>
-            <a:ext cx="8358188" cy="779480"/>
-          </a:xfrm>
-          <a:prstGeom prst="rect">
-            <a:avLst/>
-          </a:prstGeom>
-        </p:spPr>
-      </p:pic>
-      <p:pic>
-        <p:nvPicPr>
-          <p:cNvPr id="4" name="Obraz 3"/>
-          <p:cNvPicPr>
-            <a:picLocks noChangeAspect="1"/>
-          </p:cNvPicPr>
-          <p:nvPr/>
-        </p:nvPicPr>
-        <p:blipFill>
-          <a:blip r:embed="rId3"/>
-          <a:stretch>
-            <a:fillRect/>
-          </a:stretch>
-        </p:blipFill>
-        <p:spPr>
-          <a:xfrm>
-            <a:off x="452391" y="3444198"/>
-            <a:ext cx="8239216" cy="971550"/>
+            <a:off x="833009" y="2598762"/>
+            <a:ext cx="7477980" cy="3701971"/>
           </a:xfrm>
           <a:prstGeom prst="rect">
             <a:avLst/>
@@ -5067,7 +4861,7 @@
     </p:spTree>
     <p:extLst>
       <p:ext uri="{BB962C8B-B14F-4D97-AF65-F5344CB8AC3E}">
-        <p14:creationId xmlns:p14="http://schemas.microsoft.com/office/powerpoint/2010/main" val="3204976087"/>
+        <p14:creationId xmlns:p14="http://schemas.microsoft.com/office/powerpoint/2010/main" val="2638960368"/>
       </p:ext>
     </p:extLst>
   </p:cSld>
@@ -5103,7 +4897,7 @@
       </p:grpSpPr>
       <p:sp>
         <p:nvSpPr>
-          <p:cNvPr id="7" name="Tytuł 6"/>
+          <p:cNvPr id="2" name="Tytuł 1"/>
           <p:cNvSpPr>
             <a:spLocks noGrp="1"/>
           </p:cNvSpPr>
@@ -5116,87 +4910,375 @@
           <a:bodyPr/>
           <a:lstStyle/>
           <a:p>
-            <a:endParaRPr lang="pl-PL"/>
-          </a:p>
-        </p:txBody>
-      </p:sp>
-      <p:sp>
-        <p:nvSpPr>
-          <p:cNvPr id="3" name="Symbol zastępczy tekstu 2"/>
-          <p:cNvSpPr>
-            <a:spLocks noGrp="1"/>
+            <a:r>
+              <a:rPr lang="pl-PL" dirty="0" smtClean="0"/>
+              <a:t>REST </a:t>
+            </a:r>
+            <a:r>
+              <a:rPr lang="pl-PL" dirty="0" err="1" smtClean="0"/>
+              <a:t>Template</a:t>
+            </a:r>
+            <a:endParaRPr lang="pl-PL" dirty="0"/>
+          </a:p>
+        </p:txBody>
+      </p:sp>
+      <p:sp>
+        <p:nvSpPr>
+          <p:cNvPr id="8" name="Symbol zastępczy tekstu 2"/>
+          <p:cNvSpPr txBox="1">
+            <a:spLocks/>
           </p:cNvSpPr>
-          <p:nvPr>
-            <p:ph type="body" sz="quarter" idx="10"/>
-          </p:nvPr>
-        </p:nvSpPr>
-        <p:spPr>
+          <p:nvPr/>
+        </p:nvSpPr>
+        <p:spPr>
+          <a:xfrm>
+            <a:off x="0" y="1228158"/>
+            <a:ext cx="9144000" cy="4846148"/>
+          </a:xfrm>
           <a:prstGeom prst="rect">
             <a:avLst/>
           </a:prstGeom>
         </p:spPr>
         <p:txBody>
           <a:bodyPr>
-            <a:noAutofit/>
+            <a:normAutofit/>
           </a:bodyPr>
-          <a:lstStyle/>
-          <a:p>
-            <a:pPr marL="198900" indent="0">
+          <a:lstStyle>
+            <a:lvl1pPr marL="342900" indent="-342900" algn="l" defTabSz="457200" rtl="0" eaLnBrk="1" latinLnBrk="0" hangingPunct="1">
+              <a:spcBef>
+                <a:spcPct val="20000"/>
+              </a:spcBef>
+              <a:buFont typeface="Arial"/>
+              <a:buChar char="•"/>
+              <a:defRPr sz="3200" kern="1200">
+                <a:solidFill>
+                  <a:schemeClr val="tx1"/>
+                </a:solidFill>
+                <a:latin typeface="+mn-lt"/>
+                <a:ea typeface="+mn-ea"/>
+                <a:cs typeface="+mn-cs"/>
+              </a:defRPr>
+            </a:lvl1pPr>
+            <a:lvl2pPr marL="742950" indent="-285750" algn="l" defTabSz="457200" rtl="0" eaLnBrk="1" latinLnBrk="0" hangingPunct="1">
+              <a:spcBef>
+                <a:spcPct val="20000"/>
+              </a:spcBef>
+              <a:buFont typeface="Arial"/>
+              <a:buChar char="–"/>
+              <a:defRPr sz="2800" kern="1200">
+                <a:solidFill>
+                  <a:schemeClr val="tx1"/>
+                </a:solidFill>
+                <a:latin typeface="+mn-lt"/>
+                <a:ea typeface="+mn-ea"/>
+                <a:cs typeface="+mn-cs"/>
+              </a:defRPr>
+            </a:lvl2pPr>
+            <a:lvl3pPr marL="1143000" indent="-228600" algn="l" defTabSz="457200" rtl="0" eaLnBrk="1" latinLnBrk="0" hangingPunct="1">
+              <a:spcBef>
+                <a:spcPct val="20000"/>
+              </a:spcBef>
+              <a:buFont typeface="Arial"/>
+              <a:buChar char="•"/>
+              <a:defRPr sz="2400" kern="1200">
+                <a:solidFill>
+                  <a:schemeClr val="tx1"/>
+                </a:solidFill>
+                <a:latin typeface="+mn-lt"/>
+                <a:ea typeface="+mn-ea"/>
+                <a:cs typeface="+mn-cs"/>
+              </a:defRPr>
+            </a:lvl3pPr>
+            <a:lvl4pPr marL="1600200" indent="-228600" algn="l" defTabSz="457200" rtl="0" eaLnBrk="1" latinLnBrk="0" hangingPunct="1">
+              <a:spcBef>
+                <a:spcPct val="20000"/>
+              </a:spcBef>
+              <a:buFont typeface="Arial"/>
+              <a:buChar char="–"/>
+              <a:defRPr sz="2000" kern="1200">
+                <a:solidFill>
+                  <a:schemeClr val="tx1"/>
+                </a:solidFill>
+                <a:latin typeface="+mn-lt"/>
+                <a:ea typeface="+mn-ea"/>
+                <a:cs typeface="+mn-cs"/>
+              </a:defRPr>
+            </a:lvl4pPr>
+            <a:lvl5pPr marL="2057400" indent="-228600" algn="l" defTabSz="457200" rtl="0" eaLnBrk="1" latinLnBrk="0" hangingPunct="1">
+              <a:spcBef>
+                <a:spcPct val="20000"/>
+              </a:spcBef>
+              <a:buFont typeface="Arial"/>
+              <a:buChar char="»"/>
+              <a:defRPr sz="2000" kern="1200">
+                <a:solidFill>
+                  <a:schemeClr val="tx1"/>
+                </a:solidFill>
+                <a:latin typeface="+mn-lt"/>
+                <a:ea typeface="+mn-ea"/>
+                <a:cs typeface="+mn-cs"/>
+              </a:defRPr>
+            </a:lvl5pPr>
+            <a:lvl6pPr marL="2514600" indent="-228600" algn="l" defTabSz="457200" rtl="0" eaLnBrk="1" latinLnBrk="0" hangingPunct="1">
+              <a:spcBef>
+                <a:spcPct val="20000"/>
+              </a:spcBef>
+              <a:buFont typeface="Arial"/>
+              <a:buChar char="•"/>
+              <a:defRPr sz="2000" kern="1200">
+                <a:solidFill>
+                  <a:schemeClr val="tx1"/>
+                </a:solidFill>
+                <a:latin typeface="+mn-lt"/>
+                <a:ea typeface="+mn-ea"/>
+                <a:cs typeface="+mn-cs"/>
+              </a:defRPr>
+            </a:lvl6pPr>
+            <a:lvl7pPr marL="2971800" indent="-228600" algn="l" defTabSz="457200" rtl="0" eaLnBrk="1" latinLnBrk="0" hangingPunct="1">
+              <a:spcBef>
+                <a:spcPct val="20000"/>
+              </a:spcBef>
+              <a:buFont typeface="Arial"/>
+              <a:buChar char="•"/>
+              <a:defRPr sz="2000" kern="1200">
+                <a:solidFill>
+                  <a:schemeClr val="tx1"/>
+                </a:solidFill>
+                <a:latin typeface="+mn-lt"/>
+                <a:ea typeface="+mn-ea"/>
+                <a:cs typeface="+mn-cs"/>
+              </a:defRPr>
+            </a:lvl7pPr>
+            <a:lvl8pPr marL="3429000" indent="-228600" algn="l" defTabSz="457200" rtl="0" eaLnBrk="1" latinLnBrk="0" hangingPunct="1">
+              <a:spcBef>
+                <a:spcPct val="20000"/>
+              </a:spcBef>
+              <a:buFont typeface="Arial"/>
+              <a:buChar char="•"/>
+              <a:defRPr sz="2000" kern="1200">
+                <a:solidFill>
+                  <a:schemeClr val="tx1"/>
+                </a:solidFill>
+                <a:latin typeface="+mn-lt"/>
+                <a:ea typeface="+mn-ea"/>
+                <a:cs typeface="+mn-cs"/>
+              </a:defRPr>
+            </a:lvl8pPr>
+            <a:lvl9pPr marL="3886200" indent="-228600" algn="l" defTabSz="457200" rtl="0" eaLnBrk="1" latinLnBrk="0" hangingPunct="1">
+              <a:spcBef>
+                <a:spcPct val="20000"/>
+              </a:spcBef>
+              <a:buFont typeface="Arial"/>
+              <a:buChar char="•"/>
+              <a:defRPr sz="2000" kern="1200">
+                <a:solidFill>
+                  <a:schemeClr val="tx1"/>
+                </a:solidFill>
+                <a:latin typeface="+mn-lt"/>
+                <a:ea typeface="+mn-ea"/>
+                <a:cs typeface="+mn-cs"/>
+              </a:defRPr>
+            </a:lvl9pPr>
+          </a:lstStyle>
+          <a:p>
+            <a:pPr marL="198900" indent="0" algn="just">
+              <a:buFont typeface="Arial"/>
               <a:buNone/>
             </a:pPr>
-            <a:r>
-              <a:rPr lang="pl-PL" sz="5000" dirty="0" smtClean="0"/>
-              <a:t>Pierwsze API</a:t>
-            </a:r>
-            <a:endParaRPr lang="pl-PL" sz="5000" dirty="0"/>
+            <a:endParaRPr lang="pl-PL" dirty="0" smtClean="0"/>
+          </a:p>
+          <a:p>
+            <a:pPr algn="just"/>
+            <a:r>
+              <a:rPr lang="pl-PL" sz="1800" dirty="0">
+                <a:solidFill>
+                  <a:srgbClr val="2D3E5C"/>
+                </a:solidFill>
+                <a:latin typeface=""/>
+              </a:rPr>
+              <a:t>Klasa wykorzystywana po stronie klienta do komunikacji </a:t>
+            </a:r>
+            <a:r>
+              <a:rPr lang="pl-PL" sz="1800" dirty="0" smtClean="0">
+                <a:solidFill>
+                  <a:srgbClr val="2D3E5C"/>
+                </a:solidFill>
+                <a:latin typeface=""/>
+              </a:rPr>
+              <a:t>serwerem </a:t>
+            </a:r>
+            <a:r>
+              <a:rPr lang="pl-PL" sz="1800" dirty="0">
+                <a:solidFill>
+                  <a:srgbClr val="2D3E5C"/>
+                </a:solidFill>
+                <a:latin typeface=""/>
+              </a:rPr>
+              <a:t>za pomocą protokołu HTTP</a:t>
+            </a:r>
+            <a:r>
+              <a:rPr lang="pl-PL" sz="1800" dirty="0" smtClean="0">
+                <a:solidFill>
+                  <a:srgbClr val="2D3E5C"/>
+                </a:solidFill>
+                <a:latin typeface=""/>
+              </a:rPr>
+              <a:t>.</a:t>
+            </a:r>
+          </a:p>
+          <a:p>
+            <a:pPr marL="0" indent="0" algn="just">
+              <a:buNone/>
+            </a:pPr>
+            <a:endParaRPr lang="pl-PL" sz="1800" dirty="0" smtClean="0">
+              <a:solidFill>
+                <a:srgbClr val="2D3E5C"/>
+              </a:solidFill>
+              <a:latin typeface=""/>
+            </a:endParaRPr>
+          </a:p>
+          <a:p>
+            <a:pPr algn="just"/>
+            <a:r>
+              <a:rPr lang="pl-PL" sz="1800" dirty="0">
+                <a:solidFill>
+                  <a:srgbClr val="2D3E5C"/>
+                </a:solidFill>
+                <a:latin typeface=""/>
+              </a:rPr>
+              <a:t>Żądania GET z wykorzystaniem metody </a:t>
+            </a:r>
+            <a:r>
+              <a:rPr lang="pl-PL" sz="1800" dirty="0" smtClean="0">
+                <a:solidFill>
+                  <a:srgbClr val="2D3E5C"/>
+                </a:solidFill>
+                <a:latin typeface=""/>
+              </a:rPr>
+              <a:t>„exchange”:</a:t>
+            </a:r>
+          </a:p>
+          <a:p>
+            <a:pPr algn="just"/>
+            <a:endParaRPr lang="pl-PL" sz="1800" dirty="0">
+              <a:solidFill>
+                <a:srgbClr val="2D3E5C"/>
+              </a:solidFill>
+              <a:latin typeface=""/>
+            </a:endParaRPr>
+          </a:p>
+          <a:p>
+            <a:pPr algn="just"/>
+            <a:endParaRPr lang="pl-PL" sz="1800" dirty="0">
+              <a:solidFill>
+                <a:srgbClr val="2D3E5C"/>
+              </a:solidFill>
+              <a:latin typeface=""/>
+            </a:endParaRPr>
+          </a:p>
+          <a:p>
+            <a:pPr algn="just"/>
+            <a:endParaRPr lang="pl-PL" sz="1800" dirty="0">
+              <a:solidFill>
+                <a:srgbClr val="2D3E5C"/>
+              </a:solidFill>
+              <a:latin typeface=""/>
+            </a:endParaRPr>
+          </a:p>
+          <a:p>
+            <a:pPr algn="just"/>
+            <a:endParaRPr lang="pl-PL" dirty="0" smtClean="0"/>
+          </a:p>
+          <a:p>
+            <a:pPr algn="just"/>
+            <a:r>
+              <a:rPr lang="pl-PL" sz="1800" dirty="0">
+                <a:solidFill>
+                  <a:srgbClr val="2D3E5C"/>
+                </a:solidFill>
+                <a:latin typeface=""/>
+              </a:rPr>
+              <a:t>REST </a:t>
+            </a:r>
+            <a:r>
+              <a:rPr lang="pl-PL" sz="1800" dirty="0" err="1" smtClean="0">
+                <a:solidFill>
+                  <a:srgbClr val="2D3E5C"/>
+                </a:solidFill>
+                <a:latin typeface=""/>
+              </a:rPr>
+              <a:t>Template</a:t>
+            </a:r>
+            <a:r>
+              <a:rPr lang="pl-PL" sz="1800" dirty="0" smtClean="0">
+                <a:solidFill>
+                  <a:srgbClr val="2D3E5C"/>
+                </a:solidFill>
+                <a:latin typeface=""/>
+              </a:rPr>
+              <a:t> :</a:t>
+            </a:r>
+            <a:endParaRPr lang="pl-PL" sz="1800" dirty="0">
+              <a:solidFill>
+                <a:srgbClr val="2D3E5C"/>
+              </a:solidFill>
+              <a:latin typeface=""/>
+            </a:endParaRPr>
           </a:p>
         </p:txBody>
       </p:sp>
       <p:pic>
         <p:nvPicPr>
-          <p:cNvPr id="3074" name="Picture 2" descr="Znalezione obrazy dla zapytania junit"/>
+          <p:cNvPr id="3" name="Obraz 2"/>
           <p:cNvPicPr>
-            <a:picLocks noChangeAspect="1" noChangeArrowheads="1"/>
+            <a:picLocks noChangeAspect="1"/>
           </p:cNvPicPr>
           <p:nvPr/>
         </p:nvPicPr>
         <p:blipFill>
-          <a:blip r:embed="rId2">
-            <a:extLst>
-              <a:ext uri="{28A0092B-C50C-407E-A947-70E740481C1C}">
-                <a14:useLocalDpi xmlns:a14="http://schemas.microsoft.com/office/drawing/2010/main" val="0"/>
-              </a:ext>
-            </a:extLst>
-          </a:blip>
-          <a:srcRect/>
+          <a:blip r:embed="rId2"/>
           <a:stretch>
             <a:fillRect/>
           </a:stretch>
         </p:blipFill>
-        <p:spPr bwMode="auto">
-          <a:xfrm>
-            <a:off x="5528764" y="3071495"/>
-            <a:ext cx="2152650" cy="2124075"/>
+        <p:spPr>
+          <a:xfrm>
+            <a:off x="392905" y="5193632"/>
+            <a:ext cx="8358188" cy="779480"/>
           </a:xfrm>
           <a:prstGeom prst="rect">
             <a:avLst/>
           </a:prstGeom>
-          <a:noFill/>
-          <a:extLst>
-            <a:ext uri="{909E8E84-426E-40DD-AFC4-6F175D3DCCD1}">
-              <a14:hiddenFill xmlns:a14="http://schemas.microsoft.com/office/drawing/2010/main">
-                <a:solidFill>
-                  <a:srgbClr val="FFFFFF"/>
-                </a:solidFill>
-              </a14:hiddenFill>
-            </a:ext>
-          </a:extLst>
+        </p:spPr>
+      </p:pic>
+      <p:pic>
+        <p:nvPicPr>
+          <p:cNvPr id="4" name="Obraz 3"/>
+          <p:cNvPicPr>
+            <a:picLocks noChangeAspect="1"/>
+          </p:cNvPicPr>
+          <p:nvPr/>
+        </p:nvPicPr>
+        <p:blipFill>
+          <a:blip r:embed="rId3"/>
+          <a:stretch>
+            <a:fillRect/>
+          </a:stretch>
+        </p:blipFill>
+        <p:spPr>
+          <a:xfrm>
+            <a:off x="452391" y="3444198"/>
+            <a:ext cx="8239216" cy="971550"/>
+          </a:xfrm>
+          <a:prstGeom prst="rect">
+            <a:avLst/>
+          </a:prstGeom>
         </p:spPr>
       </p:pic>
     </p:spTree>
     <p:extLst>
       <p:ext uri="{BB962C8B-B14F-4D97-AF65-F5344CB8AC3E}">
-        <p14:creationId xmlns:p14="http://schemas.microsoft.com/office/powerpoint/2010/main" val="1028304070"/>
+        <p14:creationId xmlns:p14="http://schemas.microsoft.com/office/powerpoint/2010/main" val="3204976087"/>
       </p:ext>
     </p:extLst>
   </p:cSld>
@@ -5232,7 +5314,7 @@
       </p:grpSpPr>
       <p:sp>
         <p:nvSpPr>
-          <p:cNvPr id="2" name="Tytuł 1"/>
+          <p:cNvPr id="7" name="Tytuł 6"/>
           <p:cNvSpPr>
             <a:spLocks noGrp="1"/>
           </p:cNvSpPr>
@@ -5245,289 +5327,87 @@
           <a:bodyPr/>
           <a:lstStyle/>
           <a:p>
-            <a:r>
-              <a:rPr lang="en-US" dirty="0"/>
-              <a:t>Spring </a:t>
-            </a:r>
-            <a:r>
-              <a:rPr lang="en-US" dirty="0" err="1" smtClean="0"/>
-              <a:t>MockMVC</a:t>
-            </a:r>
-            <a:r>
-              <a:rPr lang="pl-PL" dirty="0" smtClean="0"/>
-              <a:t> </a:t>
-            </a:r>
-            <a:r>
-              <a:rPr lang="en-US" dirty="0" smtClean="0"/>
-              <a:t> </a:t>
-            </a:r>
-            <a:endParaRPr lang="pl-PL" dirty="0">
-              <a:latin typeface=""/>
-            </a:endParaRPr>
-          </a:p>
-        </p:txBody>
-      </p:sp>
-      <p:sp>
-        <p:nvSpPr>
-          <p:cNvPr id="4" name="pole tekstowe 3"/>
-          <p:cNvSpPr txBox="1"/>
-          <p:nvPr/>
-        </p:nvSpPr>
-        <p:spPr>
-          <a:xfrm>
-            <a:off x="862642" y="1233577"/>
-            <a:ext cx="6564701" cy="369332"/>
-          </a:xfrm>
+            <a:endParaRPr lang="pl-PL"/>
+          </a:p>
+        </p:txBody>
+      </p:sp>
+      <p:sp>
+        <p:nvSpPr>
+          <p:cNvPr id="3" name="Symbol zastępczy tekstu 2"/>
+          <p:cNvSpPr>
+            <a:spLocks noGrp="1"/>
+          </p:cNvSpPr>
+          <p:nvPr>
+            <p:ph type="body" sz="quarter" idx="10"/>
+          </p:nvPr>
+        </p:nvSpPr>
+        <p:spPr>
           <a:prstGeom prst="rect">
             <a:avLst/>
           </a:prstGeom>
-          <a:noFill/>
-        </p:spPr>
-        <p:txBody>
-          <a:bodyPr wrap="square" rtlCol="0">
-            <a:spAutoFit/>
+        </p:spPr>
+        <p:txBody>
+          <a:bodyPr>
+            <a:noAutofit/>
           </a:bodyPr>
           <a:lstStyle/>
           <a:p>
-            <a:endParaRPr lang="pl-PL" dirty="0"/>
-          </a:p>
-        </p:txBody>
-      </p:sp>
-      <p:sp>
-        <p:nvSpPr>
-          <p:cNvPr id="6" name="Symbol zastępczy tekstu 2"/>
-          <p:cNvSpPr txBox="1">
-            <a:spLocks/>
-          </p:cNvSpPr>
-          <p:nvPr/>
-        </p:nvSpPr>
-        <p:spPr>
-          <a:xfrm>
-            <a:off x="0" y="1228158"/>
-            <a:ext cx="9144000" cy="4846148"/>
-          </a:xfrm>
-          <a:prstGeom prst="rect">
-            <a:avLst/>
-          </a:prstGeom>
-        </p:spPr>
-        <p:txBody>
-          <a:bodyPr>
-            <a:normAutofit/>
-          </a:bodyPr>
-          <a:lstStyle>
-            <a:lvl1pPr marL="342900" indent="-342900" algn="l" defTabSz="457200" rtl="0" eaLnBrk="1" latinLnBrk="0" hangingPunct="1">
-              <a:spcBef>
-                <a:spcPct val="20000"/>
-              </a:spcBef>
-              <a:buFont typeface="Arial"/>
-              <a:buChar char="•"/>
-              <a:defRPr sz="3200" kern="1200">
-                <a:solidFill>
-                  <a:schemeClr val="tx1"/>
-                </a:solidFill>
-                <a:latin typeface="+mn-lt"/>
-                <a:ea typeface="+mn-ea"/>
-                <a:cs typeface="+mn-cs"/>
-              </a:defRPr>
-            </a:lvl1pPr>
-            <a:lvl2pPr marL="742950" indent="-285750" algn="l" defTabSz="457200" rtl="0" eaLnBrk="1" latinLnBrk="0" hangingPunct="1">
-              <a:spcBef>
-                <a:spcPct val="20000"/>
-              </a:spcBef>
-              <a:buFont typeface="Arial"/>
-              <a:buChar char="–"/>
-              <a:defRPr sz="2800" kern="1200">
-                <a:solidFill>
-                  <a:schemeClr val="tx1"/>
-                </a:solidFill>
-                <a:latin typeface="+mn-lt"/>
-                <a:ea typeface="+mn-ea"/>
-                <a:cs typeface="+mn-cs"/>
-              </a:defRPr>
-            </a:lvl2pPr>
-            <a:lvl3pPr marL="1143000" indent="-228600" algn="l" defTabSz="457200" rtl="0" eaLnBrk="1" latinLnBrk="0" hangingPunct="1">
-              <a:spcBef>
-                <a:spcPct val="20000"/>
-              </a:spcBef>
-              <a:buFont typeface="Arial"/>
-              <a:buChar char="•"/>
-              <a:defRPr sz="2400" kern="1200">
-                <a:solidFill>
-                  <a:schemeClr val="tx1"/>
-                </a:solidFill>
-                <a:latin typeface="+mn-lt"/>
-                <a:ea typeface="+mn-ea"/>
-                <a:cs typeface="+mn-cs"/>
-              </a:defRPr>
-            </a:lvl3pPr>
-            <a:lvl4pPr marL="1600200" indent="-228600" algn="l" defTabSz="457200" rtl="0" eaLnBrk="1" latinLnBrk="0" hangingPunct="1">
-              <a:spcBef>
-                <a:spcPct val="20000"/>
-              </a:spcBef>
-              <a:buFont typeface="Arial"/>
-              <a:buChar char="–"/>
-              <a:defRPr sz="2000" kern="1200">
-                <a:solidFill>
-                  <a:schemeClr val="tx1"/>
-                </a:solidFill>
-                <a:latin typeface="+mn-lt"/>
-                <a:ea typeface="+mn-ea"/>
-                <a:cs typeface="+mn-cs"/>
-              </a:defRPr>
-            </a:lvl4pPr>
-            <a:lvl5pPr marL="2057400" indent="-228600" algn="l" defTabSz="457200" rtl="0" eaLnBrk="1" latinLnBrk="0" hangingPunct="1">
-              <a:spcBef>
-                <a:spcPct val="20000"/>
-              </a:spcBef>
-              <a:buFont typeface="Arial"/>
-              <a:buChar char="»"/>
-              <a:defRPr sz="2000" kern="1200">
-                <a:solidFill>
-                  <a:schemeClr val="tx1"/>
-                </a:solidFill>
-                <a:latin typeface="+mn-lt"/>
-                <a:ea typeface="+mn-ea"/>
-                <a:cs typeface="+mn-cs"/>
-              </a:defRPr>
-            </a:lvl5pPr>
-            <a:lvl6pPr marL="2514600" indent="-228600" algn="l" defTabSz="457200" rtl="0" eaLnBrk="1" latinLnBrk="0" hangingPunct="1">
-              <a:spcBef>
-                <a:spcPct val="20000"/>
-              </a:spcBef>
-              <a:buFont typeface="Arial"/>
-              <a:buChar char="•"/>
-              <a:defRPr sz="2000" kern="1200">
-                <a:solidFill>
-                  <a:schemeClr val="tx1"/>
-                </a:solidFill>
-                <a:latin typeface="+mn-lt"/>
-                <a:ea typeface="+mn-ea"/>
-                <a:cs typeface="+mn-cs"/>
-              </a:defRPr>
-            </a:lvl6pPr>
-            <a:lvl7pPr marL="2971800" indent="-228600" algn="l" defTabSz="457200" rtl="0" eaLnBrk="1" latinLnBrk="0" hangingPunct="1">
-              <a:spcBef>
-                <a:spcPct val="20000"/>
-              </a:spcBef>
-              <a:buFont typeface="Arial"/>
-              <a:buChar char="•"/>
-              <a:defRPr sz="2000" kern="1200">
-                <a:solidFill>
-                  <a:schemeClr val="tx1"/>
-                </a:solidFill>
-                <a:latin typeface="+mn-lt"/>
-                <a:ea typeface="+mn-ea"/>
-                <a:cs typeface="+mn-cs"/>
-              </a:defRPr>
-            </a:lvl7pPr>
-            <a:lvl8pPr marL="3429000" indent="-228600" algn="l" defTabSz="457200" rtl="0" eaLnBrk="1" latinLnBrk="0" hangingPunct="1">
-              <a:spcBef>
-                <a:spcPct val="20000"/>
-              </a:spcBef>
-              <a:buFont typeface="Arial"/>
-              <a:buChar char="•"/>
-              <a:defRPr sz="2000" kern="1200">
-                <a:solidFill>
-                  <a:schemeClr val="tx1"/>
-                </a:solidFill>
-                <a:latin typeface="+mn-lt"/>
-                <a:ea typeface="+mn-ea"/>
-                <a:cs typeface="+mn-cs"/>
-              </a:defRPr>
-            </a:lvl8pPr>
-            <a:lvl9pPr marL="3886200" indent="-228600" algn="l" defTabSz="457200" rtl="0" eaLnBrk="1" latinLnBrk="0" hangingPunct="1">
-              <a:spcBef>
-                <a:spcPct val="20000"/>
-              </a:spcBef>
-              <a:buFont typeface="Arial"/>
-              <a:buChar char="•"/>
-              <a:defRPr sz="2000" kern="1200">
-                <a:solidFill>
-                  <a:schemeClr val="tx1"/>
-                </a:solidFill>
-                <a:latin typeface="+mn-lt"/>
-                <a:ea typeface="+mn-ea"/>
-                <a:cs typeface="+mn-cs"/>
-              </a:defRPr>
-            </a:lvl9pPr>
-          </a:lstStyle>
-          <a:p>
-            <a:pPr marL="198900" indent="0" algn="just">
-              <a:buFont typeface="Arial"/>
+            <a:pPr marL="198900" indent="0">
               <a:buNone/>
             </a:pPr>
-            <a:endParaRPr lang="pl-PL" dirty="0" smtClean="0"/>
-          </a:p>
-          <a:p>
-            <a:pPr algn="just"/>
-            <a:r>
-              <a:rPr lang="pl-PL" sz="2400" dirty="0" smtClean="0"/>
-              <a:t>Wykorzystywany do testowania serwerowej strony aplikacji.</a:t>
-            </a:r>
-          </a:p>
-          <a:p>
-            <a:pPr algn="just"/>
-            <a:r>
-              <a:rPr lang="pl-PL" sz="2400" dirty="0" smtClean="0"/>
-              <a:t>Tworzy infrastrukturę bardzo zbliżoną do tej, która pojawia przy faktycznym uruchomieniu programu</a:t>
-            </a:r>
-          </a:p>
-          <a:p>
-            <a:pPr algn="just"/>
-            <a:r>
-              <a:rPr lang="pl-PL" sz="2400" dirty="0" smtClean="0"/>
-              <a:t>Główna zasada działania opiera się o </a:t>
-            </a:r>
-            <a:r>
-              <a:rPr lang="pl-PL" sz="2400" dirty="0" err="1" smtClean="0"/>
-              <a:t>mockowanie</a:t>
-            </a:r>
-            <a:r>
-              <a:rPr lang="pl-PL" sz="2400" dirty="0" smtClean="0"/>
-              <a:t> żądania i odpowiedzi HTTP, które przychodzą od „spring-test”.</a:t>
-            </a:r>
-          </a:p>
-          <a:p>
-            <a:pPr algn="just"/>
-            <a:r>
-              <a:rPr lang="pl-PL" sz="2400" dirty="0" smtClean="0"/>
-              <a:t>Testy nie wymagają uruchomionego kontenera </a:t>
-            </a:r>
-            <a:r>
-              <a:rPr lang="pl-PL" sz="2400" dirty="0" err="1" smtClean="0"/>
-              <a:t>servletu</a:t>
-            </a:r>
-            <a:endParaRPr lang="pl-PL" sz="2400" dirty="0" smtClean="0"/>
-          </a:p>
-          <a:p>
-            <a:pPr algn="just"/>
-            <a:r>
-              <a:rPr lang="pl-PL" sz="2400" dirty="0" smtClean="0"/>
-              <a:t>Podczas wykonywania testu żądania obsługuje </a:t>
-            </a:r>
-            <a:r>
-              <a:rPr lang="pl-PL" sz="2400" dirty="0" err="1" smtClean="0"/>
-              <a:t>Dispatcher</a:t>
-            </a:r>
-            <a:r>
-              <a:rPr lang="pl-PL" sz="2400" dirty="0" smtClean="0"/>
-              <a:t> </a:t>
-            </a:r>
-            <a:r>
-              <a:rPr lang="pl-PL" sz="2400" dirty="0" err="1" smtClean="0"/>
-              <a:t>Servlet</a:t>
-            </a:r>
-            <a:r>
-              <a:rPr lang="pl-PL" sz="2400" dirty="0" smtClean="0"/>
-              <a:t> lecz nie zostaje nawiązane  rzeczywiste połączenie sieciowe.</a:t>
-            </a:r>
-          </a:p>
-        </p:txBody>
-      </p:sp>
+            <a:r>
+              <a:rPr lang="pl-PL" sz="5000" dirty="0" smtClean="0"/>
+              <a:t>Pierwsze API</a:t>
+            </a:r>
+            <a:endParaRPr lang="pl-PL" sz="5000" dirty="0"/>
+          </a:p>
+        </p:txBody>
+      </p:sp>
+      <p:pic>
+        <p:nvPicPr>
+          <p:cNvPr id="3074" name="Picture 2" descr="Znalezione obrazy dla zapytania junit"/>
+          <p:cNvPicPr>
+            <a:picLocks noChangeAspect="1" noChangeArrowheads="1"/>
+          </p:cNvPicPr>
+          <p:nvPr/>
+        </p:nvPicPr>
+        <p:blipFill>
+          <a:blip r:embed="rId2">
+            <a:extLst>
+              <a:ext uri="{28A0092B-C50C-407E-A947-70E740481C1C}">
+                <a14:useLocalDpi xmlns:a14="http://schemas.microsoft.com/office/drawing/2010/main" val="0"/>
+              </a:ext>
+            </a:extLst>
+          </a:blip>
+          <a:srcRect/>
+          <a:stretch>
+            <a:fillRect/>
+          </a:stretch>
+        </p:blipFill>
+        <p:spPr bwMode="auto">
+          <a:xfrm>
+            <a:off x="5528764" y="3071495"/>
+            <a:ext cx="2152650" cy="2124075"/>
+          </a:xfrm>
+          <a:prstGeom prst="rect">
+            <a:avLst/>
+          </a:prstGeom>
+          <a:noFill/>
+          <a:extLst>
+            <a:ext uri="{909E8E84-426E-40DD-AFC4-6F175D3DCCD1}">
+              <a14:hiddenFill xmlns:a14="http://schemas.microsoft.com/office/drawing/2010/main">
+                <a:solidFill>
+                  <a:srgbClr val="FFFFFF"/>
+                </a:solidFill>
+              </a14:hiddenFill>
+            </a:ext>
+          </a:extLst>
+        </p:spPr>
+      </p:pic>
     </p:spTree>
     <p:extLst>
       <p:ext uri="{BB962C8B-B14F-4D97-AF65-F5344CB8AC3E}">
-        <p14:creationId xmlns:p14="http://schemas.microsoft.com/office/powerpoint/2010/main" val="831594908"/>
+        <p14:creationId xmlns:p14="http://schemas.microsoft.com/office/powerpoint/2010/main" val="1028304070"/>
       </p:ext>
     </p:extLst>
   </p:cSld>
@@ -5586,6 +5466,337 @@
             </a:r>
             <a:r>
               <a:rPr lang="pl-PL" dirty="0" smtClean="0"/>
+              <a:t> </a:t>
+            </a:r>
+            <a:r>
+              <a:rPr lang="en-US" dirty="0" smtClean="0"/>
+              <a:t> </a:t>
+            </a:r>
+            <a:endParaRPr lang="pl-PL" dirty="0">
+              <a:latin typeface=""/>
+            </a:endParaRPr>
+          </a:p>
+        </p:txBody>
+      </p:sp>
+      <p:sp>
+        <p:nvSpPr>
+          <p:cNvPr id="4" name="pole tekstowe 3"/>
+          <p:cNvSpPr txBox="1"/>
+          <p:nvPr/>
+        </p:nvSpPr>
+        <p:spPr>
+          <a:xfrm>
+            <a:off x="862642" y="1233577"/>
+            <a:ext cx="6564701" cy="369332"/>
+          </a:xfrm>
+          <a:prstGeom prst="rect">
+            <a:avLst/>
+          </a:prstGeom>
+          <a:noFill/>
+        </p:spPr>
+        <p:txBody>
+          <a:bodyPr wrap="square" rtlCol="0">
+            <a:spAutoFit/>
+          </a:bodyPr>
+          <a:lstStyle/>
+          <a:p>
+            <a:endParaRPr lang="pl-PL" dirty="0"/>
+          </a:p>
+        </p:txBody>
+      </p:sp>
+      <p:sp>
+        <p:nvSpPr>
+          <p:cNvPr id="6" name="Symbol zastępczy tekstu 2"/>
+          <p:cNvSpPr txBox="1">
+            <a:spLocks/>
+          </p:cNvSpPr>
+          <p:nvPr/>
+        </p:nvSpPr>
+        <p:spPr>
+          <a:xfrm>
+            <a:off x="0" y="1228158"/>
+            <a:ext cx="9144000" cy="4846148"/>
+          </a:xfrm>
+          <a:prstGeom prst="rect">
+            <a:avLst/>
+          </a:prstGeom>
+        </p:spPr>
+        <p:txBody>
+          <a:bodyPr>
+            <a:normAutofit/>
+          </a:bodyPr>
+          <a:lstStyle>
+            <a:lvl1pPr marL="342900" indent="-342900" algn="l" defTabSz="457200" rtl="0" eaLnBrk="1" latinLnBrk="0" hangingPunct="1">
+              <a:spcBef>
+                <a:spcPct val="20000"/>
+              </a:spcBef>
+              <a:buFont typeface="Arial"/>
+              <a:buChar char="•"/>
+              <a:defRPr sz="3200" kern="1200">
+                <a:solidFill>
+                  <a:schemeClr val="tx1"/>
+                </a:solidFill>
+                <a:latin typeface="+mn-lt"/>
+                <a:ea typeface="+mn-ea"/>
+                <a:cs typeface="+mn-cs"/>
+              </a:defRPr>
+            </a:lvl1pPr>
+            <a:lvl2pPr marL="742950" indent="-285750" algn="l" defTabSz="457200" rtl="0" eaLnBrk="1" latinLnBrk="0" hangingPunct="1">
+              <a:spcBef>
+                <a:spcPct val="20000"/>
+              </a:spcBef>
+              <a:buFont typeface="Arial"/>
+              <a:buChar char="–"/>
+              <a:defRPr sz="2800" kern="1200">
+                <a:solidFill>
+                  <a:schemeClr val="tx1"/>
+                </a:solidFill>
+                <a:latin typeface="+mn-lt"/>
+                <a:ea typeface="+mn-ea"/>
+                <a:cs typeface="+mn-cs"/>
+              </a:defRPr>
+            </a:lvl2pPr>
+            <a:lvl3pPr marL="1143000" indent="-228600" algn="l" defTabSz="457200" rtl="0" eaLnBrk="1" latinLnBrk="0" hangingPunct="1">
+              <a:spcBef>
+                <a:spcPct val="20000"/>
+              </a:spcBef>
+              <a:buFont typeface="Arial"/>
+              <a:buChar char="•"/>
+              <a:defRPr sz="2400" kern="1200">
+                <a:solidFill>
+                  <a:schemeClr val="tx1"/>
+                </a:solidFill>
+                <a:latin typeface="+mn-lt"/>
+                <a:ea typeface="+mn-ea"/>
+                <a:cs typeface="+mn-cs"/>
+              </a:defRPr>
+            </a:lvl3pPr>
+            <a:lvl4pPr marL="1600200" indent="-228600" algn="l" defTabSz="457200" rtl="0" eaLnBrk="1" latinLnBrk="0" hangingPunct="1">
+              <a:spcBef>
+                <a:spcPct val="20000"/>
+              </a:spcBef>
+              <a:buFont typeface="Arial"/>
+              <a:buChar char="–"/>
+              <a:defRPr sz="2000" kern="1200">
+                <a:solidFill>
+                  <a:schemeClr val="tx1"/>
+                </a:solidFill>
+                <a:latin typeface="+mn-lt"/>
+                <a:ea typeface="+mn-ea"/>
+                <a:cs typeface="+mn-cs"/>
+              </a:defRPr>
+            </a:lvl4pPr>
+            <a:lvl5pPr marL="2057400" indent="-228600" algn="l" defTabSz="457200" rtl="0" eaLnBrk="1" latinLnBrk="0" hangingPunct="1">
+              <a:spcBef>
+                <a:spcPct val="20000"/>
+              </a:spcBef>
+              <a:buFont typeface="Arial"/>
+              <a:buChar char="»"/>
+              <a:defRPr sz="2000" kern="1200">
+                <a:solidFill>
+                  <a:schemeClr val="tx1"/>
+                </a:solidFill>
+                <a:latin typeface="+mn-lt"/>
+                <a:ea typeface="+mn-ea"/>
+                <a:cs typeface="+mn-cs"/>
+              </a:defRPr>
+            </a:lvl5pPr>
+            <a:lvl6pPr marL="2514600" indent="-228600" algn="l" defTabSz="457200" rtl="0" eaLnBrk="1" latinLnBrk="0" hangingPunct="1">
+              <a:spcBef>
+                <a:spcPct val="20000"/>
+              </a:spcBef>
+              <a:buFont typeface="Arial"/>
+              <a:buChar char="•"/>
+              <a:defRPr sz="2000" kern="1200">
+                <a:solidFill>
+                  <a:schemeClr val="tx1"/>
+                </a:solidFill>
+                <a:latin typeface="+mn-lt"/>
+                <a:ea typeface="+mn-ea"/>
+                <a:cs typeface="+mn-cs"/>
+              </a:defRPr>
+            </a:lvl6pPr>
+            <a:lvl7pPr marL="2971800" indent="-228600" algn="l" defTabSz="457200" rtl="0" eaLnBrk="1" latinLnBrk="0" hangingPunct="1">
+              <a:spcBef>
+                <a:spcPct val="20000"/>
+              </a:spcBef>
+              <a:buFont typeface="Arial"/>
+              <a:buChar char="•"/>
+              <a:defRPr sz="2000" kern="1200">
+                <a:solidFill>
+                  <a:schemeClr val="tx1"/>
+                </a:solidFill>
+                <a:latin typeface="+mn-lt"/>
+                <a:ea typeface="+mn-ea"/>
+                <a:cs typeface="+mn-cs"/>
+              </a:defRPr>
+            </a:lvl7pPr>
+            <a:lvl8pPr marL="3429000" indent="-228600" algn="l" defTabSz="457200" rtl="0" eaLnBrk="1" latinLnBrk="0" hangingPunct="1">
+              <a:spcBef>
+                <a:spcPct val="20000"/>
+              </a:spcBef>
+              <a:buFont typeface="Arial"/>
+              <a:buChar char="•"/>
+              <a:defRPr sz="2000" kern="1200">
+                <a:solidFill>
+                  <a:schemeClr val="tx1"/>
+                </a:solidFill>
+                <a:latin typeface="+mn-lt"/>
+                <a:ea typeface="+mn-ea"/>
+                <a:cs typeface="+mn-cs"/>
+              </a:defRPr>
+            </a:lvl8pPr>
+            <a:lvl9pPr marL="3886200" indent="-228600" algn="l" defTabSz="457200" rtl="0" eaLnBrk="1" latinLnBrk="0" hangingPunct="1">
+              <a:spcBef>
+                <a:spcPct val="20000"/>
+              </a:spcBef>
+              <a:buFont typeface="Arial"/>
+              <a:buChar char="•"/>
+              <a:defRPr sz="2000" kern="1200">
+                <a:solidFill>
+                  <a:schemeClr val="tx1"/>
+                </a:solidFill>
+                <a:latin typeface="+mn-lt"/>
+                <a:ea typeface="+mn-ea"/>
+                <a:cs typeface="+mn-cs"/>
+              </a:defRPr>
+            </a:lvl9pPr>
+          </a:lstStyle>
+          <a:p>
+            <a:pPr marL="198900" indent="0" algn="just">
+              <a:buFont typeface="Arial"/>
+              <a:buNone/>
+            </a:pPr>
+            <a:endParaRPr lang="pl-PL" dirty="0" smtClean="0"/>
+          </a:p>
+          <a:p>
+            <a:pPr algn="just"/>
+            <a:r>
+              <a:rPr lang="pl-PL" sz="2400" dirty="0" smtClean="0"/>
+              <a:t>Wykorzystywany do testowania serwerowej strony aplikacji.</a:t>
+            </a:r>
+          </a:p>
+          <a:p>
+            <a:pPr algn="just"/>
+            <a:r>
+              <a:rPr lang="pl-PL" sz="2400" dirty="0" smtClean="0"/>
+              <a:t>Tworzy infrastrukturę bardzo zbliżoną do tej, która pojawia przy faktycznym uruchomieniu programu</a:t>
+            </a:r>
+          </a:p>
+          <a:p>
+            <a:pPr algn="just"/>
+            <a:r>
+              <a:rPr lang="pl-PL" sz="2400" dirty="0" smtClean="0"/>
+              <a:t>Główna zasada działania opiera się o </a:t>
+            </a:r>
+            <a:r>
+              <a:rPr lang="pl-PL" sz="2400" dirty="0" err="1" smtClean="0"/>
+              <a:t>mockowanie</a:t>
+            </a:r>
+            <a:r>
+              <a:rPr lang="pl-PL" sz="2400" dirty="0" smtClean="0"/>
+              <a:t> żądania i odpowiedzi HTTP, które przychodzą od „spring-test”.</a:t>
+            </a:r>
+          </a:p>
+          <a:p>
+            <a:pPr algn="just"/>
+            <a:r>
+              <a:rPr lang="pl-PL" sz="2400" dirty="0" smtClean="0"/>
+              <a:t>Testy nie wymagają uruchomionego kontenera </a:t>
+            </a:r>
+            <a:r>
+              <a:rPr lang="pl-PL" sz="2400" dirty="0" err="1" smtClean="0"/>
+              <a:t>servletu</a:t>
+            </a:r>
+            <a:endParaRPr lang="pl-PL" sz="2400" dirty="0" smtClean="0"/>
+          </a:p>
+          <a:p>
+            <a:pPr algn="just"/>
+            <a:r>
+              <a:rPr lang="pl-PL" sz="2400" dirty="0" smtClean="0"/>
+              <a:t>Podczas wykonywania testu żądania obsługuje </a:t>
+            </a:r>
+            <a:r>
+              <a:rPr lang="pl-PL" sz="2400" dirty="0" err="1" smtClean="0"/>
+              <a:t>Dispatcher</a:t>
+            </a:r>
+            <a:r>
+              <a:rPr lang="pl-PL" sz="2400" dirty="0" smtClean="0"/>
+              <a:t> </a:t>
+            </a:r>
+            <a:r>
+              <a:rPr lang="pl-PL" sz="2400" dirty="0" err="1" smtClean="0"/>
+              <a:t>Servlet</a:t>
+            </a:r>
+            <a:r>
+              <a:rPr lang="pl-PL" sz="2400" dirty="0" smtClean="0"/>
+              <a:t> lecz nie zostaje nawiązane  rzeczywiste połączenie sieciowe.</a:t>
+            </a:r>
+          </a:p>
+        </p:txBody>
+      </p:sp>
+    </p:spTree>
+    <p:extLst>
+      <p:ext uri="{BB962C8B-B14F-4D97-AF65-F5344CB8AC3E}">
+        <p14:creationId xmlns:p14="http://schemas.microsoft.com/office/powerpoint/2010/main" val="831594908"/>
+      </p:ext>
+    </p:extLst>
+  </p:cSld>
+  <p:clrMapOvr>
+    <a:masterClrMapping/>
+  </p:clrMapOvr>
+  <p:timing>
+    <p:tnLst>
+      <p:par>
+        <p:cTn id="1" dur="indefinite" restart="never" nodeType="tmRoot"/>
+      </p:par>
+    </p:tnLst>
+  </p:timing>
+</p:sld>
+</file>
+
+<file path=ppt/slides/slide17.xml><?xml version="1.0" encoding="utf-8"?>
+<p:sld xmlns:a="http://schemas.openxmlformats.org/drawingml/2006/main" xmlns:r="http://schemas.openxmlformats.org/officeDocument/2006/relationships" xmlns:p="http://schemas.openxmlformats.org/presentationml/2006/main">
+  <p:cSld>
+    <p:spTree>
+      <p:nvGrpSpPr>
+        <p:cNvPr id="1" name=""/>
+        <p:cNvGrpSpPr/>
+        <p:nvPr/>
+      </p:nvGrpSpPr>
+      <p:grpSpPr>
+        <a:xfrm>
+          <a:off x="0" y="0"/>
+          <a:ext cx="0" cy="0"/>
+          <a:chOff x="0" y="0"/>
+          <a:chExt cx="0" cy="0"/>
+        </a:xfrm>
+      </p:grpSpPr>
+      <p:sp>
+        <p:nvSpPr>
+          <p:cNvPr id="2" name="Tytuł 1"/>
+          <p:cNvSpPr>
+            <a:spLocks noGrp="1"/>
+          </p:cNvSpPr>
+          <p:nvPr>
+            <p:ph type="title"/>
+          </p:nvPr>
+        </p:nvSpPr>
+        <p:spPr/>
+        <p:txBody>
+          <a:bodyPr/>
+          <a:lstStyle/>
+          <a:p>
+            <a:r>
+              <a:rPr lang="en-US" dirty="0"/>
+              <a:t>Spring </a:t>
+            </a:r>
+            <a:r>
+              <a:rPr lang="en-US" dirty="0" err="1" smtClean="0"/>
+              <a:t>MockMVC</a:t>
+            </a:r>
+            <a:r>
+              <a:rPr lang="pl-PL" dirty="0" smtClean="0"/>
               <a:t> - Konfiguracja</a:t>
             </a:r>
             <a:r>
@@ -5917,7 +6128,7 @@
             </a:r>
             <a:r>
               <a:rPr lang="pl-PL" dirty="0" smtClean="0"/>
-              <a:t> – </a:t>
+              <a:t> </a:t>
             </a:r>
           </a:p>
           <a:p>
@@ -5942,7 +6153,11 @@
             </a:r>
             <a:r>
               <a:rPr lang="pl-PL" dirty="0" smtClean="0"/>
-              <a:t> -  </a:t>
+              <a:t> -  Uruchamia automatyczną konfiguracje </a:t>
+            </a:r>
+            <a:r>
+              <a:rPr lang="pl-PL" dirty="0" err="1" smtClean="0"/>
+              <a:t>MockMvc</a:t>
             </a:r>
             <a:endParaRPr lang="pl-PL" dirty="0"/>
           </a:p>
@@ -5968,7 +6183,411 @@
 </p:sld>
 </file>
 
-<file path=ppt/slides/slide17.xml><?xml version="1.0" encoding="utf-8"?>
+<file path=ppt/slides/slide18.xml><?xml version="1.0" encoding="utf-8"?>
+<p:sld xmlns:a="http://schemas.openxmlformats.org/drawingml/2006/main" xmlns:r="http://schemas.openxmlformats.org/officeDocument/2006/relationships" xmlns:p="http://schemas.openxmlformats.org/presentationml/2006/main">
+  <p:cSld>
+    <p:spTree>
+      <p:nvGrpSpPr>
+        <p:cNvPr id="1" name=""/>
+        <p:cNvGrpSpPr/>
+        <p:nvPr/>
+      </p:nvGrpSpPr>
+      <p:grpSpPr>
+        <a:xfrm>
+          <a:off x="0" y="0"/>
+          <a:ext cx="0" cy="0"/>
+          <a:chOff x="0" y="0"/>
+          <a:chExt cx="0" cy="0"/>
+        </a:xfrm>
+      </p:grpSpPr>
+      <p:sp>
+        <p:nvSpPr>
+          <p:cNvPr id="2" name="Tytuł 1"/>
+          <p:cNvSpPr>
+            <a:spLocks noGrp="1"/>
+          </p:cNvSpPr>
+          <p:nvPr>
+            <p:ph type="title"/>
+          </p:nvPr>
+        </p:nvSpPr>
+        <p:spPr/>
+        <p:txBody>
+          <a:bodyPr/>
+          <a:lstStyle/>
+          <a:p>
+            <a:r>
+              <a:rPr lang="en-US" dirty="0"/>
+              <a:t>Spring </a:t>
+            </a:r>
+            <a:r>
+              <a:rPr lang="en-US" dirty="0" err="1" smtClean="0"/>
+              <a:t>MockMVC</a:t>
+            </a:r>
+            <a:r>
+              <a:rPr lang="pl-PL" dirty="0" smtClean="0"/>
+              <a:t> - Konfiguracja</a:t>
+            </a:r>
+            <a:r>
+              <a:rPr lang="en-US" dirty="0" smtClean="0"/>
+              <a:t> </a:t>
+            </a:r>
+            <a:endParaRPr lang="pl-PL" dirty="0">
+              <a:latin typeface=""/>
+            </a:endParaRPr>
+          </a:p>
+        </p:txBody>
+      </p:sp>
+      <p:sp>
+        <p:nvSpPr>
+          <p:cNvPr id="4" name="pole tekstowe 3"/>
+          <p:cNvSpPr txBox="1"/>
+          <p:nvPr/>
+        </p:nvSpPr>
+        <p:spPr>
+          <a:xfrm>
+            <a:off x="862642" y="1233577"/>
+            <a:ext cx="6564701" cy="369332"/>
+          </a:xfrm>
+          <a:prstGeom prst="rect">
+            <a:avLst/>
+          </a:prstGeom>
+          <a:noFill/>
+        </p:spPr>
+        <p:txBody>
+          <a:bodyPr wrap="square" rtlCol="0">
+            <a:spAutoFit/>
+          </a:bodyPr>
+          <a:lstStyle/>
+          <a:p>
+            <a:endParaRPr lang="pl-PL" dirty="0"/>
+          </a:p>
+        </p:txBody>
+      </p:sp>
+      <p:sp>
+        <p:nvSpPr>
+          <p:cNvPr id="6" name="Symbol zastępczy tekstu 2"/>
+          <p:cNvSpPr txBox="1">
+            <a:spLocks/>
+          </p:cNvSpPr>
+          <p:nvPr/>
+        </p:nvSpPr>
+        <p:spPr>
+          <a:xfrm>
+            <a:off x="0" y="1228158"/>
+            <a:ext cx="9144000" cy="4846148"/>
+          </a:xfrm>
+          <a:prstGeom prst="rect">
+            <a:avLst/>
+          </a:prstGeom>
+        </p:spPr>
+        <p:txBody>
+          <a:bodyPr>
+            <a:normAutofit/>
+          </a:bodyPr>
+          <a:lstStyle>
+            <a:lvl1pPr marL="342900" indent="-342900" algn="l" defTabSz="457200" rtl="0" eaLnBrk="1" latinLnBrk="0" hangingPunct="1">
+              <a:spcBef>
+                <a:spcPct val="20000"/>
+              </a:spcBef>
+              <a:buFont typeface="Arial"/>
+              <a:buChar char="•"/>
+              <a:defRPr sz="3200" kern="1200">
+                <a:solidFill>
+                  <a:schemeClr val="tx1"/>
+                </a:solidFill>
+                <a:latin typeface="+mn-lt"/>
+                <a:ea typeface="+mn-ea"/>
+                <a:cs typeface="+mn-cs"/>
+              </a:defRPr>
+            </a:lvl1pPr>
+            <a:lvl2pPr marL="742950" indent="-285750" algn="l" defTabSz="457200" rtl="0" eaLnBrk="1" latinLnBrk="0" hangingPunct="1">
+              <a:spcBef>
+                <a:spcPct val="20000"/>
+              </a:spcBef>
+              <a:buFont typeface="Arial"/>
+              <a:buChar char="–"/>
+              <a:defRPr sz="2800" kern="1200">
+                <a:solidFill>
+                  <a:schemeClr val="tx1"/>
+                </a:solidFill>
+                <a:latin typeface="+mn-lt"/>
+                <a:ea typeface="+mn-ea"/>
+                <a:cs typeface="+mn-cs"/>
+              </a:defRPr>
+            </a:lvl2pPr>
+            <a:lvl3pPr marL="1143000" indent="-228600" algn="l" defTabSz="457200" rtl="0" eaLnBrk="1" latinLnBrk="0" hangingPunct="1">
+              <a:spcBef>
+                <a:spcPct val="20000"/>
+              </a:spcBef>
+              <a:buFont typeface="Arial"/>
+              <a:buChar char="•"/>
+              <a:defRPr sz="2400" kern="1200">
+                <a:solidFill>
+                  <a:schemeClr val="tx1"/>
+                </a:solidFill>
+                <a:latin typeface="+mn-lt"/>
+                <a:ea typeface="+mn-ea"/>
+                <a:cs typeface="+mn-cs"/>
+              </a:defRPr>
+            </a:lvl3pPr>
+            <a:lvl4pPr marL="1600200" indent="-228600" algn="l" defTabSz="457200" rtl="0" eaLnBrk="1" latinLnBrk="0" hangingPunct="1">
+              <a:spcBef>
+                <a:spcPct val="20000"/>
+              </a:spcBef>
+              <a:buFont typeface="Arial"/>
+              <a:buChar char="–"/>
+              <a:defRPr sz="2000" kern="1200">
+                <a:solidFill>
+                  <a:schemeClr val="tx1"/>
+                </a:solidFill>
+                <a:latin typeface="+mn-lt"/>
+                <a:ea typeface="+mn-ea"/>
+                <a:cs typeface="+mn-cs"/>
+              </a:defRPr>
+            </a:lvl4pPr>
+            <a:lvl5pPr marL="2057400" indent="-228600" algn="l" defTabSz="457200" rtl="0" eaLnBrk="1" latinLnBrk="0" hangingPunct="1">
+              <a:spcBef>
+                <a:spcPct val="20000"/>
+              </a:spcBef>
+              <a:buFont typeface="Arial"/>
+              <a:buChar char="»"/>
+              <a:defRPr sz="2000" kern="1200">
+                <a:solidFill>
+                  <a:schemeClr val="tx1"/>
+                </a:solidFill>
+                <a:latin typeface="+mn-lt"/>
+                <a:ea typeface="+mn-ea"/>
+                <a:cs typeface="+mn-cs"/>
+              </a:defRPr>
+            </a:lvl5pPr>
+            <a:lvl6pPr marL="2514600" indent="-228600" algn="l" defTabSz="457200" rtl="0" eaLnBrk="1" latinLnBrk="0" hangingPunct="1">
+              <a:spcBef>
+                <a:spcPct val="20000"/>
+              </a:spcBef>
+              <a:buFont typeface="Arial"/>
+              <a:buChar char="•"/>
+              <a:defRPr sz="2000" kern="1200">
+                <a:solidFill>
+                  <a:schemeClr val="tx1"/>
+                </a:solidFill>
+                <a:latin typeface="+mn-lt"/>
+                <a:ea typeface="+mn-ea"/>
+                <a:cs typeface="+mn-cs"/>
+              </a:defRPr>
+            </a:lvl6pPr>
+            <a:lvl7pPr marL="2971800" indent="-228600" algn="l" defTabSz="457200" rtl="0" eaLnBrk="1" latinLnBrk="0" hangingPunct="1">
+              <a:spcBef>
+                <a:spcPct val="20000"/>
+              </a:spcBef>
+              <a:buFont typeface="Arial"/>
+              <a:buChar char="•"/>
+              <a:defRPr sz="2000" kern="1200">
+                <a:solidFill>
+                  <a:schemeClr val="tx1"/>
+                </a:solidFill>
+                <a:latin typeface="+mn-lt"/>
+                <a:ea typeface="+mn-ea"/>
+                <a:cs typeface="+mn-cs"/>
+              </a:defRPr>
+            </a:lvl7pPr>
+            <a:lvl8pPr marL="3429000" indent="-228600" algn="l" defTabSz="457200" rtl="0" eaLnBrk="1" latinLnBrk="0" hangingPunct="1">
+              <a:spcBef>
+                <a:spcPct val="20000"/>
+              </a:spcBef>
+              <a:buFont typeface="Arial"/>
+              <a:buChar char="•"/>
+              <a:defRPr sz="2000" kern="1200">
+                <a:solidFill>
+                  <a:schemeClr val="tx1"/>
+                </a:solidFill>
+                <a:latin typeface="+mn-lt"/>
+                <a:ea typeface="+mn-ea"/>
+                <a:cs typeface="+mn-cs"/>
+              </a:defRPr>
+            </a:lvl8pPr>
+            <a:lvl9pPr marL="3886200" indent="-228600" algn="l" defTabSz="457200" rtl="0" eaLnBrk="1" latinLnBrk="0" hangingPunct="1">
+              <a:spcBef>
+                <a:spcPct val="20000"/>
+              </a:spcBef>
+              <a:buFont typeface="Arial"/>
+              <a:buChar char="•"/>
+              <a:defRPr sz="2000" kern="1200">
+                <a:solidFill>
+                  <a:schemeClr val="tx1"/>
+                </a:solidFill>
+                <a:latin typeface="+mn-lt"/>
+                <a:ea typeface="+mn-ea"/>
+                <a:cs typeface="+mn-cs"/>
+              </a:defRPr>
+            </a:lvl9pPr>
+          </a:lstStyle>
+          <a:p>
+            <a:pPr marL="198900" indent="0" algn="just">
+              <a:buFont typeface="Arial"/>
+              <a:buNone/>
+            </a:pPr>
+            <a:endParaRPr lang="pl-PL" dirty="0" smtClean="0"/>
+          </a:p>
+        </p:txBody>
+      </p:sp>
+      <p:sp>
+        <p:nvSpPr>
+          <p:cNvPr id="5" name="pole tekstowe 4"/>
+          <p:cNvSpPr txBox="1"/>
+          <p:nvPr/>
+        </p:nvSpPr>
+        <p:spPr>
+          <a:xfrm>
+            <a:off x="677173" y="1228158"/>
+            <a:ext cx="7789653" cy="2031325"/>
+          </a:xfrm>
+          <a:prstGeom prst="rect">
+            <a:avLst/>
+          </a:prstGeom>
+          <a:noFill/>
+        </p:spPr>
+        <p:txBody>
+          <a:bodyPr wrap="square" rtlCol="0">
+            <a:spAutoFit/>
+          </a:bodyPr>
+          <a:lstStyle/>
+          <a:p>
+            <a:pPr marL="285750" indent="-285750">
+              <a:buFont typeface="Arial" panose="020B0604020202020204" pitchFamily="34" charset="0"/>
+              <a:buChar char="•"/>
+            </a:pPr>
+            <a:r>
+              <a:rPr lang="pl-PL" dirty="0" smtClean="0"/>
+              <a:t>@</a:t>
+            </a:r>
+            <a:r>
+              <a:rPr lang="pl-PL" dirty="0" err="1" smtClean="0"/>
+              <a:t>RunWith</a:t>
+            </a:r>
+            <a:r>
+              <a:rPr lang="pl-PL" dirty="0" smtClean="0"/>
+              <a:t>(</a:t>
+            </a:r>
+            <a:r>
+              <a:rPr lang="pl-PL" dirty="0" err="1" smtClean="0"/>
+              <a:t>SpringRunner.class</a:t>
+            </a:r>
+            <a:r>
+              <a:rPr lang="pl-PL" dirty="0" smtClean="0"/>
+              <a:t>) – określa </a:t>
+            </a:r>
+            <a:r>
+              <a:rPr lang="pl-PL" dirty="0" err="1" smtClean="0"/>
+              <a:t>Runner</a:t>
+            </a:r>
+            <a:r>
+              <a:rPr lang="pl-PL" dirty="0" smtClean="0"/>
+              <a:t>, który ma być wykorzystywany przez </a:t>
+            </a:r>
+            <a:r>
+              <a:rPr lang="pl-PL" dirty="0" err="1" smtClean="0"/>
+              <a:t>Junit</a:t>
+            </a:r>
+            <a:r>
+              <a:rPr lang="pl-PL" dirty="0" smtClean="0"/>
+              <a:t>. Klasa </a:t>
+            </a:r>
+            <a:r>
+              <a:rPr lang="pl-PL" dirty="0" err="1" smtClean="0"/>
+              <a:t>SpringRunner</a:t>
+            </a:r>
+            <a:r>
+              <a:rPr lang="pl-PL" dirty="0" smtClean="0"/>
+              <a:t> jest aliasem </a:t>
+            </a:r>
+            <a:r>
+              <a:rPr lang="pl-PL" dirty="0"/>
+              <a:t>do </a:t>
+            </a:r>
+            <a:r>
+              <a:rPr lang="pl-PL" dirty="0" smtClean="0"/>
+              <a:t>SpringJUnit4ClassRunner. Umożliwia korzystanie z testowego kontekstu </a:t>
+            </a:r>
+            <a:r>
+              <a:rPr lang="pl-PL" dirty="0" err="1" smtClean="0"/>
+              <a:t>Springa</a:t>
+            </a:r>
+            <a:r>
+              <a:rPr lang="pl-PL" dirty="0" smtClean="0"/>
+              <a:t>.</a:t>
+            </a:r>
+          </a:p>
+          <a:p>
+            <a:pPr marL="285750" indent="-285750">
+              <a:buFont typeface="Arial" panose="020B0604020202020204" pitchFamily="34" charset="0"/>
+              <a:buChar char="•"/>
+            </a:pPr>
+            <a:r>
+              <a:rPr lang="pl-PL" dirty="0" smtClean="0"/>
+              <a:t>@</a:t>
+            </a:r>
+            <a:r>
+              <a:rPr lang="pl-PL" dirty="0" err="1" smtClean="0"/>
+              <a:t>SpringBootTest</a:t>
+            </a:r>
+            <a:r>
+              <a:rPr lang="pl-PL" dirty="0" smtClean="0"/>
+              <a:t> </a:t>
+            </a:r>
+          </a:p>
+          <a:p>
+            <a:pPr marL="285750" indent="-285750">
+              <a:buFont typeface="Arial" panose="020B0604020202020204" pitchFamily="34" charset="0"/>
+              <a:buChar char="•"/>
+            </a:pPr>
+            <a:endParaRPr lang="pl-PL" dirty="0"/>
+          </a:p>
+          <a:p>
+            <a:pPr marL="285750" indent="-285750">
+              <a:buFont typeface="Arial" panose="020B0604020202020204" pitchFamily="34" charset="0"/>
+              <a:buChar char="•"/>
+            </a:pPr>
+            <a:r>
+              <a:rPr lang="pl-PL" dirty="0" smtClean="0"/>
+              <a:t>@</a:t>
+            </a:r>
+            <a:r>
+              <a:rPr lang="pl-PL" dirty="0" err="1" smtClean="0"/>
+              <a:t>AutoConfigureMockMvc</a:t>
+            </a:r>
+            <a:r>
+              <a:rPr lang="pl-PL" dirty="0" smtClean="0"/>
+              <a:t> -  Uruchamia automatyczną konfiguracje </a:t>
+            </a:r>
+            <a:r>
+              <a:rPr lang="pl-PL" dirty="0" err="1" smtClean="0"/>
+              <a:t>MockMvc</a:t>
+            </a:r>
+            <a:endParaRPr lang="pl-PL" dirty="0"/>
+          </a:p>
+        </p:txBody>
+      </p:sp>
+    </p:spTree>
+    <p:extLst>
+      <p:ext uri="{BB962C8B-B14F-4D97-AF65-F5344CB8AC3E}">
+        <p14:creationId xmlns:p14="http://schemas.microsoft.com/office/powerpoint/2010/main" val="1819539165"/>
+      </p:ext>
+    </p:extLst>
+  </p:cSld>
+  <p:clrMapOvr>
+    <a:masterClrMapping/>
+  </p:clrMapOvr>
+  <p:timing>
+    <p:tnLst>
+      <p:par>
+        <p:cTn id="1" dur="indefinite" restart="never" nodeType="tmRoot"/>
+      </p:par>
+    </p:tnLst>
+  </p:timing>
+</p:sld>
+</file>
+
+<file path=ppt/slides/slide19.xml><?xml version="1.0" encoding="utf-8"?>
 <p:sld xmlns:a="http://schemas.openxmlformats.org/drawingml/2006/main" xmlns:r="http://schemas.openxmlformats.org/officeDocument/2006/relationships" xmlns:p="http://schemas.openxmlformats.org/presentationml/2006/main">
   <p:cSld>
     <p:spTree>

</xml_diff>

<commit_message>
Some updates in presentation
</commit_message>
<xml_diff>
--- a/Spring MVC.pptx
+++ b/Spring MVC.pptx
@@ -5,7 +5,7 @@
     <p:sldMasterId id="2147483648" r:id="rId1"/>
   </p:sldMasterIdLst>
   <p:notesMasterIdLst>
-    <p:notesMasterId r:id="rId21"/>
+    <p:notesMasterId r:id="rId22"/>
   </p:notesMasterIdLst>
   <p:sldIdLst>
     <p:sldId id="319" r:id="rId2"/>
@@ -20,13 +20,14 @@
     <p:sldId id="387" r:id="rId11"/>
     <p:sldId id="395" r:id="rId12"/>
     <p:sldId id="396" r:id="rId13"/>
-    <p:sldId id="403" r:id="rId14"/>
-    <p:sldId id="400" r:id="rId15"/>
-    <p:sldId id="398" r:id="rId16"/>
-    <p:sldId id="399" r:id="rId17"/>
-    <p:sldId id="401" r:id="rId18"/>
-    <p:sldId id="402" r:id="rId19"/>
-    <p:sldId id="386" r:id="rId20"/>
+    <p:sldId id="404" r:id="rId14"/>
+    <p:sldId id="403" r:id="rId15"/>
+    <p:sldId id="400" r:id="rId16"/>
+    <p:sldId id="398" r:id="rId17"/>
+    <p:sldId id="399" r:id="rId18"/>
+    <p:sldId id="401" r:id="rId19"/>
+    <p:sldId id="402" r:id="rId20"/>
+    <p:sldId id="386" r:id="rId21"/>
   </p:sldIdLst>
   <p:sldSz cx="9144000" cy="6858000" type="screen4x3"/>
   <p:notesSz cx="6858000" cy="9144000"/>
@@ -142,6 +143,7 @@
             <p14:sldId id="387"/>
             <p14:sldId id="395"/>
             <p14:sldId id="396"/>
+            <p14:sldId id="404"/>
             <p14:sldId id="403"/>
             <p14:sldId id="400"/>
             <p14:sldId id="398"/>
@@ -4401,44 +4403,6 @@
           </a:p>
         </p:txBody>
       </p:sp>
-      <p:sp>
-        <p:nvSpPr>
-          <p:cNvPr id="3" name="pole tekstowe 2"/>
-          <p:cNvSpPr txBox="1"/>
-          <p:nvPr/>
-        </p:nvSpPr>
-        <p:spPr>
-          <a:xfrm>
-            <a:off x="1285336" y="1733909"/>
-            <a:ext cx="1681229" cy="369332"/>
-          </a:xfrm>
-          <a:prstGeom prst="rect">
-            <a:avLst/>
-          </a:prstGeom>
-          <a:noFill/>
-        </p:spPr>
-        <p:txBody>
-          <a:bodyPr wrap="none" rtlCol="0">
-            <a:spAutoFit/>
-          </a:bodyPr>
-          <a:lstStyle/>
-          <a:p>
-            <a:r>
-              <a:rPr lang="pl-PL" dirty="0"/>
-              <a:t>@</a:t>
-            </a:r>
-            <a:r>
-              <a:rPr lang="pl-PL" dirty="0" err="1" smtClean="0"/>
-              <a:t>PathVariable</a:t>
-            </a:r>
-            <a:r>
-              <a:rPr lang="pl-PL" dirty="0" smtClean="0"/>
-              <a:t>  </a:t>
-            </a:r>
-            <a:endParaRPr lang="pl-PL" dirty="0"/>
-          </a:p>
-        </p:txBody>
-      </p:sp>
       <p:pic>
         <p:nvPicPr>
           <p:cNvPr id="4" name="Obraz 3"/>
@@ -4455,7 +4419,7 @@
         </p:blipFill>
         <p:spPr>
           <a:xfrm>
-            <a:off x="492976" y="3248834"/>
+            <a:off x="492976" y="2489710"/>
             <a:ext cx="8158048" cy="1159264"/>
           </a:xfrm>
           <a:prstGeom prst="rect">
@@ -4544,50 +4508,12 @@
           <a:lstStyle/>
           <a:p>
             <a:r>
-              <a:rPr lang="pl-PL" dirty="0"/>
+              <a:rPr lang="pl-PL" dirty="0" smtClean="0"/>
               <a:t>@</a:t>
             </a:r>
             <a:r>
-              <a:rPr lang="pl-PL" dirty="0" err="1"/>
-              <a:t>RequestMapping</a:t>
-            </a:r>
-            <a:endParaRPr lang="pl-PL" dirty="0"/>
-          </a:p>
-        </p:txBody>
-      </p:sp>
-      <p:sp>
-        <p:nvSpPr>
-          <p:cNvPr id="3" name="pole tekstowe 2"/>
-          <p:cNvSpPr txBox="1"/>
-          <p:nvPr/>
-        </p:nvSpPr>
-        <p:spPr>
-          <a:xfrm>
-            <a:off x="1285336" y="1733909"/>
-            <a:ext cx="2109680" cy="369332"/>
-          </a:xfrm>
-          <a:prstGeom prst="rect">
-            <a:avLst/>
-          </a:prstGeom>
-          <a:noFill/>
-        </p:spPr>
-        <p:txBody>
-          <a:bodyPr wrap="none" rtlCol="0">
-            <a:spAutoFit/>
-          </a:bodyPr>
-          <a:lstStyle/>
-          <a:p>
-            <a:r>
-              <a:rPr lang="pl-PL" dirty="0"/>
-              <a:t>@</a:t>
-            </a:r>
-            <a:r>
-              <a:rPr lang="pl-PL" dirty="0" err="1"/>
-              <a:t>RequestMapping</a:t>
-            </a:r>
-            <a:r>
-              <a:rPr lang="pl-PL" dirty="0" smtClean="0"/>
-              <a:t>- </a:t>
+              <a:rPr lang="pl-PL" dirty="0" err="1" smtClean="0"/>
+              <a:t>RequestParam</a:t>
             </a:r>
             <a:endParaRPr lang="pl-PL" dirty="0"/>
           </a:p>
@@ -4637,7 +4563,7 @@
         </p:blipFill>
         <p:spPr>
           <a:xfrm>
-            <a:off x="552405" y="3254135"/>
+            <a:off x="552404" y="2278532"/>
             <a:ext cx="8039190" cy="1254142"/>
           </a:xfrm>
           <a:prstGeom prst="rect">
@@ -4699,7 +4625,11 @@
           <a:p>
             <a:r>
               <a:rPr lang="pl-PL" dirty="0" smtClean="0"/>
-              <a:t>Uruchomienie Aplikacji</a:t>
+              <a:t>@</a:t>
+            </a:r>
+            <a:r>
+              <a:rPr lang="pl-PL" dirty="0" err="1" smtClean="0"/>
+              <a:t>ResponseBody</a:t>
             </a:r>
             <a:endParaRPr lang="pl-PL" dirty="0"/>
           </a:p>
@@ -4713,8 +4643,8 @@
         </p:nvSpPr>
         <p:spPr>
           <a:xfrm>
-            <a:off x="465826" y="1043796"/>
-            <a:ext cx="8212347" cy="1477328"/>
+            <a:off x="120771" y="1871932"/>
+            <a:ext cx="7315200" cy="646331"/>
           </a:xfrm>
           <a:prstGeom prst="rect">
             <a:avLst/>
@@ -4728,139 +4658,16 @@
           <a:lstStyle/>
           <a:p>
             <a:r>
-              <a:rPr lang="pl-PL" dirty="0" smtClean="0"/>
-              <a:t>Uruchomienie Aplikacji : </a:t>
-            </a:r>
-          </a:p>
-          <a:p>
-            <a:pPr marL="285750" indent="-285750">
-              <a:buFont typeface="Arial" panose="020B0604020202020204" pitchFamily="34" charset="0"/>
-              <a:buChar char="•"/>
-            </a:pPr>
-            <a:r>
-              <a:rPr lang="pl-PL" dirty="0" err="1" smtClean="0"/>
-              <a:t>mvnw</a:t>
-            </a:r>
-            <a:r>
-              <a:rPr lang="pl-PL" dirty="0" smtClean="0"/>
-              <a:t> </a:t>
-            </a:r>
-            <a:r>
-              <a:rPr lang="pl-PL" dirty="0" err="1" smtClean="0"/>
-              <a:t>spring-boot:run</a:t>
-            </a:r>
-            <a:endParaRPr lang="pl-PL" dirty="0" smtClean="0"/>
-          </a:p>
-          <a:p>
-            <a:r>
-              <a:rPr lang="pl-PL" dirty="0" err="1" smtClean="0"/>
-              <a:t>Debug</a:t>
-            </a:r>
-            <a:r>
-              <a:rPr lang="pl-PL" dirty="0" smtClean="0"/>
-              <a:t>: </a:t>
-            </a:r>
-          </a:p>
-          <a:p>
-            <a:pPr marL="285750" indent="-285750">
-              <a:buFont typeface="Arial" panose="020B0604020202020204" pitchFamily="34" charset="0"/>
-              <a:buChar char="•"/>
-            </a:pPr>
-            <a:r>
-              <a:rPr lang="pl-PL" dirty="0" err="1"/>
-              <a:t>mvn</a:t>
-            </a:r>
-            <a:r>
               <a:rPr lang="pl-PL" dirty="0"/>
-              <a:t> </a:t>
-            </a:r>
-            <a:r>
-              <a:rPr lang="pl-PL" dirty="0" err="1"/>
-              <a:t>spring-boot:run</a:t>
-            </a:r>
-            <a:r>
-              <a:rPr lang="pl-PL" dirty="0"/>
-              <a:t> -</a:t>
-            </a:r>
-            <a:r>
-              <a:rPr lang="pl-PL" dirty="0" err="1"/>
-              <a:t>Drun.jvmArguments</a:t>
-            </a:r>
-            <a:r>
-              <a:rPr lang="pl-PL" dirty="0"/>
-              <a:t>="-</a:t>
-            </a:r>
-            <a:r>
-              <a:rPr lang="pl-PL" dirty="0" err="1"/>
-              <a:t>Xdebug</a:t>
-            </a:r>
-            <a:r>
-              <a:rPr lang="pl-PL" dirty="0"/>
-              <a:t> -</a:t>
-            </a:r>
-            <a:r>
-              <a:rPr lang="pl-PL" dirty="0" err="1"/>
-              <a:t>Xrunjdwp:transport</a:t>
-            </a:r>
-            <a:r>
-              <a:rPr lang="pl-PL" dirty="0"/>
-              <a:t>=</a:t>
-            </a:r>
-            <a:r>
-              <a:rPr lang="pl-PL" dirty="0" err="1"/>
-              <a:t>dt_socket,server</a:t>
-            </a:r>
-            <a:r>
-              <a:rPr lang="pl-PL" dirty="0"/>
-              <a:t>=</a:t>
-            </a:r>
-            <a:r>
-              <a:rPr lang="pl-PL" dirty="0" err="1"/>
-              <a:t>y,suspend</a:t>
-            </a:r>
-            <a:r>
-              <a:rPr lang="pl-PL" dirty="0"/>
-              <a:t>=</a:t>
-            </a:r>
-            <a:r>
-              <a:rPr lang="pl-PL" dirty="0" err="1"/>
-              <a:t>y,address</a:t>
-            </a:r>
-            <a:r>
-              <a:rPr lang="pl-PL" dirty="0"/>
-              <a:t>=5005"</a:t>
-            </a:r>
-          </a:p>
-        </p:txBody>
-      </p:sp>
-      <p:pic>
-        <p:nvPicPr>
-          <p:cNvPr id="8" name="Obraz 7"/>
-          <p:cNvPicPr>
-            <a:picLocks noChangeAspect="1"/>
-          </p:cNvPicPr>
-          <p:nvPr/>
-        </p:nvPicPr>
-        <p:blipFill>
-          <a:blip r:embed="rId2"/>
-          <a:stretch>
-            <a:fillRect/>
-          </a:stretch>
-        </p:blipFill>
-        <p:spPr>
-          <a:xfrm>
-            <a:off x="833009" y="2598762"/>
-            <a:ext cx="7477980" cy="3701971"/>
-          </a:xfrm>
-          <a:prstGeom prst="rect">
-            <a:avLst/>
-          </a:prstGeom>
-        </p:spPr>
-      </p:pic>
+              <a:t>http://stackoverflow.com/questions/11291933/requestbody-and-responsebody-annotations-in-spring</a:t>
+            </a:r>
+          </a:p>
+        </p:txBody>
+      </p:sp>
     </p:spTree>
     <p:extLst>
       <p:ext uri="{BB962C8B-B14F-4D97-AF65-F5344CB8AC3E}">
-        <p14:creationId xmlns:p14="http://schemas.microsoft.com/office/powerpoint/2010/main" val="2638960368"/>
+        <p14:creationId xmlns:p14="http://schemas.microsoft.com/office/powerpoint/2010/main" val="1652652966"/>
       </p:ext>
     </p:extLst>
   </p:cSld>
@@ -4911,326 +4718,147 @@
           <a:p>
             <a:r>
               <a:rPr lang="pl-PL" dirty="0" smtClean="0"/>
-              <a:t>REST </a:t>
-            </a:r>
+              <a:t>Uruchomienie/Debugowanie </a:t>
+            </a:r>
+            <a:r>
+              <a:rPr lang="pl-PL" dirty="0" smtClean="0"/>
+              <a:t>Aplikacji</a:t>
+            </a:r>
+            <a:endParaRPr lang="pl-PL" dirty="0"/>
+          </a:p>
+        </p:txBody>
+      </p:sp>
+      <p:sp>
+        <p:nvSpPr>
+          <p:cNvPr id="3" name="pole tekstowe 2"/>
+          <p:cNvSpPr txBox="1"/>
+          <p:nvPr/>
+        </p:nvSpPr>
+        <p:spPr>
+          <a:xfrm>
+            <a:off x="465826" y="1043796"/>
+            <a:ext cx="8212347" cy="1477328"/>
+          </a:xfrm>
+          <a:prstGeom prst="rect">
+            <a:avLst/>
+          </a:prstGeom>
+          <a:noFill/>
+        </p:spPr>
+        <p:txBody>
+          <a:bodyPr wrap="square" rtlCol="0">
+            <a:spAutoFit/>
+          </a:bodyPr>
+          <a:lstStyle/>
+          <a:p>
+            <a:r>
+              <a:rPr lang="pl-PL" dirty="0" smtClean="0"/>
+              <a:t>Uruchomienie Aplikacji : </a:t>
+            </a:r>
+          </a:p>
+          <a:p>
+            <a:pPr marL="285750" indent="-285750">
+              <a:buFont typeface="Arial" panose="020B0604020202020204" pitchFamily="34" charset="0"/>
+              <a:buChar char="•"/>
+            </a:pPr>
             <a:r>
               <a:rPr lang="pl-PL" dirty="0" err="1" smtClean="0"/>
-              <a:t>Template</a:t>
-            </a:r>
-            <a:endParaRPr lang="pl-PL" dirty="0"/>
-          </a:p>
-        </p:txBody>
-      </p:sp>
-      <p:sp>
-        <p:nvSpPr>
-          <p:cNvPr id="8" name="Symbol zastępczy tekstu 2"/>
-          <p:cNvSpPr txBox="1">
-            <a:spLocks/>
-          </p:cNvSpPr>
-          <p:nvPr/>
-        </p:nvSpPr>
-        <p:spPr>
-          <a:xfrm>
-            <a:off x="0" y="1228158"/>
-            <a:ext cx="9144000" cy="4846148"/>
-          </a:xfrm>
-          <a:prstGeom prst="rect">
-            <a:avLst/>
-          </a:prstGeom>
-        </p:spPr>
-        <p:txBody>
-          <a:bodyPr>
-            <a:normAutofit/>
-          </a:bodyPr>
-          <a:lstStyle>
-            <a:lvl1pPr marL="342900" indent="-342900" algn="l" defTabSz="457200" rtl="0" eaLnBrk="1" latinLnBrk="0" hangingPunct="1">
-              <a:spcBef>
-                <a:spcPct val="20000"/>
-              </a:spcBef>
-              <a:buFont typeface="Arial"/>
+              <a:t>mvnw</a:t>
+            </a:r>
+            <a:r>
+              <a:rPr lang="pl-PL" dirty="0" smtClean="0"/>
+              <a:t> </a:t>
+            </a:r>
+            <a:r>
+              <a:rPr lang="pl-PL" dirty="0" err="1" smtClean="0"/>
+              <a:t>spring-boot:run</a:t>
+            </a:r>
+            <a:endParaRPr lang="pl-PL" dirty="0" smtClean="0"/>
+          </a:p>
+          <a:p>
+            <a:r>
+              <a:rPr lang="pl-PL" dirty="0" err="1" smtClean="0"/>
+              <a:t>Debug</a:t>
+            </a:r>
+            <a:r>
+              <a:rPr lang="pl-PL" dirty="0" smtClean="0"/>
+              <a:t>: </a:t>
+            </a:r>
+          </a:p>
+          <a:p>
+            <a:pPr marL="285750" indent="-285750">
+              <a:buFont typeface="Arial" panose="020B0604020202020204" pitchFamily="34" charset="0"/>
               <a:buChar char="•"/>
-              <a:defRPr sz="3200" kern="1200">
-                <a:solidFill>
-                  <a:schemeClr val="tx1"/>
-                </a:solidFill>
-                <a:latin typeface="+mn-lt"/>
-                <a:ea typeface="+mn-ea"/>
-                <a:cs typeface="+mn-cs"/>
-              </a:defRPr>
-            </a:lvl1pPr>
-            <a:lvl2pPr marL="742950" indent="-285750" algn="l" defTabSz="457200" rtl="0" eaLnBrk="1" latinLnBrk="0" hangingPunct="1">
-              <a:spcBef>
-                <a:spcPct val="20000"/>
-              </a:spcBef>
-              <a:buFont typeface="Arial"/>
-              <a:buChar char="–"/>
-              <a:defRPr sz="2800" kern="1200">
-                <a:solidFill>
-                  <a:schemeClr val="tx1"/>
-                </a:solidFill>
-                <a:latin typeface="+mn-lt"/>
-                <a:ea typeface="+mn-ea"/>
-                <a:cs typeface="+mn-cs"/>
-              </a:defRPr>
-            </a:lvl2pPr>
-            <a:lvl3pPr marL="1143000" indent="-228600" algn="l" defTabSz="457200" rtl="0" eaLnBrk="1" latinLnBrk="0" hangingPunct="1">
-              <a:spcBef>
-                <a:spcPct val="20000"/>
-              </a:spcBef>
-              <a:buFont typeface="Arial"/>
-              <a:buChar char="•"/>
-              <a:defRPr sz="2400" kern="1200">
-                <a:solidFill>
-                  <a:schemeClr val="tx1"/>
-                </a:solidFill>
-                <a:latin typeface="+mn-lt"/>
-                <a:ea typeface="+mn-ea"/>
-                <a:cs typeface="+mn-cs"/>
-              </a:defRPr>
-            </a:lvl3pPr>
-            <a:lvl4pPr marL="1600200" indent="-228600" algn="l" defTabSz="457200" rtl="0" eaLnBrk="1" latinLnBrk="0" hangingPunct="1">
-              <a:spcBef>
-                <a:spcPct val="20000"/>
-              </a:spcBef>
-              <a:buFont typeface="Arial"/>
-              <a:buChar char="–"/>
-              <a:defRPr sz="2000" kern="1200">
-                <a:solidFill>
-                  <a:schemeClr val="tx1"/>
-                </a:solidFill>
-                <a:latin typeface="+mn-lt"/>
-                <a:ea typeface="+mn-ea"/>
-                <a:cs typeface="+mn-cs"/>
-              </a:defRPr>
-            </a:lvl4pPr>
-            <a:lvl5pPr marL="2057400" indent="-228600" algn="l" defTabSz="457200" rtl="0" eaLnBrk="1" latinLnBrk="0" hangingPunct="1">
-              <a:spcBef>
-                <a:spcPct val="20000"/>
-              </a:spcBef>
-              <a:buFont typeface="Arial"/>
-              <a:buChar char="»"/>
-              <a:defRPr sz="2000" kern="1200">
-                <a:solidFill>
-                  <a:schemeClr val="tx1"/>
-                </a:solidFill>
-                <a:latin typeface="+mn-lt"/>
-                <a:ea typeface="+mn-ea"/>
-                <a:cs typeface="+mn-cs"/>
-              </a:defRPr>
-            </a:lvl5pPr>
-            <a:lvl6pPr marL="2514600" indent="-228600" algn="l" defTabSz="457200" rtl="0" eaLnBrk="1" latinLnBrk="0" hangingPunct="1">
-              <a:spcBef>
-                <a:spcPct val="20000"/>
-              </a:spcBef>
-              <a:buFont typeface="Arial"/>
-              <a:buChar char="•"/>
-              <a:defRPr sz="2000" kern="1200">
-                <a:solidFill>
-                  <a:schemeClr val="tx1"/>
-                </a:solidFill>
-                <a:latin typeface="+mn-lt"/>
-                <a:ea typeface="+mn-ea"/>
-                <a:cs typeface="+mn-cs"/>
-              </a:defRPr>
-            </a:lvl6pPr>
-            <a:lvl7pPr marL="2971800" indent="-228600" algn="l" defTabSz="457200" rtl="0" eaLnBrk="1" latinLnBrk="0" hangingPunct="1">
-              <a:spcBef>
-                <a:spcPct val="20000"/>
-              </a:spcBef>
-              <a:buFont typeface="Arial"/>
-              <a:buChar char="•"/>
-              <a:defRPr sz="2000" kern="1200">
-                <a:solidFill>
-                  <a:schemeClr val="tx1"/>
-                </a:solidFill>
-                <a:latin typeface="+mn-lt"/>
-                <a:ea typeface="+mn-ea"/>
-                <a:cs typeface="+mn-cs"/>
-              </a:defRPr>
-            </a:lvl7pPr>
-            <a:lvl8pPr marL="3429000" indent="-228600" algn="l" defTabSz="457200" rtl="0" eaLnBrk="1" latinLnBrk="0" hangingPunct="1">
-              <a:spcBef>
-                <a:spcPct val="20000"/>
-              </a:spcBef>
-              <a:buFont typeface="Arial"/>
-              <a:buChar char="•"/>
-              <a:defRPr sz="2000" kern="1200">
-                <a:solidFill>
-                  <a:schemeClr val="tx1"/>
-                </a:solidFill>
-                <a:latin typeface="+mn-lt"/>
-                <a:ea typeface="+mn-ea"/>
-                <a:cs typeface="+mn-cs"/>
-              </a:defRPr>
-            </a:lvl8pPr>
-            <a:lvl9pPr marL="3886200" indent="-228600" algn="l" defTabSz="457200" rtl="0" eaLnBrk="1" latinLnBrk="0" hangingPunct="1">
-              <a:spcBef>
-                <a:spcPct val="20000"/>
-              </a:spcBef>
-              <a:buFont typeface="Arial"/>
-              <a:buChar char="•"/>
-              <a:defRPr sz="2000" kern="1200">
-                <a:solidFill>
-                  <a:schemeClr val="tx1"/>
-                </a:solidFill>
-                <a:latin typeface="+mn-lt"/>
-                <a:ea typeface="+mn-ea"/>
-                <a:cs typeface="+mn-cs"/>
-              </a:defRPr>
-            </a:lvl9pPr>
-          </a:lstStyle>
-          <a:p>
-            <a:pPr marL="198900" indent="0" algn="just">
-              <a:buFont typeface="Arial"/>
-              <a:buNone/>
             </a:pPr>
-            <a:endParaRPr lang="pl-PL" dirty="0" smtClean="0"/>
-          </a:p>
-          <a:p>
-            <a:pPr algn="just"/>
-            <a:r>
-              <a:rPr lang="pl-PL" sz="1800" dirty="0">
-                <a:solidFill>
-                  <a:srgbClr val="2D3E5C"/>
-                </a:solidFill>
-                <a:latin typeface=""/>
-              </a:rPr>
-              <a:t>Klasa wykorzystywana po stronie klienta do komunikacji </a:t>
-            </a:r>
-            <a:r>
-              <a:rPr lang="pl-PL" sz="1800" dirty="0" smtClean="0">
-                <a:solidFill>
-                  <a:srgbClr val="2D3E5C"/>
-                </a:solidFill>
-                <a:latin typeface=""/>
-              </a:rPr>
-              <a:t>serwerem </a:t>
-            </a:r>
-            <a:r>
-              <a:rPr lang="pl-PL" sz="1800" dirty="0">
-                <a:solidFill>
-                  <a:srgbClr val="2D3E5C"/>
-                </a:solidFill>
-                <a:latin typeface=""/>
-              </a:rPr>
-              <a:t>za pomocą protokołu HTTP</a:t>
-            </a:r>
-            <a:r>
-              <a:rPr lang="pl-PL" sz="1800" dirty="0" smtClean="0">
-                <a:solidFill>
-                  <a:srgbClr val="2D3E5C"/>
-                </a:solidFill>
-                <a:latin typeface=""/>
-              </a:rPr>
-              <a:t>.</a:t>
-            </a:r>
-          </a:p>
-          <a:p>
-            <a:pPr marL="0" indent="0" algn="just">
-              <a:buNone/>
-            </a:pPr>
-            <a:endParaRPr lang="pl-PL" sz="1800" dirty="0" smtClean="0">
-              <a:solidFill>
-                <a:srgbClr val="2D3E5C"/>
-              </a:solidFill>
-              <a:latin typeface=""/>
-            </a:endParaRPr>
-          </a:p>
-          <a:p>
-            <a:pPr algn="just"/>
-            <a:r>
-              <a:rPr lang="pl-PL" sz="1800" dirty="0">
-                <a:solidFill>
-                  <a:srgbClr val="2D3E5C"/>
-                </a:solidFill>
-                <a:latin typeface=""/>
-              </a:rPr>
-              <a:t>Żądania GET z wykorzystaniem metody </a:t>
-            </a:r>
-            <a:r>
-              <a:rPr lang="pl-PL" sz="1800" dirty="0" smtClean="0">
-                <a:solidFill>
-                  <a:srgbClr val="2D3E5C"/>
-                </a:solidFill>
-                <a:latin typeface=""/>
-              </a:rPr>
-              <a:t>„exchange”:</a:t>
-            </a:r>
-          </a:p>
-          <a:p>
-            <a:pPr algn="just"/>
-            <a:endParaRPr lang="pl-PL" sz="1800" dirty="0">
-              <a:solidFill>
-                <a:srgbClr val="2D3E5C"/>
-              </a:solidFill>
-              <a:latin typeface=""/>
-            </a:endParaRPr>
-          </a:p>
-          <a:p>
-            <a:pPr algn="just"/>
-            <a:endParaRPr lang="pl-PL" sz="1800" dirty="0">
-              <a:solidFill>
-                <a:srgbClr val="2D3E5C"/>
-              </a:solidFill>
-              <a:latin typeface=""/>
-            </a:endParaRPr>
-          </a:p>
-          <a:p>
-            <a:pPr algn="just"/>
-            <a:endParaRPr lang="pl-PL" sz="1800" dirty="0">
-              <a:solidFill>
-                <a:srgbClr val="2D3E5C"/>
-              </a:solidFill>
-              <a:latin typeface=""/>
-            </a:endParaRPr>
-          </a:p>
-          <a:p>
-            <a:pPr algn="just"/>
-            <a:endParaRPr lang="pl-PL" dirty="0" smtClean="0"/>
-          </a:p>
-          <a:p>
-            <a:pPr marL="0" indent="0" algn="just">
-              <a:buNone/>
-            </a:pPr>
-            <a:r>
-              <a:rPr lang="pl-PL" sz="1800" dirty="0" smtClean="0">
-                <a:solidFill>
-                  <a:srgbClr val="2D3E5C"/>
-                </a:solidFill>
-                <a:latin typeface=""/>
-              </a:rPr>
-              <a:t>      REST </a:t>
-            </a:r>
-            <a:r>
-              <a:rPr lang="pl-PL" sz="1800" dirty="0" err="1" smtClean="0">
-                <a:solidFill>
-                  <a:srgbClr val="2D3E5C"/>
-                </a:solidFill>
-                <a:latin typeface=""/>
-              </a:rPr>
-              <a:t>Template</a:t>
-            </a:r>
-            <a:r>
-              <a:rPr lang="pl-PL" sz="1800" dirty="0" smtClean="0">
-                <a:solidFill>
-                  <a:srgbClr val="2D3E5C"/>
-                </a:solidFill>
-                <a:latin typeface=""/>
-              </a:rPr>
-              <a:t> :</a:t>
-            </a:r>
-            <a:endParaRPr lang="pl-PL" sz="1800" dirty="0">
-              <a:solidFill>
-                <a:srgbClr val="2D3E5C"/>
-              </a:solidFill>
-              <a:latin typeface=""/>
-            </a:endParaRPr>
+            <a:r>
+              <a:rPr lang="pl-PL" dirty="0" err="1"/>
+              <a:t>mvn</a:t>
+            </a:r>
+            <a:r>
+              <a:rPr lang="pl-PL" dirty="0"/>
+              <a:t> </a:t>
+            </a:r>
+            <a:r>
+              <a:rPr lang="pl-PL" dirty="0" err="1"/>
+              <a:t>spring-boot:run</a:t>
+            </a:r>
+            <a:r>
+              <a:rPr lang="pl-PL" dirty="0"/>
+              <a:t> -</a:t>
+            </a:r>
+            <a:r>
+              <a:rPr lang="pl-PL" dirty="0" err="1"/>
+              <a:t>Drun.jvmArguments</a:t>
+            </a:r>
+            <a:r>
+              <a:rPr lang="pl-PL" dirty="0"/>
+              <a:t>="-</a:t>
+            </a:r>
+            <a:r>
+              <a:rPr lang="pl-PL" dirty="0" err="1"/>
+              <a:t>Xdebug</a:t>
+            </a:r>
+            <a:r>
+              <a:rPr lang="pl-PL" dirty="0"/>
+              <a:t> -</a:t>
+            </a:r>
+            <a:r>
+              <a:rPr lang="pl-PL" dirty="0" err="1"/>
+              <a:t>Xrunjdwp:transport</a:t>
+            </a:r>
+            <a:r>
+              <a:rPr lang="pl-PL" dirty="0"/>
+              <a:t>=</a:t>
+            </a:r>
+            <a:r>
+              <a:rPr lang="pl-PL" dirty="0" err="1"/>
+              <a:t>dt_socket,server</a:t>
+            </a:r>
+            <a:r>
+              <a:rPr lang="pl-PL" dirty="0"/>
+              <a:t>=</a:t>
+            </a:r>
+            <a:r>
+              <a:rPr lang="pl-PL" dirty="0" err="1"/>
+              <a:t>y,suspend</a:t>
+            </a:r>
+            <a:r>
+              <a:rPr lang="pl-PL" dirty="0"/>
+              <a:t>=</a:t>
+            </a:r>
+            <a:r>
+              <a:rPr lang="pl-PL" dirty="0" err="1"/>
+              <a:t>y,address</a:t>
+            </a:r>
+            <a:r>
+              <a:rPr lang="pl-PL" dirty="0"/>
+              <a:t>=5005"</a:t>
+            </a:r>
           </a:p>
         </p:txBody>
       </p:sp>
       <p:pic>
         <p:nvPicPr>
-          <p:cNvPr id="3" name="Obraz 2"/>
+          <p:cNvPr id="8" name="Obraz 7"/>
           <p:cNvPicPr>
             <a:picLocks noChangeAspect="1"/>
           </p:cNvPicPr>
@@ -5244,32 +4872,8 @@
         </p:blipFill>
         <p:spPr>
           <a:xfrm>
-            <a:off x="392905" y="5193632"/>
-            <a:ext cx="8358188" cy="779480"/>
-          </a:xfrm>
-          <a:prstGeom prst="rect">
-            <a:avLst/>
-          </a:prstGeom>
-        </p:spPr>
-      </p:pic>
-      <p:pic>
-        <p:nvPicPr>
-          <p:cNvPr id="4" name="Obraz 3"/>
-          <p:cNvPicPr>
-            <a:picLocks noChangeAspect="1"/>
-          </p:cNvPicPr>
-          <p:nvPr/>
-        </p:nvPicPr>
-        <p:blipFill>
-          <a:blip r:embed="rId3"/>
-          <a:stretch>
-            <a:fillRect/>
-          </a:stretch>
-        </p:blipFill>
-        <p:spPr>
-          <a:xfrm>
-            <a:off x="452391" y="3444198"/>
-            <a:ext cx="8239216" cy="971550"/>
+            <a:off x="833009" y="2598762"/>
+            <a:ext cx="7477980" cy="3701971"/>
           </a:xfrm>
           <a:prstGeom prst="rect">
             <a:avLst/>
@@ -5279,7 +4883,7 @@
     </p:spTree>
     <p:extLst>
       <p:ext uri="{BB962C8B-B14F-4D97-AF65-F5344CB8AC3E}">
-        <p14:creationId xmlns:p14="http://schemas.microsoft.com/office/powerpoint/2010/main" val="3204976087"/>
+        <p14:creationId xmlns:p14="http://schemas.microsoft.com/office/powerpoint/2010/main" val="2638960368"/>
       </p:ext>
     </p:extLst>
   </p:cSld>
@@ -5315,7 +4919,7 @@
       </p:grpSpPr>
       <p:sp>
         <p:nvSpPr>
-          <p:cNvPr id="7" name="Tytuł 6"/>
+          <p:cNvPr id="2" name="Tytuł 1"/>
           <p:cNvSpPr>
             <a:spLocks noGrp="1"/>
           </p:cNvSpPr>
@@ -5328,87 +4932,377 @@
           <a:bodyPr/>
           <a:lstStyle/>
           <a:p>
-            <a:endParaRPr lang="pl-PL"/>
-          </a:p>
-        </p:txBody>
-      </p:sp>
-      <p:sp>
-        <p:nvSpPr>
-          <p:cNvPr id="3" name="Symbol zastępczy tekstu 2"/>
-          <p:cNvSpPr>
-            <a:spLocks noGrp="1"/>
+            <a:r>
+              <a:rPr lang="pl-PL" dirty="0" smtClean="0"/>
+              <a:t>REST </a:t>
+            </a:r>
+            <a:r>
+              <a:rPr lang="pl-PL" dirty="0" err="1" smtClean="0"/>
+              <a:t>Template</a:t>
+            </a:r>
+            <a:endParaRPr lang="pl-PL" dirty="0"/>
+          </a:p>
+        </p:txBody>
+      </p:sp>
+      <p:sp>
+        <p:nvSpPr>
+          <p:cNvPr id="8" name="Symbol zastępczy tekstu 2"/>
+          <p:cNvSpPr txBox="1">
+            <a:spLocks/>
           </p:cNvSpPr>
-          <p:nvPr>
-            <p:ph type="body" sz="quarter" idx="10"/>
-          </p:nvPr>
-        </p:nvSpPr>
-        <p:spPr>
+          <p:nvPr/>
+        </p:nvSpPr>
+        <p:spPr>
+          <a:xfrm>
+            <a:off x="0" y="1228158"/>
+            <a:ext cx="9144000" cy="4846148"/>
+          </a:xfrm>
           <a:prstGeom prst="rect">
             <a:avLst/>
           </a:prstGeom>
         </p:spPr>
         <p:txBody>
           <a:bodyPr>
-            <a:noAutofit/>
+            <a:normAutofit/>
           </a:bodyPr>
-          <a:lstStyle/>
-          <a:p>
-            <a:pPr marL="198900" indent="0">
+          <a:lstStyle>
+            <a:lvl1pPr marL="342900" indent="-342900" algn="l" defTabSz="457200" rtl="0" eaLnBrk="1" latinLnBrk="0" hangingPunct="1">
+              <a:spcBef>
+                <a:spcPct val="20000"/>
+              </a:spcBef>
+              <a:buFont typeface="Arial"/>
+              <a:buChar char="•"/>
+              <a:defRPr sz="3200" kern="1200">
+                <a:solidFill>
+                  <a:schemeClr val="tx1"/>
+                </a:solidFill>
+                <a:latin typeface="+mn-lt"/>
+                <a:ea typeface="+mn-ea"/>
+                <a:cs typeface="+mn-cs"/>
+              </a:defRPr>
+            </a:lvl1pPr>
+            <a:lvl2pPr marL="742950" indent="-285750" algn="l" defTabSz="457200" rtl="0" eaLnBrk="1" latinLnBrk="0" hangingPunct="1">
+              <a:spcBef>
+                <a:spcPct val="20000"/>
+              </a:spcBef>
+              <a:buFont typeface="Arial"/>
+              <a:buChar char="–"/>
+              <a:defRPr sz="2800" kern="1200">
+                <a:solidFill>
+                  <a:schemeClr val="tx1"/>
+                </a:solidFill>
+                <a:latin typeface="+mn-lt"/>
+                <a:ea typeface="+mn-ea"/>
+                <a:cs typeface="+mn-cs"/>
+              </a:defRPr>
+            </a:lvl2pPr>
+            <a:lvl3pPr marL="1143000" indent="-228600" algn="l" defTabSz="457200" rtl="0" eaLnBrk="1" latinLnBrk="0" hangingPunct="1">
+              <a:spcBef>
+                <a:spcPct val="20000"/>
+              </a:spcBef>
+              <a:buFont typeface="Arial"/>
+              <a:buChar char="•"/>
+              <a:defRPr sz="2400" kern="1200">
+                <a:solidFill>
+                  <a:schemeClr val="tx1"/>
+                </a:solidFill>
+                <a:latin typeface="+mn-lt"/>
+                <a:ea typeface="+mn-ea"/>
+                <a:cs typeface="+mn-cs"/>
+              </a:defRPr>
+            </a:lvl3pPr>
+            <a:lvl4pPr marL="1600200" indent="-228600" algn="l" defTabSz="457200" rtl="0" eaLnBrk="1" latinLnBrk="0" hangingPunct="1">
+              <a:spcBef>
+                <a:spcPct val="20000"/>
+              </a:spcBef>
+              <a:buFont typeface="Arial"/>
+              <a:buChar char="–"/>
+              <a:defRPr sz="2000" kern="1200">
+                <a:solidFill>
+                  <a:schemeClr val="tx1"/>
+                </a:solidFill>
+                <a:latin typeface="+mn-lt"/>
+                <a:ea typeface="+mn-ea"/>
+                <a:cs typeface="+mn-cs"/>
+              </a:defRPr>
+            </a:lvl4pPr>
+            <a:lvl5pPr marL="2057400" indent="-228600" algn="l" defTabSz="457200" rtl="0" eaLnBrk="1" latinLnBrk="0" hangingPunct="1">
+              <a:spcBef>
+                <a:spcPct val="20000"/>
+              </a:spcBef>
+              <a:buFont typeface="Arial"/>
+              <a:buChar char="»"/>
+              <a:defRPr sz="2000" kern="1200">
+                <a:solidFill>
+                  <a:schemeClr val="tx1"/>
+                </a:solidFill>
+                <a:latin typeface="+mn-lt"/>
+                <a:ea typeface="+mn-ea"/>
+                <a:cs typeface="+mn-cs"/>
+              </a:defRPr>
+            </a:lvl5pPr>
+            <a:lvl6pPr marL="2514600" indent="-228600" algn="l" defTabSz="457200" rtl="0" eaLnBrk="1" latinLnBrk="0" hangingPunct="1">
+              <a:spcBef>
+                <a:spcPct val="20000"/>
+              </a:spcBef>
+              <a:buFont typeface="Arial"/>
+              <a:buChar char="•"/>
+              <a:defRPr sz="2000" kern="1200">
+                <a:solidFill>
+                  <a:schemeClr val="tx1"/>
+                </a:solidFill>
+                <a:latin typeface="+mn-lt"/>
+                <a:ea typeface="+mn-ea"/>
+                <a:cs typeface="+mn-cs"/>
+              </a:defRPr>
+            </a:lvl6pPr>
+            <a:lvl7pPr marL="2971800" indent="-228600" algn="l" defTabSz="457200" rtl="0" eaLnBrk="1" latinLnBrk="0" hangingPunct="1">
+              <a:spcBef>
+                <a:spcPct val="20000"/>
+              </a:spcBef>
+              <a:buFont typeface="Arial"/>
+              <a:buChar char="•"/>
+              <a:defRPr sz="2000" kern="1200">
+                <a:solidFill>
+                  <a:schemeClr val="tx1"/>
+                </a:solidFill>
+                <a:latin typeface="+mn-lt"/>
+                <a:ea typeface="+mn-ea"/>
+                <a:cs typeface="+mn-cs"/>
+              </a:defRPr>
+            </a:lvl7pPr>
+            <a:lvl8pPr marL="3429000" indent="-228600" algn="l" defTabSz="457200" rtl="0" eaLnBrk="1" latinLnBrk="0" hangingPunct="1">
+              <a:spcBef>
+                <a:spcPct val="20000"/>
+              </a:spcBef>
+              <a:buFont typeface="Arial"/>
+              <a:buChar char="•"/>
+              <a:defRPr sz="2000" kern="1200">
+                <a:solidFill>
+                  <a:schemeClr val="tx1"/>
+                </a:solidFill>
+                <a:latin typeface="+mn-lt"/>
+                <a:ea typeface="+mn-ea"/>
+                <a:cs typeface="+mn-cs"/>
+              </a:defRPr>
+            </a:lvl8pPr>
+            <a:lvl9pPr marL="3886200" indent="-228600" algn="l" defTabSz="457200" rtl="0" eaLnBrk="1" latinLnBrk="0" hangingPunct="1">
+              <a:spcBef>
+                <a:spcPct val="20000"/>
+              </a:spcBef>
+              <a:buFont typeface="Arial"/>
+              <a:buChar char="•"/>
+              <a:defRPr sz="2000" kern="1200">
+                <a:solidFill>
+                  <a:schemeClr val="tx1"/>
+                </a:solidFill>
+                <a:latin typeface="+mn-lt"/>
+                <a:ea typeface="+mn-ea"/>
+                <a:cs typeface="+mn-cs"/>
+              </a:defRPr>
+            </a:lvl9pPr>
+          </a:lstStyle>
+          <a:p>
+            <a:pPr marL="198900" indent="0" algn="just">
+              <a:buFont typeface="Arial"/>
               <a:buNone/>
             </a:pPr>
-            <a:r>
-              <a:rPr lang="pl-PL" sz="5000" dirty="0" smtClean="0"/>
-              <a:t>Pierwsze API</a:t>
-            </a:r>
-            <a:endParaRPr lang="pl-PL" sz="5000" dirty="0"/>
+            <a:endParaRPr lang="pl-PL" dirty="0" smtClean="0"/>
+          </a:p>
+          <a:p>
+            <a:pPr algn="just"/>
+            <a:r>
+              <a:rPr lang="pl-PL" sz="1800" dirty="0">
+                <a:solidFill>
+                  <a:srgbClr val="2D3E5C"/>
+                </a:solidFill>
+                <a:latin typeface=""/>
+              </a:rPr>
+              <a:t>Klasa wykorzystywana po stronie klienta do komunikacji </a:t>
+            </a:r>
+            <a:r>
+              <a:rPr lang="pl-PL" sz="1800" dirty="0" smtClean="0">
+                <a:solidFill>
+                  <a:srgbClr val="2D3E5C"/>
+                </a:solidFill>
+                <a:latin typeface=""/>
+              </a:rPr>
+              <a:t>serwerem </a:t>
+            </a:r>
+            <a:r>
+              <a:rPr lang="pl-PL" sz="1800" dirty="0">
+                <a:solidFill>
+                  <a:srgbClr val="2D3E5C"/>
+                </a:solidFill>
+                <a:latin typeface=""/>
+              </a:rPr>
+              <a:t>za pomocą protokołu HTTP</a:t>
+            </a:r>
+            <a:r>
+              <a:rPr lang="pl-PL" sz="1800" dirty="0" smtClean="0">
+                <a:solidFill>
+                  <a:srgbClr val="2D3E5C"/>
+                </a:solidFill>
+                <a:latin typeface=""/>
+              </a:rPr>
+              <a:t>.</a:t>
+            </a:r>
+          </a:p>
+          <a:p>
+            <a:pPr marL="0" indent="0" algn="just">
+              <a:buNone/>
+            </a:pPr>
+            <a:endParaRPr lang="pl-PL" sz="1800" dirty="0" smtClean="0">
+              <a:solidFill>
+                <a:srgbClr val="2D3E5C"/>
+              </a:solidFill>
+              <a:latin typeface=""/>
+            </a:endParaRPr>
+          </a:p>
+          <a:p>
+            <a:pPr algn="just"/>
+            <a:r>
+              <a:rPr lang="pl-PL" sz="1800" dirty="0">
+                <a:solidFill>
+                  <a:srgbClr val="2D3E5C"/>
+                </a:solidFill>
+                <a:latin typeface=""/>
+              </a:rPr>
+              <a:t>Żądania GET z wykorzystaniem metody </a:t>
+            </a:r>
+            <a:r>
+              <a:rPr lang="pl-PL" sz="1800" dirty="0" smtClean="0">
+                <a:solidFill>
+                  <a:srgbClr val="2D3E5C"/>
+                </a:solidFill>
+                <a:latin typeface=""/>
+              </a:rPr>
+              <a:t>„exchange”:</a:t>
+            </a:r>
+          </a:p>
+          <a:p>
+            <a:pPr algn="just"/>
+            <a:endParaRPr lang="pl-PL" sz="1800" dirty="0">
+              <a:solidFill>
+                <a:srgbClr val="2D3E5C"/>
+              </a:solidFill>
+              <a:latin typeface=""/>
+            </a:endParaRPr>
+          </a:p>
+          <a:p>
+            <a:pPr algn="just"/>
+            <a:endParaRPr lang="pl-PL" sz="1800" dirty="0">
+              <a:solidFill>
+                <a:srgbClr val="2D3E5C"/>
+              </a:solidFill>
+              <a:latin typeface=""/>
+            </a:endParaRPr>
+          </a:p>
+          <a:p>
+            <a:pPr algn="just"/>
+            <a:endParaRPr lang="pl-PL" sz="1800" dirty="0">
+              <a:solidFill>
+                <a:srgbClr val="2D3E5C"/>
+              </a:solidFill>
+              <a:latin typeface=""/>
+            </a:endParaRPr>
+          </a:p>
+          <a:p>
+            <a:pPr algn="just"/>
+            <a:endParaRPr lang="pl-PL" dirty="0" smtClean="0"/>
+          </a:p>
+          <a:p>
+            <a:pPr marL="0" indent="0" algn="just">
+              <a:buNone/>
+            </a:pPr>
+            <a:r>
+              <a:rPr lang="pl-PL" sz="1800" dirty="0" smtClean="0">
+                <a:solidFill>
+                  <a:srgbClr val="2D3E5C"/>
+                </a:solidFill>
+                <a:latin typeface=""/>
+              </a:rPr>
+              <a:t>      REST </a:t>
+            </a:r>
+            <a:r>
+              <a:rPr lang="pl-PL" sz="1800" dirty="0" err="1" smtClean="0">
+                <a:solidFill>
+                  <a:srgbClr val="2D3E5C"/>
+                </a:solidFill>
+                <a:latin typeface=""/>
+              </a:rPr>
+              <a:t>Template</a:t>
+            </a:r>
+            <a:r>
+              <a:rPr lang="pl-PL" sz="1800" dirty="0" smtClean="0">
+                <a:solidFill>
+                  <a:srgbClr val="2D3E5C"/>
+                </a:solidFill>
+                <a:latin typeface=""/>
+              </a:rPr>
+              <a:t> :</a:t>
+            </a:r>
+            <a:endParaRPr lang="pl-PL" sz="1800" dirty="0">
+              <a:solidFill>
+                <a:srgbClr val="2D3E5C"/>
+              </a:solidFill>
+              <a:latin typeface=""/>
+            </a:endParaRPr>
           </a:p>
         </p:txBody>
       </p:sp>
       <p:pic>
         <p:nvPicPr>
-          <p:cNvPr id="3074" name="Picture 2" descr="Znalezione obrazy dla zapytania junit"/>
+          <p:cNvPr id="3" name="Obraz 2"/>
           <p:cNvPicPr>
-            <a:picLocks noChangeAspect="1" noChangeArrowheads="1"/>
+            <a:picLocks noChangeAspect="1"/>
           </p:cNvPicPr>
           <p:nvPr/>
         </p:nvPicPr>
         <p:blipFill>
-          <a:blip r:embed="rId2">
-            <a:extLst>
-              <a:ext uri="{28A0092B-C50C-407E-A947-70E740481C1C}">
-                <a14:useLocalDpi xmlns:a14="http://schemas.microsoft.com/office/drawing/2010/main" val="0"/>
-              </a:ext>
-            </a:extLst>
-          </a:blip>
-          <a:srcRect/>
+          <a:blip r:embed="rId2"/>
           <a:stretch>
             <a:fillRect/>
           </a:stretch>
         </p:blipFill>
-        <p:spPr bwMode="auto">
-          <a:xfrm>
-            <a:off x="5528764" y="3071495"/>
-            <a:ext cx="2152650" cy="2124075"/>
+        <p:spPr>
+          <a:xfrm>
+            <a:off x="392905" y="5193632"/>
+            <a:ext cx="8358188" cy="779480"/>
           </a:xfrm>
           <a:prstGeom prst="rect">
             <a:avLst/>
           </a:prstGeom>
-          <a:noFill/>
-          <a:extLst>
-            <a:ext uri="{909E8E84-426E-40DD-AFC4-6F175D3DCCD1}">
-              <a14:hiddenFill xmlns:a14="http://schemas.microsoft.com/office/drawing/2010/main">
-                <a:solidFill>
-                  <a:srgbClr val="FFFFFF"/>
-                </a:solidFill>
-              </a14:hiddenFill>
-            </a:ext>
-          </a:extLst>
+        </p:spPr>
+      </p:pic>
+      <p:pic>
+        <p:nvPicPr>
+          <p:cNvPr id="4" name="Obraz 3"/>
+          <p:cNvPicPr>
+            <a:picLocks noChangeAspect="1"/>
+          </p:cNvPicPr>
+          <p:nvPr/>
+        </p:nvPicPr>
+        <p:blipFill>
+          <a:blip r:embed="rId3"/>
+          <a:stretch>
+            <a:fillRect/>
+          </a:stretch>
+        </p:blipFill>
+        <p:spPr>
+          <a:xfrm>
+            <a:off x="452391" y="3444198"/>
+            <a:ext cx="8239216" cy="971550"/>
+          </a:xfrm>
+          <a:prstGeom prst="rect">
+            <a:avLst/>
+          </a:prstGeom>
         </p:spPr>
       </p:pic>
     </p:spTree>
     <p:extLst>
       <p:ext uri="{BB962C8B-B14F-4D97-AF65-F5344CB8AC3E}">
-        <p14:creationId xmlns:p14="http://schemas.microsoft.com/office/powerpoint/2010/main" val="1028304070"/>
+        <p14:creationId xmlns:p14="http://schemas.microsoft.com/office/powerpoint/2010/main" val="3204976087"/>
       </p:ext>
     </p:extLst>
   </p:cSld>
@@ -5444,7 +5338,7 @@
       </p:grpSpPr>
       <p:sp>
         <p:nvSpPr>
-          <p:cNvPr id="2" name="Tytuł 1"/>
+          <p:cNvPr id="7" name="Tytuł 6"/>
           <p:cNvSpPr>
             <a:spLocks noGrp="1"/>
           </p:cNvSpPr>
@@ -5457,289 +5351,87 @@
           <a:bodyPr/>
           <a:lstStyle/>
           <a:p>
-            <a:r>
-              <a:rPr lang="en-US" dirty="0"/>
-              <a:t>Spring </a:t>
-            </a:r>
-            <a:r>
-              <a:rPr lang="en-US" dirty="0" err="1" smtClean="0"/>
-              <a:t>MockMVC</a:t>
-            </a:r>
-            <a:r>
-              <a:rPr lang="pl-PL" dirty="0" smtClean="0"/>
-              <a:t> </a:t>
-            </a:r>
-            <a:r>
-              <a:rPr lang="en-US" dirty="0" smtClean="0"/>
-              <a:t> </a:t>
-            </a:r>
-            <a:endParaRPr lang="pl-PL" dirty="0">
-              <a:latin typeface=""/>
-            </a:endParaRPr>
-          </a:p>
-        </p:txBody>
-      </p:sp>
-      <p:sp>
-        <p:nvSpPr>
-          <p:cNvPr id="4" name="pole tekstowe 3"/>
-          <p:cNvSpPr txBox="1"/>
-          <p:nvPr/>
-        </p:nvSpPr>
-        <p:spPr>
-          <a:xfrm>
-            <a:off x="862642" y="1233577"/>
-            <a:ext cx="6564701" cy="369332"/>
-          </a:xfrm>
+            <a:endParaRPr lang="pl-PL"/>
+          </a:p>
+        </p:txBody>
+      </p:sp>
+      <p:sp>
+        <p:nvSpPr>
+          <p:cNvPr id="3" name="Symbol zastępczy tekstu 2"/>
+          <p:cNvSpPr>
+            <a:spLocks noGrp="1"/>
+          </p:cNvSpPr>
+          <p:nvPr>
+            <p:ph type="body" sz="quarter" idx="10"/>
+          </p:nvPr>
+        </p:nvSpPr>
+        <p:spPr>
           <a:prstGeom prst="rect">
             <a:avLst/>
           </a:prstGeom>
-          <a:noFill/>
-        </p:spPr>
-        <p:txBody>
-          <a:bodyPr wrap="square" rtlCol="0">
-            <a:spAutoFit/>
+        </p:spPr>
+        <p:txBody>
+          <a:bodyPr>
+            <a:noAutofit/>
           </a:bodyPr>
           <a:lstStyle/>
           <a:p>
-            <a:endParaRPr lang="pl-PL" dirty="0"/>
-          </a:p>
-        </p:txBody>
-      </p:sp>
-      <p:sp>
-        <p:nvSpPr>
-          <p:cNvPr id="6" name="Symbol zastępczy tekstu 2"/>
-          <p:cNvSpPr txBox="1">
-            <a:spLocks/>
-          </p:cNvSpPr>
-          <p:nvPr/>
-        </p:nvSpPr>
-        <p:spPr>
-          <a:xfrm>
-            <a:off x="0" y="1228158"/>
-            <a:ext cx="9144000" cy="4846148"/>
-          </a:xfrm>
-          <a:prstGeom prst="rect">
-            <a:avLst/>
-          </a:prstGeom>
-        </p:spPr>
-        <p:txBody>
-          <a:bodyPr>
-            <a:normAutofit/>
-          </a:bodyPr>
-          <a:lstStyle>
-            <a:lvl1pPr marL="342900" indent="-342900" algn="l" defTabSz="457200" rtl="0" eaLnBrk="1" latinLnBrk="0" hangingPunct="1">
-              <a:spcBef>
-                <a:spcPct val="20000"/>
-              </a:spcBef>
-              <a:buFont typeface="Arial"/>
-              <a:buChar char="•"/>
-              <a:defRPr sz="3200" kern="1200">
-                <a:solidFill>
-                  <a:schemeClr val="tx1"/>
-                </a:solidFill>
-                <a:latin typeface="+mn-lt"/>
-                <a:ea typeface="+mn-ea"/>
-                <a:cs typeface="+mn-cs"/>
-              </a:defRPr>
-            </a:lvl1pPr>
-            <a:lvl2pPr marL="742950" indent="-285750" algn="l" defTabSz="457200" rtl="0" eaLnBrk="1" latinLnBrk="0" hangingPunct="1">
-              <a:spcBef>
-                <a:spcPct val="20000"/>
-              </a:spcBef>
-              <a:buFont typeface="Arial"/>
-              <a:buChar char="–"/>
-              <a:defRPr sz="2800" kern="1200">
-                <a:solidFill>
-                  <a:schemeClr val="tx1"/>
-                </a:solidFill>
-                <a:latin typeface="+mn-lt"/>
-                <a:ea typeface="+mn-ea"/>
-                <a:cs typeface="+mn-cs"/>
-              </a:defRPr>
-            </a:lvl2pPr>
-            <a:lvl3pPr marL="1143000" indent="-228600" algn="l" defTabSz="457200" rtl="0" eaLnBrk="1" latinLnBrk="0" hangingPunct="1">
-              <a:spcBef>
-                <a:spcPct val="20000"/>
-              </a:spcBef>
-              <a:buFont typeface="Arial"/>
-              <a:buChar char="•"/>
-              <a:defRPr sz="2400" kern="1200">
-                <a:solidFill>
-                  <a:schemeClr val="tx1"/>
-                </a:solidFill>
-                <a:latin typeface="+mn-lt"/>
-                <a:ea typeface="+mn-ea"/>
-                <a:cs typeface="+mn-cs"/>
-              </a:defRPr>
-            </a:lvl3pPr>
-            <a:lvl4pPr marL="1600200" indent="-228600" algn="l" defTabSz="457200" rtl="0" eaLnBrk="1" latinLnBrk="0" hangingPunct="1">
-              <a:spcBef>
-                <a:spcPct val="20000"/>
-              </a:spcBef>
-              <a:buFont typeface="Arial"/>
-              <a:buChar char="–"/>
-              <a:defRPr sz="2000" kern="1200">
-                <a:solidFill>
-                  <a:schemeClr val="tx1"/>
-                </a:solidFill>
-                <a:latin typeface="+mn-lt"/>
-                <a:ea typeface="+mn-ea"/>
-                <a:cs typeface="+mn-cs"/>
-              </a:defRPr>
-            </a:lvl4pPr>
-            <a:lvl5pPr marL="2057400" indent="-228600" algn="l" defTabSz="457200" rtl="0" eaLnBrk="1" latinLnBrk="0" hangingPunct="1">
-              <a:spcBef>
-                <a:spcPct val="20000"/>
-              </a:spcBef>
-              <a:buFont typeface="Arial"/>
-              <a:buChar char="»"/>
-              <a:defRPr sz="2000" kern="1200">
-                <a:solidFill>
-                  <a:schemeClr val="tx1"/>
-                </a:solidFill>
-                <a:latin typeface="+mn-lt"/>
-                <a:ea typeface="+mn-ea"/>
-                <a:cs typeface="+mn-cs"/>
-              </a:defRPr>
-            </a:lvl5pPr>
-            <a:lvl6pPr marL="2514600" indent="-228600" algn="l" defTabSz="457200" rtl="0" eaLnBrk="1" latinLnBrk="0" hangingPunct="1">
-              <a:spcBef>
-                <a:spcPct val="20000"/>
-              </a:spcBef>
-              <a:buFont typeface="Arial"/>
-              <a:buChar char="•"/>
-              <a:defRPr sz="2000" kern="1200">
-                <a:solidFill>
-                  <a:schemeClr val="tx1"/>
-                </a:solidFill>
-                <a:latin typeface="+mn-lt"/>
-                <a:ea typeface="+mn-ea"/>
-                <a:cs typeface="+mn-cs"/>
-              </a:defRPr>
-            </a:lvl6pPr>
-            <a:lvl7pPr marL="2971800" indent="-228600" algn="l" defTabSz="457200" rtl="0" eaLnBrk="1" latinLnBrk="0" hangingPunct="1">
-              <a:spcBef>
-                <a:spcPct val="20000"/>
-              </a:spcBef>
-              <a:buFont typeface="Arial"/>
-              <a:buChar char="•"/>
-              <a:defRPr sz="2000" kern="1200">
-                <a:solidFill>
-                  <a:schemeClr val="tx1"/>
-                </a:solidFill>
-                <a:latin typeface="+mn-lt"/>
-                <a:ea typeface="+mn-ea"/>
-                <a:cs typeface="+mn-cs"/>
-              </a:defRPr>
-            </a:lvl7pPr>
-            <a:lvl8pPr marL="3429000" indent="-228600" algn="l" defTabSz="457200" rtl="0" eaLnBrk="1" latinLnBrk="0" hangingPunct="1">
-              <a:spcBef>
-                <a:spcPct val="20000"/>
-              </a:spcBef>
-              <a:buFont typeface="Arial"/>
-              <a:buChar char="•"/>
-              <a:defRPr sz="2000" kern="1200">
-                <a:solidFill>
-                  <a:schemeClr val="tx1"/>
-                </a:solidFill>
-                <a:latin typeface="+mn-lt"/>
-                <a:ea typeface="+mn-ea"/>
-                <a:cs typeface="+mn-cs"/>
-              </a:defRPr>
-            </a:lvl8pPr>
-            <a:lvl9pPr marL="3886200" indent="-228600" algn="l" defTabSz="457200" rtl="0" eaLnBrk="1" latinLnBrk="0" hangingPunct="1">
-              <a:spcBef>
-                <a:spcPct val="20000"/>
-              </a:spcBef>
-              <a:buFont typeface="Arial"/>
-              <a:buChar char="•"/>
-              <a:defRPr sz="2000" kern="1200">
-                <a:solidFill>
-                  <a:schemeClr val="tx1"/>
-                </a:solidFill>
-                <a:latin typeface="+mn-lt"/>
-                <a:ea typeface="+mn-ea"/>
-                <a:cs typeface="+mn-cs"/>
-              </a:defRPr>
-            </a:lvl9pPr>
-          </a:lstStyle>
-          <a:p>
-            <a:pPr marL="198900" indent="0" algn="just">
-              <a:buFont typeface="Arial"/>
+            <a:pPr marL="198900" indent="0">
               <a:buNone/>
             </a:pPr>
-            <a:endParaRPr lang="pl-PL" dirty="0" smtClean="0"/>
-          </a:p>
-          <a:p>
-            <a:pPr algn="just"/>
-            <a:r>
-              <a:rPr lang="pl-PL" sz="2400" dirty="0" smtClean="0"/>
-              <a:t>Wykorzystywany do testowania serwerowej strony aplikacji.</a:t>
-            </a:r>
-          </a:p>
-          <a:p>
-            <a:pPr algn="just"/>
-            <a:r>
-              <a:rPr lang="pl-PL" sz="2400" dirty="0" smtClean="0"/>
-              <a:t>Tworzy infrastrukturę bardzo zbliżoną do tej, która pojawia przy faktycznym uruchomieniu programu</a:t>
-            </a:r>
-          </a:p>
-          <a:p>
-            <a:pPr algn="just"/>
-            <a:r>
-              <a:rPr lang="pl-PL" sz="2400" dirty="0" smtClean="0"/>
-              <a:t>Główna zasada działania opiera się o </a:t>
-            </a:r>
-            <a:r>
-              <a:rPr lang="pl-PL" sz="2400" dirty="0" err="1" smtClean="0"/>
-              <a:t>mockowanie</a:t>
-            </a:r>
-            <a:r>
-              <a:rPr lang="pl-PL" sz="2400" dirty="0" smtClean="0"/>
-              <a:t> żądania i odpowiedzi HTTP, które przychodzą od „spring-test”.</a:t>
-            </a:r>
-          </a:p>
-          <a:p>
-            <a:pPr algn="just"/>
-            <a:r>
-              <a:rPr lang="pl-PL" sz="2400" dirty="0" smtClean="0"/>
-              <a:t>Testy nie wymagają uruchomionego kontenera </a:t>
-            </a:r>
-            <a:r>
-              <a:rPr lang="pl-PL" sz="2400" dirty="0" err="1" smtClean="0"/>
-              <a:t>servletu</a:t>
-            </a:r>
-            <a:endParaRPr lang="pl-PL" sz="2400" dirty="0" smtClean="0"/>
-          </a:p>
-          <a:p>
-            <a:pPr algn="just"/>
-            <a:r>
-              <a:rPr lang="pl-PL" sz="2400" dirty="0" smtClean="0"/>
-              <a:t>Podczas wykonywania testu żądania obsługuje </a:t>
-            </a:r>
-            <a:r>
-              <a:rPr lang="pl-PL" sz="2400" dirty="0" err="1" smtClean="0"/>
-              <a:t>Dispatcher</a:t>
-            </a:r>
-            <a:r>
-              <a:rPr lang="pl-PL" sz="2400" dirty="0" smtClean="0"/>
-              <a:t> </a:t>
-            </a:r>
-            <a:r>
-              <a:rPr lang="pl-PL" sz="2400" dirty="0" err="1" smtClean="0"/>
-              <a:t>Servlet</a:t>
-            </a:r>
-            <a:r>
-              <a:rPr lang="pl-PL" sz="2400" dirty="0" smtClean="0"/>
-              <a:t> lecz nie zostaje nawiązane  rzeczywiste połączenie sieciowe.</a:t>
-            </a:r>
-          </a:p>
-        </p:txBody>
-      </p:sp>
+            <a:r>
+              <a:rPr lang="pl-PL" sz="5000" dirty="0" smtClean="0"/>
+              <a:t>Pierwsze API</a:t>
+            </a:r>
+            <a:endParaRPr lang="pl-PL" sz="5000" dirty="0"/>
+          </a:p>
+        </p:txBody>
+      </p:sp>
+      <p:pic>
+        <p:nvPicPr>
+          <p:cNvPr id="3074" name="Picture 2" descr="Znalezione obrazy dla zapytania junit"/>
+          <p:cNvPicPr>
+            <a:picLocks noChangeAspect="1" noChangeArrowheads="1"/>
+          </p:cNvPicPr>
+          <p:nvPr/>
+        </p:nvPicPr>
+        <p:blipFill>
+          <a:blip r:embed="rId2">
+            <a:extLst>
+              <a:ext uri="{28A0092B-C50C-407E-A947-70E740481C1C}">
+                <a14:useLocalDpi xmlns:a14="http://schemas.microsoft.com/office/drawing/2010/main" val="0"/>
+              </a:ext>
+            </a:extLst>
+          </a:blip>
+          <a:srcRect/>
+          <a:stretch>
+            <a:fillRect/>
+          </a:stretch>
+        </p:blipFill>
+        <p:spPr bwMode="auto">
+          <a:xfrm>
+            <a:off x="5528764" y="3071495"/>
+            <a:ext cx="2152650" cy="2124075"/>
+          </a:xfrm>
+          <a:prstGeom prst="rect">
+            <a:avLst/>
+          </a:prstGeom>
+          <a:noFill/>
+          <a:extLst>
+            <a:ext uri="{909E8E84-426E-40DD-AFC4-6F175D3DCCD1}">
+              <a14:hiddenFill xmlns:a14="http://schemas.microsoft.com/office/drawing/2010/main">
+                <a:solidFill>
+                  <a:srgbClr val="FFFFFF"/>
+                </a:solidFill>
+              </a14:hiddenFill>
+            </a:ext>
+          </a:extLst>
+        </p:spPr>
+      </p:pic>
     </p:spTree>
     <p:extLst>
       <p:ext uri="{BB962C8B-B14F-4D97-AF65-F5344CB8AC3E}">
-        <p14:creationId xmlns:p14="http://schemas.microsoft.com/office/powerpoint/2010/main" val="831594908"/>
+        <p14:creationId xmlns:p14="http://schemas.microsoft.com/office/powerpoint/2010/main" val="1028304070"/>
       </p:ext>
     </p:extLst>
   </p:cSld>
@@ -5798,7 +5490,7 @@
             </a:r>
             <a:r>
               <a:rPr lang="pl-PL" dirty="0" smtClean="0"/>
-              <a:t> - Konfiguracja</a:t>
+              <a:t> </a:t>
             </a:r>
             <a:r>
               <a:rPr lang="en-US" dirty="0" smtClean="0"/>
@@ -6001,173 +5693,76 @@
             </a:pPr>
             <a:endParaRPr lang="pl-PL" dirty="0" smtClean="0"/>
           </a:p>
-        </p:txBody>
-      </p:sp>
-      <p:pic>
-        <p:nvPicPr>
-          <p:cNvPr id="3" name="Obraz 2"/>
-          <p:cNvPicPr>
-            <a:picLocks noChangeAspect="1"/>
-          </p:cNvPicPr>
-          <p:nvPr/>
-        </p:nvPicPr>
-        <p:blipFill>
-          <a:blip r:embed="rId2"/>
-          <a:stretch>
-            <a:fillRect/>
-          </a:stretch>
-        </p:blipFill>
-        <p:spPr>
-          <a:xfrm>
-            <a:off x="1645379" y="1418243"/>
-            <a:ext cx="4999226" cy="1057538"/>
-          </a:xfrm>
-          <a:prstGeom prst="rect">
-            <a:avLst/>
-          </a:prstGeom>
-        </p:spPr>
-      </p:pic>
-      <p:sp>
-        <p:nvSpPr>
-          <p:cNvPr id="5" name="pole tekstowe 4"/>
-          <p:cNvSpPr txBox="1"/>
-          <p:nvPr/>
-        </p:nvSpPr>
-        <p:spPr>
-          <a:xfrm>
-            <a:off x="612474" y="3148642"/>
-            <a:ext cx="7789653" cy="2031325"/>
-          </a:xfrm>
-          <a:prstGeom prst="rect">
-            <a:avLst/>
-          </a:prstGeom>
-          <a:noFill/>
-        </p:spPr>
-        <p:txBody>
-          <a:bodyPr wrap="square" rtlCol="0">
-            <a:spAutoFit/>
-          </a:bodyPr>
-          <a:lstStyle/>
-          <a:p>
-            <a:pPr marL="285750" indent="-285750">
-              <a:buFont typeface="Arial" panose="020B0604020202020204" pitchFamily="34" charset="0"/>
-              <a:buChar char="•"/>
-            </a:pPr>
-            <a:r>
-              <a:rPr lang="pl-PL" dirty="0" smtClean="0"/>
-              <a:t>@</a:t>
-            </a:r>
-            <a:r>
-              <a:rPr lang="pl-PL" dirty="0" err="1" smtClean="0"/>
-              <a:t>RunWith</a:t>
-            </a:r>
-            <a:r>
-              <a:rPr lang="pl-PL" dirty="0" smtClean="0"/>
-              <a:t>(</a:t>
-            </a:r>
-            <a:r>
-              <a:rPr lang="pl-PL" dirty="0" err="1" smtClean="0"/>
-              <a:t>SpringRunner.class</a:t>
-            </a:r>
-            <a:r>
-              <a:rPr lang="pl-PL" dirty="0" smtClean="0"/>
-              <a:t>) – określa </a:t>
-            </a:r>
-            <a:r>
-              <a:rPr lang="pl-PL" dirty="0" err="1" smtClean="0"/>
-              <a:t>Runner</a:t>
-            </a:r>
-            <a:r>
-              <a:rPr lang="pl-PL" dirty="0" smtClean="0"/>
-              <a:t>, który ma być wykorzystywany przez </a:t>
-            </a:r>
-            <a:r>
-              <a:rPr lang="pl-PL" dirty="0" err="1" smtClean="0"/>
-              <a:t>Junit</a:t>
-            </a:r>
-            <a:r>
-              <a:rPr lang="pl-PL" dirty="0" smtClean="0"/>
-              <a:t>. Klasa </a:t>
-            </a:r>
-            <a:r>
-              <a:rPr lang="pl-PL" dirty="0" err="1" smtClean="0"/>
-              <a:t>SpringRunner</a:t>
-            </a:r>
-            <a:r>
-              <a:rPr lang="pl-PL" dirty="0" smtClean="0"/>
-              <a:t> jest aliasem </a:t>
-            </a:r>
-            <a:r>
-              <a:rPr lang="pl-PL" dirty="0"/>
-              <a:t>do </a:t>
-            </a:r>
-            <a:r>
-              <a:rPr lang="pl-PL" dirty="0" smtClean="0"/>
-              <a:t>SpringJUnit4ClassRunner. Umożliwia korzystanie z testowego kontekstu </a:t>
-            </a:r>
-            <a:r>
-              <a:rPr lang="pl-PL" dirty="0" err="1" smtClean="0"/>
-              <a:t>Springa</a:t>
-            </a:r>
-            <a:r>
-              <a:rPr lang="pl-PL" dirty="0" smtClean="0"/>
-              <a:t>.</a:t>
-            </a:r>
-          </a:p>
-          <a:p>
-            <a:pPr marL="285750" indent="-285750">
-              <a:buFont typeface="Arial" panose="020B0604020202020204" pitchFamily="34" charset="0"/>
-              <a:buChar char="•"/>
-            </a:pPr>
-            <a:r>
-              <a:rPr lang="pl-PL" dirty="0" smtClean="0"/>
-              <a:t>@</a:t>
-            </a:r>
-            <a:r>
-              <a:rPr lang="pl-PL" dirty="0" err="1" smtClean="0"/>
-              <a:t>SpringBootTest</a:t>
-            </a:r>
-            <a:r>
-              <a:rPr lang="pl-PL" dirty="0" smtClean="0"/>
+          <a:p>
+            <a:pPr algn="just"/>
+            <a:r>
+              <a:rPr lang="pl-PL" sz="2400" dirty="0" smtClean="0"/>
+              <a:t>Wykorzystywany do testowania serwerowej strony aplikacji.</a:t>
+            </a:r>
+          </a:p>
+          <a:p>
+            <a:pPr algn="just"/>
+            <a:r>
+              <a:rPr lang="pl-PL" sz="2400" dirty="0" smtClean="0"/>
+              <a:t>Tworzy infrastrukturę bardzo zbliżoną do tej, która pojawia przy faktycznym uruchomieniu programu</a:t>
+            </a:r>
+          </a:p>
+          <a:p>
+            <a:pPr algn="just"/>
+            <a:r>
+              <a:rPr lang="pl-PL" sz="2400" dirty="0" smtClean="0"/>
+              <a:t>Główna zasada działania opiera się o </a:t>
+            </a:r>
+            <a:r>
+              <a:rPr lang="pl-PL" sz="2400" dirty="0" err="1" smtClean="0"/>
+              <a:t>mockowanie</a:t>
+            </a:r>
+            <a:r>
+              <a:rPr lang="pl-PL" sz="2400" dirty="0" smtClean="0"/>
+              <a:t> żądania i odpowiedzi HTTP, które przychodzą od „spring-test”.</a:t>
+            </a:r>
+          </a:p>
+          <a:p>
+            <a:pPr algn="just"/>
+            <a:r>
+              <a:rPr lang="pl-PL" sz="2400" dirty="0" smtClean="0"/>
+              <a:t>Testy nie wymagają uruchomionego kontenera </a:t>
+            </a:r>
+            <a:r>
+              <a:rPr lang="pl-PL" sz="2400" dirty="0" err="1" smtClean="0"/>
+              <a:t>servletu</a:t>
+            </a:r>
+            <a:endParaRPr lang="pl-PL" sz="2400" dirty="0" smtClean="0"/>
+          </a:p>
+          <a:p>
+            <a:pPr algn="just"/>
+            <a:r>
+              <a:rPr lang="pl-PL" sz="2400" dirty="0" smtClean="0"/>
+              <a:t>Podczas wykonywania testu żądania obsługuje </a:t>
+            </a:r>
+            <a:r>
+              <a:rPr lang="pl-PL" sz="2400" dirty="0" err="1" smtClean="0"/>
+              <a:t>Dispatcher</a:t>
+            </a:r>
+            <a:r>
+              <a:rPr lang="pl-PL" sz="2400" dirty="0" smtClean="0"/>
               <a:t> </a:t>
             </a:r>
-          </a:p>
-          <a:p>
-            <a:pPr marL="285750" indent="-285750">
-              <a:buFont typeface="Arial" panose="020B0604020202020204" pitchFamily="34" charset="0"/>
-              <a:buChar char="•"/>
-            </a:pPr>
-            <a:endParaRPr lang="pl-PL" dirty="0"/>
-          </a:p>
-          <a:p>
-            <a:pPr marL="285750" indent="-285750">
-              <a:buFont typeface="Arial" panose="020B0604020202020204" pitchFamily="34" charset="0"/>
-              <a:buChar char="•"/>
-            </a:pPr>
-            <a:r>
-              <a:rPr lang="pl-PL" dirty="0" smtClean="0"/>
-              <a:t>@</a:t>
-            </a:r>
-            <a:r>
-              <a:rPr lang="pl-PL" dirty="0" err="1" smtClean="0"/>
-              <a:t>AutoConfigureMockMvc</a:t>
-            </a:r>
-            <a:r>
-              <a:rPr lang="pl-PL" dirty="0" smtClean="0"/>
-              <a:t> -  Uruchamia automatyczną konfiguracje </a:t>
-            </a:r>
-            <a:r>
-              <a:rPr lang="pl-PL" dirty="0" err="1" smtClean="0"/>
-              <a:t>MockMvc</a:t>
-            </a:r>
-            <a:endParaRPr lang="pl-PL" dirty="0"/>
+            <a:r>
+              <a:rPr lang="pl-PL" sz="2400" dirty="0" err="1" smtClean="0"/>
+              <a:t>Servlet</a:t>
+            </a:r>
+            <a:r>
+              <a:rPr lang="pl-PL" sz="2400" dirty="0" smtClean="0"/>
+              <a:t> lecz nie zostaje nawiązane  rzeczywiste połączenie sieciowe.</a:t>
+            </a:r>
           </a:p>
         </p:txBody>
       </p:sp>
     </p:spTree>
     <p:extLst>
       <p:ext uri="{BB962C8B-B14F-4D97-AF65-F5344CB8AC3E}">
-        <p14:creationId xmlns:p14="http://schemas.microsoft.com/office/powerpoint/2010/main" val="2884127231"/>
+        <p14:creationId xmlns:p14="http://schemas.microsoft.com/office/powerpoint/2010/main" val="831594908"/>
       </p:ext>
     </p:extLst>
   </p:cSld>
@@ -6431,6 +6026,30 @@
           </a:p>
         </p:txBody>
       </p:sp>
+      <p:pic>
+        <p:nvPicPr>
+          <p:cNvPr id="3" name="Obraz 2"/>
+          <p:cNvPicPr>
+            <a:picLocks noChangeAspect="1"/>
+          </p:cNvPicPr>
+          <p:nvPr/>
+        </p:nvPicPr>
+        <p:blipFill>
+          <a:blip r:embed="rId2"/>
+          <a:stretch>
+            <a:fillRect/>
+          </a:stretch>
+        </p:blipFill>
+        <p:spPr>
+          <a:xfrm>
+            <a:off x="1645379" y="1418243"/>
+            <a:ext cx="4999226" cy="1057538"/>
+          </a:xfrm>
+          <a:prstGeom prst="rect">
+            <a:avLst/>
+          </a:prstGeom>
+        </p:spPr>
+      </p:pic>
       <p:sp>
         <p:nvSpPr>
           <p:cNvPr id="5" name="pole tekstowe 4"/>
@@ -6439,7 +6058,7 @@
         </p:nvSpPr>
         <p:spPr>
           <a:xfrm>
-            <a:off x="677173" y="1228158"/>
+            <a:off x="612474" y="3148642"/>
             <a:ext cx="7789653" cy="2031325"/>
           </a:xfrm>
           <a:prstGeom prst="rect">
@@ -6571,7 +6190,7 @@
     </p:spTree>
     <p:extLst>
       <p:ext uri="{BB962C8B-B14F-4D97-AF65-F5344CB8AC3E}">
-        <p14:creationId xmlns:p14="http://schemas.microsoft.com/office/powerpoint/2010/main" val="1819539165"/>
+        <p14:creationId xmlns:p14="http://schemas.microsoft.com/office/powerpoint/2010/main" val="2884127231"/>
       </p:ext>
     </p:extLst>
   </p:cSld>
@@ -6620,83 +6239,375 @@
           <a:bodyPr/>
           <a:lstStyle/>
           <a:p>
-            <a:pPr algn="ctr"/>
-            <a:endParaRPr lang="pl-PL" dirty="0"/>
-          </a:p>
-        </p:txBody>
-      </p:sp>
-      <p:sp>
-        <p:nvSpPr>
-          <p:cNvPr id="3" name="Symbol zastępczy tekstu 2"/>
-          <p:cNvSpPr>
-            <a:spLocks noGrp="1"/>
-          </p:cNvSpPr>
-          <p:nvPr>
-            <p:ph type="body" sz="quarter" idx="10"/>
-          </p:nvPr>
-        </p:nvSpPr>
-        <p:spPr>
-          <a:xfrm>
-            <a:off x="871649" y="1793099"/>
-            <a:ext cx="7140237" cy="2221551"/>
-          </a:xfrm>
-        </p:spPr>
-        <p:txBody>
-          <a:bodyPr>
-            <a:noAutofit/>
+            <a:r>
+              <a:rPr lang="en-US" dirty="0"/>
+              <a:t>Spring </a:t>
+            </a:r>
+            <a:r>
+              <a:rPr lang="en-US" dirty="0" err="1" smtClean="0"/>
+              <a:t>MockMVC</a:t>
+            </a:r>
+            <a:r>
+              <a:rPr lang="pl-PL" dirty="0" smtClean="0"/>
+              <a:t> - Konfiguracja</a:t>
+            </a:r>
+            <a:r>
+              <a:rPr lang="en-US" dirty="0" smtClean="0"/>
+              <a:t> </a:t>
+            </a:r>
+            <a:endParaRPr lang="pl-PL" dirty="0">
+              <a:latin typeface=""/>
+            </a:endParaRPr>
+          </a:p>
+        </p:txBody>
+      </p:sp>
+      <p:sp>
+        <p:nvSpPr>
+          <p:cNvPr id="4" name="pole tekstowe 3"/>
+          <p:cNvSpPr txBox="1"/>
+          <p:nvPr/>
+        </p:nvSpPr>
+        <p:spPr>
+          <a:xfrm>
+            <a:off x="862642" y="1233577"/>
+            <a:ext cx="6564701" cy="369332"/>
+          </a:xfrm>
+          <a:prstGeom prst="rect">
+            <a:avLst/>
+          </a:prstGeom>
+          <a:noFill/>
+        </p:spPr>
+        <p:txBody>
+          <a:bodyPr wrap="square" rtlCol="0">
+            <a:spAutoFit/>
           </a:bodyPr>
           <a:lstStyle/>
           <a:p>
-            <a:pPr marL="198900" indent="0" algn="ctr">
+            <a:endParaRPr lang="pl-PL" dirty="0"/>
+          </a:p>
+        </p:txBody>
+      </p:sp>
+      <p:sp>
+        <p:nvSpPr>
+          <p:cNvPr id="6" name="Symbol zastępczy tekstu 2"/>
+          <p:cNvSpPr txBox="1">
+            <a:spLocks/>
+          </p:cNvSpPr>
+          <p:nvPr/>
+        </p:nvSpPr>
+        <p:spPr>
+          <a:xfrm>
+            <a:off x="0" y="1228158"/>
+            <a:ext cx="9144000" cy="4846148"/>
+          </a:xfrm>
+          <a:prstGeom prst="rect">
+            <a:avLst/>
+          </a:prstGeom>
+        </p:spPr>
+        <p:txBody>
+          <a:bodyPr>
+            <a:normAutofit/>
+          </a:bodyPr>
+          <a:lstStyle>
+            <a:lvl1pPr marL="342900" indent="-342900" algn="l" defTabSz="457200" rtl="0" eaLnBrk="1" latinLnBrk="0" hangingPunct="1">
+              <a:spcBef>
+                <a:spcPct val="20000"/>
+              </a:spcBef>
+              <a:buFont typeface="Arial"/>
+              <a:buChar char="•"/>
+              <a:defRPr sz="3200" kern="1200">
+                <a:solidFill>
+                  <a:schemeClr val="tx1"/>
+                </a:solidFill>
+                <a:latin typeface="+mn-lt"/>
+                <a:ea typeface="+mn-ea"/>
+                <a:cs typeface="+mn-cs"/>
+              </a:defRPr>
+            </a:lvl1pPr>
+            <a:lvl2pPr marL="742950" indent="-285750" algn="l" defTabSz="457200" rtl="0" eaLnBrk="1" latinLnBrk="0" hangingPunct="1">
+              <a:spcBef>
+                <a:spcPct val="20000"/>
+              </a:spcBef>
+              <a:buFont typeface="Arial"/>
+              <a:buChar char="–"/>
+              <a:defRPr sz="2800" kern="1200">
+                <a:solidFill>
+                  <a:schemeClr val="tx1"/>
+                </a:solidFill>
+                <a:latin typeface="+mn-lt"/>
+                <a:ea typeface="+mn-ea"/>
+                <a:cs typeface="+mn-cs"/>
+              </a:defRPr>
+            </a:lvl2pPr>
+            <a:lvl3pPr marL="1143000" indent="-228600" algn="l" defTabSz="457200" rtl="0" eaLnBrk="1" latinLnBrk="0" hangingPunct="1">
+              <a:spcBef>
+                <a:spcPct val="20000"/>
+              </a:spcBef>
+              <a:buFont typeface="Arial"/>
+              <a:buChar char="•"/>
+              <a:defRPr sz="2400" kern="1200">
+                <a:solidFill>
+                  <a:schemeClr val="tx1"/>
+                </a:solidFill>
+                <a:latin typeface="+mn-lt"/>
+                <a:ea typeface="+mn-ea"/>
+                <a:cs typeface="+mn-cs"/>
+              </a:defRPr>
+            </a:lvl3pPr>
+            <a:lvl4pPr marL="1600200" indent="-228600" algn="l" defTabSz="457200" rtl="0" eaLnBrk="1" latinLnBrk="0" hangingPunct="1">
+              <a:spcBef>
+                <a:spcPct val="20000"/>
+              </a:spcBef>
+              <a:buFont typeface="Arial"/>
+              <a:buChar char="–"/>
+              <a:defRPr sz="2000" kern="1200">
+                <a:solidFill>
+                  <a:schemeClr val="tx1"/>
+                </a:solidFill>
+                <a:latin typeface="+mn-lt"/>
+                <a:ea typeface="+mn-ea"/>
+                <a:cs typeface="+mn-cs"/>
+              </a:defRPr>
+            </a:lvl4pPr>
+            <a:lvl5pPr marL="2057400" indent="-228600" algn="l" defTabSz="457200" rtl="0" eaLnBrk="1" latinLnBrk="0" hangingPunct="1">
+              <a:spcBef>
+                <a:spcPct val="20000"/>
+              </a:spcBef>
+              <a:buFont typeface="Arial"/>
+              <a:buChar char="»"/>
+              <a:defRPr sz="2000" kern="1200">
+                <a:solidFill>
+                  <a:schemeClr val="tx1"/>
+                </a:solidFill>
+                <a:latin typeface="+mn-lt"/>
+                <a:ea typeface="+mn-ea"/>
+                <a:cs typeface="+mn-cs"/>
+              </a:defRPr>
+            </a:lvl5pPr>
+            <a:lvl6pPr marL="2514600" indent="-228600" algn="l" defTabSz="457200" rtl="0" eaLnBrk="1" latinLnBrk="0" hangingPunct="1">
+              <a:spcBef>
+                <a:spcPct val="20000"/>
+              </a:spcBef>
+              <a:buFont typeface="Arial"/>
+              <a:buChar char="•"/>
+              <a:defRPr sz="2000" kern="1200">
+                <a:solidFill>
+                  <a:schemeClr val="tx1"/>
+                </a:solidFill>
+                <a:latin typeface="+mn-lt"/>
+                <a:ea typeface="+mn-ea"/>
+                <a:cs typeface="+mn-cs"/>
+              </a:defRPr>
+            </a:lvl6pPr>
+            <a:lvl7pPr marL="2971800" indent="-228600" algn="l" defTabSz="457200" rtl="0" eaLnBrk="1" latinLnBrk="0" hangingPunct="1">
+              <a:spcBef>
+                <a:spcPct val="20000"/>
+              </a:spcBef>
+              <a:buFont typeface="Arial"/>
+              <a:buChar char="•"/>
+              <a:defRPr sz="2000" kern="1200">
+                <a:solidFill>
+                  <a:schemeClr val="tx1"/>
+                </a:solidFill>
+                <a:latin typeface="+mn-lt"/>
+                <a:ea typeface="+mn-ea"/>
+                <a:cs typeface="+mn-cs"/>
+              </a:defRPr>
+            </a:lvl7pPr>
+            <a:lvl8pPr marL="3429000" indent="-228600" algn="l" defTabSz="457200" rtl="0" eaLnBrk="1" latinLnBrk="0" hangingPunct="1">
+              <a:spcBef>
+                <a:spcPct val="20000"/>
+              </a:spcBef>
+              <a:buFont typeface="Arial"/>
+              <a:buChar char="•"/>
+              <a:defRPr sz="2000" kern="1200">
+                <a:solidFill>
+                  <a:schemeClr val="tx1"/>
+                </a:solidFill>
+                <a:latin typeface="+mn-lt"/>
+                <a:ea typeface="+mn-ea"/>
+                <a:cs typeface="+mn-cs"/>
+              </a:defRPr>
+            </a:lvl8pPr>
+            <a:lvl9pPr marL="3886200" indent="-228600" algn="l" defTabSz="457200" rtl="0" eaLnBrk="1" latinLnBrk="0" hangingPunct="1">
+              <a:spcBef>
+                <a:spcPct val="20000"/>
+              </a:spcBef>
+              <a:buFont typeface="Arial"/>
+              <a:buChar char="•"/>
+              <a:defRPr sz="2000" kern="1200">
+                <a:solidFill>
+                  <a:schemeClr val="tx1"/>
+                </a:solidFill>
+                <a:latin typeface="+mn-lt"/>
+                <a:ea typeface="+mn-ea"/>
+                <a:cs typeface="+mn-cs"/>
+              </a:defRPr>
+            </a:lvl9pPr>
+          </a:lstStyle>
+          <a:p>
+            <a:pPr marL="198900" indent="0" algn="just">
+              <a:buFont typeface="Arial"/>
               <a:buNone/>
             </a:pPr>
-            <a:r>
-              <a:rPr lang="pl-PL" sz="5000" dirty="0" smtClean="0"/>
-              <a:t>DZIĘKUJEMY </a:t>
-            </a:r>
-          </a:p>
-          <a:p>
-            <a:pPr marL="198900" indent="0" algn="ctr">
-              <a:buNone/>
+            <a:endParaRPr lang="pl-PL" dirty="0" smtClean="0"/>
+          </a:p>
+        </p:txBody>
+      </p:sp>
+      <p:sp>
+        <p:nvSpPr>
+          <p:cNvPr id="5" name="pole tekstowe 4"/>
+          <p:cNvSpPr txBox="1"/>
+          <p:nvPr/>
+        </p:nvSpPr>
+        <p:spPr>
+          <a:xfrm>
+            <a:off x="677173" y="1228158"/>
+            <a:ext cx="7789653" cy="2031325"/>
+          </a:xfrm>
+          <a:prstGeom prst="rect">
+            <a:avLst/>
+          </a:prstGeom>
+          <a:noFill/>
+        </p:spPr>
+        <p:txBody>
+          <a:bodyPr wrap="square" rtlCol="0">
+            <a:spAutoFit/>
+          </a:bodyPr>
+          <a:lstStyle/>
+          <a:p>
+            <a:pPr marL="285750" indent="-285750">
+              <a:buFont typeface="Arial" panose="020B0604020202020204" pitchFamily="34" charset="0"/>
+              <a:buChar char="•"/>
             </a:pPr>
             <a:r>
-              <a:rPr lang="pl-PL" sz="5000" dirty="0" smtClean="0"/>
-              <a:t>ZA </a:t>
-            </a:r>
-          </a:p>
-          <a:p>
-            <a:pPr marL="198900" indent="0" algn="ctr">
-              <a:buNone/>
+              <a:rPr lang="pl-PL" dirty="0" smtClean="0"/>
+              <a:t>@</a:t>
+            </a:r>
+            <a:r>
+              <a:rPr lang="pl-PL" dirty="0" err="1" smtClean="0"/>
+              <a:t>RunWith</a:t>
+            </a:r>
+            <a:r>
+              <a:rPr lang="pl-PL" dirty="0" smtClean="0"/>
+              <a:t>(</a:t>
+            </a:r>
+            <a:r>
+              <a:rPr lang="pl-PL" dirty="0" err="1" smtClean="0"/>
+              <a:t>SpringRunner.class</a:t>
+            </a:r>
+            <a:r>
+              <a:rPr lang="pl-PL" dirty="0" smtClean="0"/>
+              <a:t>) – określa </a:t>
+            </a:r>
+            <a:r>
+              <a:rPr lang="pl-PL" dirty="0" err="1" smtClean="0"/>
+              <a:t>Runner</a:t>
+            </a:r>
+            <a:r>
+              <a:rPr lang="pl-PL" dirty="0" smtClean="0"/>
+              <a:t>, który ma być wykorzystywany przez </a:t>
+            </a:r>
+            <a:r>
+              <a:rPr lang="pl-PL" dirty="0" err="1" smtClean="0"/>
+              <a:t>Junit</a:t>
+            </a:r>
+            <a:r>
+              <a:rPr lang="pl-PL" dirty="0" smtClean="0"/>
+              <a:t>. Klasa </a:t>
+            </a:r>
+            <a:r>
+              <a:rPr lang="pl-PL" dirty="0" err="1" smtClean="0"/>
+              <a:t>SpringRunner</a:t>
+            </a:r>
+            <a:r>
+              <a:rPr lang="pl-PL" dirty="0" smtClean="0"/>
+              <a:t> jest aliasem </a:t>
+            </a:r>
+            <a:r>
+              <a:rPr lang="pl-PL" dirty="0"/>
+              <a:t>do </a:t>
+            </a:r>
+            <a:r>
+              <a:rPr lang="pl-PL" dirty="0" smtClean="0"/>
+              <a:t>SpringJUnit4ClassRunner. Umożliwia korzystanie z testowego kontekstu </a:t>
+            </a:r>
+            <a:r>
+              <a:rPr lang="pl-PL" dirty="0" err="1" smtClean="0"/>
+              <a:t>Springa</a:t>
+            </a:r>
+            <a:r>
+              <a:rPr lang="pl-PL" dirty="0" smtClean="0"/>
+              <a:t>.</a:t>
+            </a:r>
+          </a:p>
+          <a:p>
+            <a:pPr marL="285750" indent="-285750">
+              <a:buFont typeface="Arial" panose="020B0604020202020204" pitchFamily="34" charset="0"/>
+              <a:buChar char="•"/>
             </a:pPr>
             <a:r>
-              <a:rPr lang="pl-PL" sz="5000" dirty="0" smtClean="0"/>
-              <a:t>UWAGĘ </a:t>
-            </a:r>
-          </a:p>
-          <a:p>
-            <a:pPr marL="198900" indent="0" algn="ctr">
-              <a:buNone/>
+              <a:rPr lang="pl-PL" dirty="0" smtClean="0"/>
+              <a:t>@</a:t>
+            </a:r>
+            <a:r>
+              <a:rPr lang="pl-PL" dirty="0" err="1" smtClean="0"/>
+              <a:t>SpringBootTest</a:t>
+            </a:r>
+            <a:r>
+              <a:rPr lang="pl-PL" dirty="0" smtClean="0"/>
+              <a:t> </a:t>
+            </a:r>
+          </a:p>
+          <a:p>
+            <a:pPr marL="285750" indent="-285750">
+              <a:buFont typeface="Arial" panose="020B0604020202020204" pitchFamily="34" charset="0"/>
+              <a:buChar char="•"/>
             </a:pPr>
-            <a:r>
-              <a:rPr lang="pl-PL" sz="5000" dirty="0" smtClean="0">
-                <a:sym typeface="Wingdings" panose="05000000000000000000" pitchFamily="2" charset="2"/>
-              </a:rPr>
-              <a:t></a:t>
-            </a:r>
-            <a:endParaRPr lang="pl-PL" sz="5000" dirty="0"/>
+            <a:endParaRPr lang="pl-PL" dirty="0"/>
+          </a:p>
+          <a:p>
+            <a:pPr marL="285750" indent="-285750">
+              <a:buFont typeface="Arial" panose="020B0604020202020204" pitchFamily="34" charset="0"/>
+              <a:buChar char="•"/>
+            </a:pPr>
+            <a:r>
+              <a:rPr lang="pl-PL" dirty="0" smtClean="0"/>
+              <a:t>@</a:t>
+            </a:r>
+            <a:r>
+              <a:rPr lang="pl-PL" dirty="0" err="1" smtClean="0"/>
+              <a:t>AutoConfigureMockMvc</a:t>
+            </a:r>
+            <a:r>
+              <a:rPr lang="pl-PL" dirty="0" smtClean="0"/>
+              <a:t> -  Uruchamia automatyczną konfiguracje </a:t>
+            </a:r>
+            <a:r>
+              <a:rPr lang="pl-PL" dirty="0" err="1" smtClean="0"/>
+              <a:t>MockMvc</a:t>
+            </a:r>
+            <a:endParaRPr lang="pl-PL" dirty="0"/>
           </a:p>
         </p:txBody>
       </p:sp>
     </p:spTree>
     <p:extLst>
       <p:ext uri="{BB962C8B-B14F-4D97-AF65-F5344CB8AC3E}">
-        <p14:creationId xmlns:p14="http://schemas.microsoft.com/office/powerpoint/2010/main" val="2679622656"/>
+        <p14:creationId xmlns:p14="http://schemas.microsoft.com/office/powerpoint/2010/main" val="1819539165"/>
       </p:ext>
     </p:extLst>
   </p:cSld>
   <p:clrMapOvr>
     <a:masterClrMapping/>
   </p:clrMapOvr>
+  <p:timing>
+    <p:tnLst>
+      <p:par>
+        <p:cTn id="1" dur="indefinite" restart="never" nodeType="tmRoot"/>
+      </p:par>
+    </p:tnLst>
+  </p:timing>
 </p:sld>
 </file>
 
@@ -6733,10 +6644,10 @@
           <a:lstStyle/>
           <a:p>
             <a:r>
-              <a:rPr lang="pl-PL" dirty="0" smtClean="0"/>
+              <a:rPr lang="pl-PL" b="1" dirty="0" smtClean="0"/>
               <a:t>Agenda</a:t>
             </a:r>
-            <a:endParaRPr lang="pl-PL" dirty="0"/>
+            <a:endParaRPr lang="pl-PL" b="1" dirty="0"/>
           </a:p>
         </p:txBody>
       </p:sp>
@@ -6762,7 +6673,7 @@
               <a:buAutoNum type="arabicPeriod"/>
             </a:pPr>
             <a:r>
-              <a:rPr lang="pl-PL" dirty="0" smtClean="0"/>
+              <a:rPr lang="pl-PL" b="1" dirty="0" smtClean="0"/>
               <a:t>MVC</a:t>
             </a:r>
           </a:p>
@@ -6772,8 +6683,16 @@
               <a:buAutoNum type="arabicPeriod"/>
             </a:pPr>
             <a:r>
-              <a:rPr lang="pl-PL" dirty="0" smtClean="0"/>
-              <a:t>Spring MVC</a:t>
+              <a:rPr lang="pl-PL" b="1" dirty="0" smtClean="0"/>
+              <a:t>Spring </a:t>
+            </a:r>
+            <a:r>
+              <a:rPr lang="pl-PL" b="1" dirty="0"/>
+              <a:t>MVC – Przetwarzanie </a:t>
+            </a:r>
+            <a:r>
+              <a:rPr lang="pl-PL" b="1" dirty="0" smtClean="0"/>
+              <a:t>żądania</a:t>
             </a:r>
           </a:p>
           <a:p>
@@ -6782,9 +6701,186 @@
               <a:buAutoNum type="arabicPeriod"/>
             </a:pPr>
             <a:r>
+              <a:rPr lang="pl-PL" b="1" dirty="0" smtClean="0"/>
+              <a:t>Spring MVC – podstawy</a:t>
+            </a:r>
+            <a:endParaRPr lang="pl-PL" b="1" dirty="0"/>
+          </a:p>
+          <a:p>
+            <a:pPr marL="702900" lvl="1" indent="-342900">
+              <a:buFont typeface="+mj-lt"/>
+              <a:buAutoNum type="arabicPeriod"/>
+            </a:pPr>
+            <a:r>
               <a:rPr lang="pl-PL" dirty="0" smtClean="0"/>
-              <a:t>Konfiguracja pierwszego projektu</a:t>
-            </a:r>
+              <a:t>@</a:t>
+            </a:r>
+            <a:r>
+              <a:rPr lang="pl-PL" dirty="0" err="1" smtClean="0"/>
+              <a:t>Controler</a:t>
+            </a:r>
+            <a:endParaRPr lang="pl-PL" dirty="0"/>
+          </a:p>
+          <a:p>
+            <a:pPr marL="702900" lvl="1" indent="-342900">
+              <a:buFont typeface="+mj-lt"/>
+              <a:buAutoNum type="arabicPeriod"/>
+            </a:pPr>
+            <a:r>
+              <a:rPr lang="pl-PL" dirty="0" smtClean="0"/>
+              <a:t>Model</a:t>
+            </a:r>
+            <a:endParaRPr lang="pl-PL" dirty="0"/>
+          </a:p>
+          <a:p>
+            <a:pPr marL="702900" lvl="1" indent="-342900">
+              <a:buFont typeface="+mj-lt"/>
+              <a:buAutoNum type="arabicPeriod"/>
+            </a:pPr>
+            <a:r>
+              <a:rPr lang="pl-PL" dirty="0" err="1" smtClean="0"/>
+              <a:t>ModelAndView</a:t>
+            </a:r>
+            <a:endParaRPr lang="pl-PL" dirty="0"/>
+          </a:p>
+          <a:p>
+            <a:pPr marL="702900" lvl="1" indent="-342900">
+              <a:buFont typeface="+mj-lt"/>
+              <a:buAutoNum type="arabicPeriod"/>
+            </a:pPr>
+            <a:r>
+              <a:rPr lang="pl-PL" dirty="0"/>
+              <a:t>@</a:t>
+            </a:r>
+            <a:r>
+              <a:rPr lang="pl-PL" dirty="0" err="1"/>
+              <a:t>RequestMapping</a:t>
+            </a:r>
+            <a:r>
+              <a:rPr lang="pl-PL" dirty="0"/>
+              <a:t> (@</a:t>
+            </a:r>
+            <a:r>
+              <a:rPr lang="pl-PL" dirty="0" err="1"/>
+              <a:t>GetMapping</a:t>
+            </a:r>
+            <a:r>
+              <a:rPr lang="pl-PL" dirty="0"/>
+              <a:t>, @</a:t>
+            </a:r>
+            <a:r>
+              <a:rPr lang="pl-PL" dirty="0" err="1"/>
+              <a:t>PostMapping</a:t>
+            </a:r>
+            <a:r>
+              <a:rPr lang="pl-PL" dirty="0"/>
+              <a:t>, @</a:t>
+            </a:r>
+            <a:r>
+              <a:rPr lang="pl-PL" dirty="0" err="1"/>
+              <a:t>PutMapping</a:t>
+            </a:r>
+            <a:r>
+              <a:rPr lang="pl-PL" dirty="0"/>
+              <a:t>, @</a:t>
+            </a:r>
+            <a:r>
+              <a:rPr lang="pl-PL" dirty="0" err="1" smtClean="0"/>
+              <a:t>DeleteMapping</a:t>
+            </a:r>
+            <a:r>
+              <a:rPr lang="pl-PL" dirty="0" smtClean="0"/>
+              <a:t>)</a:t>
+            </a:r>
+          </a:p>
+          <a:p>
+            <a:pPr marL="702900" lvl="1" indent="-342900">
+              <a:buFont typeface="+mj-lt"/>
+              <a:buAutoNum type="arabicPeriod"/>
+            </a:pPr>
+            <a:r>
+              <a:rPr lang="pl-PL" dirty="0" smtClean="0"/>
+              <a:t>@</a:t>
+            </a:r>
+            <a:r>
+              <a:rPr lang="pl-PL" dirty="0" err="1" smtClean="0"/>
+              <a:t>PathVariable</a:t>
+            </a:r>
+            <a:endParaRPr lang="pl-PL" dirty="0" smtClean="0"/>
+          </a:p>
+          <a:p>
+            <a:pPr marL="702900" lvl="1" indent="-342900">
+              <a:buFont typeface="+mj-lt"/>
+              <a:buAutoNum type="arabicPeriod"/>
+            </a:pPr>
+            <a:r>
+              <a:rPr lang="pl-PL" dirty="0" smtClean="0"/>
+              <a:t>@</a:t>
+            </a:r>
+            <a:r>
+              <a:rPr lang="pl-PL" dirty="0" err="1" smtClean="0"/>
+              <a:t>RequestParam</a:t>
+            </a:r>
+            <a:endParaRPr lang="pl-PL" dirty="0" smtClean="0"/>
+          </a:p>
+          <a:p>
+            <a:pPr marL="702900" lvl="1" indent="-342900">
+              <a:buFont typeface="+mj-lt"/>
+              <a:buAutoNum type="arabicPeriod"/>
+            </a:pPr>
+            <a:r>
+              <a:rPr lang="pl-PL" dirty="0"/>
+              <a:t>@</a:t>
+            </a:r>
+            <a:r>
+              <a:rPr lang="pl-PL" dirty="0" err="1"/>
+              <a:t>ResponseBody</a:t>
+            </a:r>
+            <a:endParaRPr lang="pl-PL" dirty="0"/>
+          </a:p>
+          <a:p>
+            <a:pPr marL="541800" indent="-342900">
+              <a:buFont typeface="+mj-lt"/>
+              <a:buAutoNum type="arabicPeriod"/>
+            </a:pPr>
+            <a:r>
+              <a:rPr lang="pl-PL" b="1" dirty="0" smtClean="0"/>
+              <a:t>Uruchomienie/Debugowanie Aplikacji</a:t>
+            </a:r>
+          </a:p>
+          <a:p>
+            <a:pPr marL="541800" indent="-342900">
+              <a:buFont typeface="+mj-lt"/>
+              <a:buAutoNum type="arabicPeriod"/>
+            </a:pPr>
+            <a:r>
+              <a:rPr lang="pl-PL" b="1" dirty="0" smtClean="0"/>
+              <a:t>REST </a:t>
+            </a:r>
+            <a:r>
+              <a:rPr lang="pl-PL" b="1" dirty="0" err="1" smtClean="0"/>
+              <a:t>Template</a:t>
+            </a:r>
+            <a:endParaRPr lang="pl-PL" b="1" dirty="0" smtClean="0"/>
+          </a:p>
+          <a:p>
+            <a:pPr marL="198900" indent="0">
+              <a:buNone/>
+            </a:pPr>
+            <a:endParaRPr lang="pl-PL" b="1" dirty="0"/>
+          </a:p>
+          <a:p>
+            <a:pPr marL="360000" lvl="1" indent="0">
+              <a:buNone/>
+            </a:pPr>
+            <a:endParaRPr lang="pl-PL" dirty="0" smtClean="0"/>
+          </a:p>
+          <a:p>
+            <a:pPr marL="541800" indent="-342900">
+              <a:buFont typeface="+mj-lt"/>
+              <a:buAutoNum type="arabicPeriod"/>
+            </a:pPr>
+            <a:endParaRPr lang="pl-PL" dirty="0" smtClean="0"/>
           </a:p>
         </p:txBody>
       </p:sp>
@@ -6808,6 +6904,118 @@
 </p:sld>
 </file>
 
+<file path=ppt/slides/slide20.xml><?xml version="1.0" encoding="utf-8"?>
+<p:sld xmlns:a="http://schemas.openxmlformats.org/drawingml/2006/main" xmlns:r="http://schemas.openxmlformats.org/officeDocument/2006/relationships" xmlns:p="http://schemas.openxmlformats.org/presentationml/2006/main">
+  <p:cSld>
+    <p:spTree>
+      <p:nvGrpSpPr>
+        <p:cNvPr id="1" name=""/>
+        <p:cNvGrpSpPr/>
+        <p:nvPr/>
+      </p:nvGrpSpPr>
+      <p:grpSpPr>
+        <a:xfrm>
+          <a:off x="0" y="0"/>
+          <a:ext cx="0" cy="0"/>
+          <a:chOff x="0" y="0"/>
+          <a:chExt cx="0" cy="0"/>
+        </a:xfrm>
+      </p:grpSpPr>
+      <p:sp>
+        <p:nvSpPr>
+          <p:cNvPr id="2" name="Tytuł 1"/>
+          <p:cNvSpPr>
+            <a:spLocks noGrp="1"/>
+          </p:cNvSpPr>
+          <p:nvPr>
+            <p:ph type="title"/>
+          </p:nvPr>
+        </p:nvSpPr>
+        <p:spPr/>
+        <p:txBody>
+          <a:bodyPr/>
+          <a:lstStyle/>
+          <a:p>
+            <a:pPr algn="ctr"/>
+            <a:endParaRPr lang="pl-PL" dirty="0"/>
+          </a:p>
+        </p:txBody>
+      </p:sp>
+      <p:sp>
+        <p:nvSpPr>
+          <p:cNvPr id="3" name="Symbol zastępczy tekstu 2"/>
+          <p:cNvSpPr>
+            <a:spLocks noGrp="1"/>
+          </p:cNvSpPr>
+          <p:nvPr>
+            <p:ph type="body" sz="quarter" idx="10"/>
+          </p:nvPr>
+        </p:nvSpPr>
+        <p:spPr>
+          <a:xfrm>
+            <a:off x="871649" y="1793099"/>
+            <a:ext cx="7140237" cy="2221551"/>
+          </a:xfrm>
+        </p:spPr>
+        <p:txBody>
+          <a:bodyPr>
+            <a:noAutofit/>
+          </a:bodyPr>
+          <a:lstStyle/>
+          <a:p>
+            <a:pPr marL="198900" indent="0" algn="ctr">
+              <a:buNone/>
+            </a:pPr>
+            <a:r>
+              <a:rPr lang="pl-PL" sz="5000" dirty="0" smtClean="0"/>
+              <a:t>DZIĘKUJEMY </a:t>
+            </a:r>
+          </a:p>
+          <a:p>
+            <a:pPr marL="198900" indent="0" algn="ctr">
+              <a:buNone/>
+            </a:pPr>
+            <a:r>
+              <a:rPr lang="pl-PL" sz="5000" dirty="0" smtClean="0"/>
+              <a:t>ZA </a:t>
+            </a:r>
+          </a:p>
+          <a:p>
+            <a:pPr marL="198900" indent="0" algn="ctr">
+              <a:buNone/>
+            </a:pPr>
+            <a:r>
+              <a:rPr lang="pl-PL" sz="5000" dirty="0" smtClean="0"/>
+              <a:t>UWAGĘ </a:t>
+            </a:r>
+          </a:p>
+          <a:p>
+            <a:pPr marL="198900" indent="0" algn="ctr">
+              <a:buNone/>
+            </a:pPr>
+            <a:r>
+              <a:rPr lang="pl-PL" sz="5000" dirty="0" smtClean="0">
+                <a:sym typeface="Wingdings" panose="05000000000000000000" pitchFamily="2" charset="2"/>
+              </a:rPr>
+              <a:t></a:t>
+            </a:r>
+            <a:endParaRPr lang="pl-PL" sz="5000" dirty="0"/>
+          </a:p>
+        </p:txBody>
+      </p:sp>
+    </p:spTree>
+    <p:extLst>
+      <p:ext uri="{BB962C8B-B14F-4D97-AF65-F5344CB8AC3E}">
+        <p14:creationId xmlns:p14="http://schemas.microsoft.com/office/powerpoint/2010/main" val="2679622656"/>
+      </p:ext>
+    </p:extLst>
+  </p:cSld>
+  <p:clrMapOvr>
+    <a:masterClrMapping/>
+  </p:clrMapOvr>
+</p:sld>
+</file>
+
 <file path=ppt/slides/slide3.xml><?xml version="1.0" encoding="utf-8"?>
 <p:sld xmlns:a="http://schemas.openxmlformats.org/drawingml/2006/main" xmlns:r="http://schemas.openxmlformats.org/officeDocument/2006/relationships" xmlns:p="http://schemas.openxmlformats.org/presentationml/2006/main">
   <p:cSld>
@@ -6864,6 +7072,53 @@
             <a:normAutofit/>
           </a:bodyPr>
           <a:lstStyle/>
+          <a:p>
+            <a:pPr marL="541800" indent="-342900">
+              <a:buFont typeface="+mj-lt"/>
+              <a:buAutoNum type="arabicPeriod"/>
+            </a:pPr>
+            <a:r>
+              <a:rPr lang="pl-PL" b="1" dirty="0" smtClean="0"/>
+              <a:t>Spring </a:t>
+            </a:r>
+            <a:r>
+              <a:rPr lang="pl-PL" b="1" dirty="0" err="1" smtClean="0"/>
+              <a:t>MockMVC</a:t>
+            </a:r>
+            <a:endParaRPr lang="pl-PL" b="1" dirty="0"/>
+          </a:p>
+          <a:p>
+            <a:pPr marL="702900" lvl="1" indent="-342900">
+              <a:buFont typeface="+mj-lt"/>
+              <a:buAutoNum type="arabicPeriod"/>
+            </a:pPr>
+            <a:r>
+              <a:rPr lang="pl-PL" dirty="0" smtClean="0"/>
+              <a:t>Na czym polega</a:t>
+            </a:r>
+            <a:endParaRPr lang="pl-PL" dirty="0"/>
+          </a:p>
+          <a:p>
+            <a:pPr marL="702900" lvl="1" indent="-342900">
+              <a:buFont typeface="+mj-lt"/>
+              <a:buAutoNum type="arabicPeriod"/>
+            </a:pPr>
+            <a:r>
+              <a:rPr lang="pl-PL" dirty="0" smtClean="0"/>
+              <a:t>Podstawowa Konfiguracja</a:t>
+            </a:r>
+          </a:p>
+          <a:p>
+            <a:pPr marL="702900" lvl="1" indent="-342900">
+              <a:buFont typeface="+mj-lt"/>
+              <a:buAutoNum type="arabicPeriod"/>
+            </a:pPr>
+            <a:r>
+              <a:rPr lang="pl-PL" dirty="0" smtClean="0"/>
+              <a:t>Przykładowy test</a:t>
+            </a:r>
+            <a:endParaRPr lang="pl-PL" dirty="0"/>
+          </a:p>
           <a:p>
             <a:pPr marL="702900" lvl="1" indent="-342900">
               <a:buFont typeface="+mj-lt"/>
@@ -6983,9 +7238,113 @@
           </a:p>
         </p:txBody>
       </p:sp>
+      <p:sp>
+        <p:nvSpPr>
+          <p:cNvPr id="7" name="pole tekstowe 6"/>
+          <p:cNvSpPr txBox="1"/>
+          <p:nvPr/>
+        </p:nvSpPr>
+        <p:spPr>
+          <a:xfrm>
+            <a:off x="189781" y="1940943"/>
+            <a:ext cx="4779034" cy="3693319"/>
+          </a:xfrm>
+          <a:prstGeom prst="rect">
+            <a:avLst/>
+          </a:prstGeom>
+          <a:noFill/>
+        </p:spPr>
+        <p:txBody>
+          <a:bodyPr wrap="square" rtlCol="0">
+            <a:spAutoFit/>
+          </a:bodyPr>
+          <a:lstStyle/>
+          <a:p>
+            <a:pPr marL="285750" indent="-285750">
+              <a:buFont typeface="Arial" panose="020B0604020202020204" pitchFamily="34" charset="0"/>
+              <a:buChar char="•"/>
+            </a:pPr>
+            <a:r>
+              <a:rPr lang="pl-PL" dirty="0"/>
+              <a:t>Model – Warstwa odpowiedzialna za zarządzanie danymi</a:t>
+            </a:r>
+            <a:r>
+              <a:rPr lang="pl-PL" dirty="0" smtClean="0"/>
+              <a:t>. </a:t>
+            </a:r>
+            <a:r>
+              <a:rPr lang="pl-PL" dirty="0" smtClean="0"/>
+              <a:t>Zawiera logikę aplikacji</a:t>
+            </a:r>
+            <a:endParaRPr lang="pl-PL" dirty="0" smtClean="0"/>
+          </a:p>
+          <a:p>
+            <a:pPr marL="285750" indent="-285750">
+              <a:buFont typeface="Arial" panose="020B0604020202020204" pitchFamily="34" charset="0"/>
+              <a:buChar char="•"/>
+            </a:pPr>
+            <a:r>
+              <a:rPr lang="pl-PL" dirty="0" err="1" smtClean="0"/>
+              <a:t>View</a:t>
+            </a:r>
+            <a:r>
+              <a:rPr lang="pl-PL" dirty="0" smtClean="0"/>
+              <a:t> – Odpowiedzialny </a:t>
+            </a:r>
+            <a:r>
+              <a:rPr lang="pl-PL" dirty="0"/>
+              <a:t>za wyświetlanie danych </a:t>
+            </a:r>
+            <a:r>
+              <a:rPr lang="pl-PL" dirty="0" smtClean="0"/>
+              <a:t>w określonej formie. </a:t>
+            </a:r>
+            <a:endParaRPr lang="pl-PL" dirty="0" smtClean="0"/>
+          </a:p>
+          <a:p>
+            <a:pPr marL="285750" indent="-285750">
+              <a:buFont typeface="Arial" panose="020B0604020202020204" pitchFamily="34" charset="0"/>
+              <a:buChar char="•"/>
+            </a:pPr>
+            <a:r>
+              <a:rPr lang="pl-PL" dirty="0"/>
+              <a:t>Controller – </a:t>
+            </a:r>
+            <a:r>
+              <a:rPr lang="pl-PL" dirty="0" smtClean="0"/>
+              <a:t>kontroluje przepływa danych do modelu i aktualizuje widok za każdym razem gdy model ulegnie zmianie. </a:t>
+            </a:r>
+          </a:p>
+          <a:p>
+            <a:pPr marL="285750" indent="-285750">
+              <a:buFont typeface="Arial" panose="020B0604020202020204" pitchFamily="34" charset="0"/>
+              <a:buChar char="•"/>
+            </a:pPr>
+            <a:endParaRPr lang="pl-PL" dirty="0"/>
+          </a:p>
+          <a:p>
+            <a:pPr marL="285750" indent="-285750">
+              <a:buFont typeface="Arial" panose="020B0604020202020204" pitchFamily="34" charset="0"/>
+              <a:buChar char="•"/>
+            </a:pPr>
+            <a:r>
+              <a:rPr lang="pl-PL" dirty="0" smtClean="0"/>
+              <a:t>Wzorzec MVC – Umożliwia odseparowanie od siebie elementów aplikacji dzięki czemu staje się ona bardziej elastyczna i łatwiejsza w zarządzaniu. </a:t>
+            </a:r>
+            <a:endParaRPr lang="pl-PL" dirty="0" smtClean="0"/>
+          </a:p>
+          <a:p>
+            <a:pPr marL="285750" indent="-285750">
+              <a:buFont typeface="Arial" panose="020B0604020202020204" pitchFamily="34" charset="0"/>
+              <a:buChar char="•"/>
+            </a:pPr>
+            <a:endParaRPr lang="pl-PL" dirty="0"/>
+          </a:p>
+        </p:txBody>
+      </p:sp>
       <p:pic>
         <p:nvPicPr>
-          <p:cNvPr id="4" name="Obraz 3"/>
+          <p:cNvPr id="5" name="Obraz 4"/>
           <p:cNvPicPr>
             <a:picLocks noChangeAspect="1"/>
           </p:cNvPicPr>
@@ -6999,113 +7358,14 @@
         </p:blipFill>
         <p:spPr>
           <a:xfrm>
-            <a:off x="5622355" y="1322369"/>
-            <a:ext cx="2695575" cy="4657725"/>
+            <a:off x="4968815" y="1992536"/>
+            <a:ext cx="4039204" cy="3183313"/>
           </a:xfrm>
           <a:prstGeom prst="rect">
             <a:avLst/>
           </a:prstGeom>
         </p:spPr>
       </p:pic>
-      <p:sp>
-        <p:nvSpPr>
-          <p:cNvPr id="7" name="pole tekstowe 6"/>
-          <p:cNvSpPr txBox="1"/>
-          <p:nvPr/>
-        </p:nvSpPr>
-        <p:spPr>
-          <a:xfrm>
-            <a:off x="189781" y="1940943"/>
-            <a:ext cx="4779034" cy="2862322"/>
-          </a:xfrm>
-          <a:prstGeom prst="rect">
-            <a:avLst/>
-          </a:prstGeom>
-          <a:noFill/>
-        </p:spPr>
-        <p:txBody>
-          <a:bodyPr wrap="square" rtlCol="0">
-            <a:spAutoFit/>
-          </a:bodyPr>
-          <a:lstStyle/>
-          <a:p>
-            <a:pPr marL="285750" indent="-285750">
-              <a:buFont typeface="Arial" panose="020B0604020202020204" pitchFamily="34" charset="0"/>
-              <a:buChar char="•"/>
-            </a:pPr>
-            <a:r>
-              <a:rPr lang="pl-PL" dirty="0"/>
-              <a:t>Model – Warstwa odpowiedzialna za zarządzanie danymi</a:t>
-            </a:r>
-            <a:r>
-              <a:rPr lang="pl-PL" dirty="0" smtClean="0"/>
-              <a:t>.</a:t>
-            </a:r>
-          </a:p>
-          <a:p>
-            <a:pPr marL="285750" indent="-285750">
-              <a:buFont typeface="Arial" panose="020B0604020202020204" pitchFamily="34" charset="0"/>
-              <a:buChar char="•"/>
-            </a:pPr>
-            <a:r>
-              <a:rPr lang="pl-PL" dirty="0" err="1" smtClean="0"/>
-              <a:t>View</a:t>
-            </a:r>
-            <a:r>
-              <a:rPr lang="pl-PL" dirty="0" smtClean="0"/>
-              <a:t> – Odpowiedzialny </a:t>
-            </a:r>
-            <a:r>
-              <a:rPr lang="pl-PL" dirty="0"/>
-              <a:t>za wyświetlanie danych dla użytkownika w odpowiedniej postaci</a:t>
-            </a:r>
-            <a:r>
-              <a:rPr lang="pl-PL" dirty="0" smtClean="0"/>
-              <a:t>.</a:t>
-            </a:r>
-          </a:p>
-          <a:p>
-            <a:pPr marL="285750" indent="-285750">
-              <a:buFont typeface="Arial" panose="020B0604020202020204" pitchFamily="34" charset="0"/>
-              <a:buChar char="•"/>
-            </a:pPr>
-            <a:r>
-              <a:rPr lang="pl-PL" dirty="0"/>
-              <a:t>Controller – nadzoruje interakcje pomiędzy widokiem i modelem</a:t>
-            </a:r>
-            <a:r>
-              <a:rPr lang="pl-PL" dirty="0" smtClean="0"/>
-              <a:t>.</a:t>
-            </a:r>
-          </a:p>
-          <a:p>
-            <a:pPr marL="285750" indent="-285750">
-              <a:buFont typeface="Arial" panose="020B0604020202020204" pitchFamily="34" charset="0"/>
-              <a:buChar char="•"/>
-            </a:pPr>
-            <a:r>
-              <a:rPr lang="pl-PL" dirty="0"/>
-              <a:t>Event – w przypadku aplikacji webowych </a:t>
-            </a:r>
-            <a:r>
-              <a:rPr lang="pl-PL" dirty="0" err="1"/>
-              <a:t>request</a:t>
-            </a:r>
-            <a:r>
-              <a:rPr lang="pl-PL" dirty="0"/>
-              <a:t> od przeglądarki</a:t>
-            </a:r>
-            <a:endParaRPr lang="pl-PL" dirty="0" smtClean="0"/>
-          </a:p>
-          <a:p>
-            <a:pPr marL="285750" indent="-285750">
-              <a:buFont typeface="Arial" panose="020B0604020202020204" pitchFamily="34" charset="0"/>
-              <a:buChar char="•"/>
-            </a:pPr>
-            <a:endParaRPr lang="pl-PL" dirty="0"/>
-          </a:p>
-        </p:txBody>
-      </p:sp>
     </p:spTree>
     <p:extLst>
       <p:ext uri="{BB962C8B-B14F-4D97-AF65-F5344CB8AC3E}">

</xml_diff>

<commit_message>
presentation update and refactor
</commit_message>
<xml_diff>
--- a/Spring MVC.pptx
+++ b/Spring MVC.pptx
@@ -26,7 +26,7 @@
     <p:sldId id="398" r:id="rId17"/>
     <p:sldId id="399" r:id="rId18"/>
     <p:sldId id="401" r:id="rId19"/>
-    <p:sldId id="402" r:id="rId20"/>
+    <p:sldId id="405" r:id="rId20"/>
     <p:sldId id="386" r:id="rId21"/>
   </p:sldIdLst>
   <p:sldSz cx="9144000" cy="6858000" type="screen4x3"/>
@@ -149,7 +149,7 @@
             <p14:sldId id="398"/>
             <p14:sldId id="399"/>
             <p14:sldId id="401"/>
-            <p14:sldId id="402"/>
+            <p14:sldId id="405"/>
             <p14:sldId id="386"/>
           </p14:sldIdLst>
         </p14:section>
@@ -258,7 +258,7 @@
           <a:p>
             <a:fld id="{18DA1CCD-4AB1-40EE-B21B-789687229DC3}" type="datetimeFigureOut">
               <a:rPr lang="pl-PL" smtClean="0"/>
-              <a:t>2017-04-12</a:t>
+              <a:t>2017-04-13</a:t>
             </a:fld>
             <a:endParaRPr lang="pl-PL"/>
           </a:p>
@@ -4637,14 +4637,14 @@
       </p:sp>
       <p:sp>
         <p:nvSpPr>
-          <p:cNvPr id="3" name="pole tekstowe 2"/>
+          <p:cNvPr id="5" name="pole tekstowe 4"/>
           <p:cNvSpPr txBox="1"/>
           <p:nvPr/>
         </p:nvSpPr>
         <p:spPr>
           <a:xfrm>
-            <a:off x="120771" y="1871932"/>
-            <a:ext cx="7315200" cy="646331"/>
+            <a:off x="465826" y="1043796"/>
+            <a:ext cx="8212347" cy="646331"/>
           </a:xfrm>
           <a:prstGeom prst="rect">
             <a:avLst/>
@@ -4657,13 +4657,74 @@
           </a:bodyPr>
           <a:lstStyle/>
           <a:p>
-            <a:r>
-              <a:rPr lang="pl-PL" dirty="0"/>
-              <a:t>http://stackoverflow.com/questions/11291933/requestbody-and-responsebody-annotations-in-spring</a:t>
-            </a:r>
-          </a:p>
-        </p:txBody>
-      </p:sp>
+            <a:pPr marL="285750" indent="-285750">
+              <a:buFont typeface="Arial" panose="020B0604020202020204" pitchFamily="34" charset="0"/>
+              <a:buChar char="•"/>
+            </a:pPr>
+            <a:r>
+              <a:rPr lang="pl-PL" dirty="0" smtClean="0"/>
+              <a:t>Określa że wartość zwracana przez metodę ma zostać umieszczona bezpośrednio w „HTTP </a:t>
+            </a:r>
+            <a:r>
+              <a:rPr lang="pl-PL" dirty="0" err="1" smtClean="0"/>
+              <a:t>response</a:t>
+            </a:r>
+            <a:r>
+              <a:rPr lang="pl-PL" dirty="0" smtClean="0"/>
+              <a:t> body”.   </a:t>
+            </a:r>
+            <a:endParaRPr lang="pl-PL" dirty="0" smtClean="0"/>
+          </a:p>
+        </p:txBody>
+      </p:sp>
+      <p:pic>
+        <p:nvPicPr>
+          <p:cNvPr id="6" name="Obraz 5"/>
+          <p:cNvPicPr>
+            <a:picLocks noChangeAspect="1"/>
+          </p:cNvPicPr>
+          <p:nvPr/>
+        </p:nvPicPr>
+        <p:blipFill>
+          <a:blip r:embed="rId2"/>
+          <a:stretch>
+            <a:fillRect/>
+          </a:stretch>
+        </p:blipFill>
+        <p:spPr>
+          <a:xfrm>
+            <a:off x="561975" y="2447330"/>
+            <a:ext cx="8020050" cy="962025"/>
+          </a:xfrm>
+          <a:prstGeom prst="rect">
+            <a:avLst/>
+          </a:prstGeom>
+        </p:spPr>
+      </p:pic>
+      <p:pic>
+        <p:nvPicPr>
+          <p:cNvPr id="7" name="Obraz 6"/>
+          <p:cNvPicPr>
+            <a:picLocks noChangeAspect="1"/>
+          </p:cNvPicPr>
+          <p:nvPr/>
+        </p:nvPicPr>
+        <p:blipFill>
+          <a:blip r:embed="rId3"/>
+          <a:stretch>
+            <a:fillRect/>
+          </a:stretch>
+        </p:blipFill>
+        <p:spPr>
+          <a:xfrm>
+            <a:off x="2214561" y="3841271"/>
+            <a:ext cx="4714875" cy="1866900"/>
+          </a:xfrm>
+          <a:prstGeom prst="rect">
+            <a:avLst/>
+          </a:prstGeom>
+        </p:spPr>
+      </p:pic>
     </p:spTree>
     <p:extLst>
       <p:ext uri="{BB962C8B-B14F-4D97-AF65-F5344CB8AC3E}">
@@ -4718,11 +4779,7 @@
           <a:p>
             <a:r>
               <a:rPr lang="pl-PL" dirty="0" smtClean="0"/>
-              <a:t>Uruchomienie/Debugowanie </a:t>
-            </a:r>
-            <a:r>
-              <a:rPr lang="pl-PL" dirty="0" smtClean="0"/>
-              <a:t>Aplikacji</a:t>
+              <a:t>Uruchomienie/Debugowanie Aplikacji</a:t>
             </a:r>
             <a:endParaRPr lang="pl-PL" dirty="0"/>
           </a:p>
@@ -6026,9 +6083,144 @@
           </a:p>
         </p:txBody>
       </p:sp>
+      <p:sp>
+        <p:nvSpPr>
+          <p:cNvPr id="5" name="pole tekstowe 4"/>
+          <p:cNvSpPr txBox="1"/>
+          <p:nvPr/>
+        </p:nvSpPr>
+        <p:spPr>
+          <a:xfrm>
+            <a:off x="677173" y="3864634"/>
+            <a:ext cx="7789653" cy="1754326"/>
+          </a:xfrm>
+          <a:prstGeom prst="rect">
+            <a:avLst/>
+          </a:prstGeom>
+          <a:noFill/>
+        </p:spPr>
+        <p:txBody>
+          <a:bodyPr wrap="square" rtlCol="0">
+            <a:spAutoFit/>
+          </a:bodyPr>
+          <a:lstStyle/>
+          <a:p>
+            <a:pPr marL="285750" indent="-285750">
+              <a:buFont typeface="Arial" panose="020B0604020202020204" pitchFamily="34" charset="0"/>
+              <a:buChar char="•"/>
+            </a:pPr>
+            <a:r>
+              <a:rPr lang="pl-PL" dirty="0" smtClean="0"/>
+              <a:t>@</a:t>
+            </a:r>
+            <a:r>
+              <a:rPr lang="pl-PL" dirty="0" err="1" smtClean="0"/>
+              <a:t>RunWith</a:t>
+            </a:r>
+            <a:r>
+              <a:rPr lang="pl-PL" dirty="0" smtClean="0"/>
+              <a:t>(</a:t>
+            </a:r>
+            <a:r>
+              <a:rPr lang="pl-PL" dirty="0" err="1" smtClean="0"/>
+              <a:t>SpringRunner.class</a:t>
+            </a:r>
+            <a:r>
+              <a:rPr lang="pl-PL" dirty="0" smtClean="0"/>
+              <a:t>) – określa </a:t>
+            </a:r>
+            <a:r>
+              <a:rPr lang="pl-PL" dirty="0" err="1" smtClean="0"/>
+              <a:t>Runner</a:t>
+            </a:r>
+            <a:r>
+              <a:rPr lang="pl-PL" dirty="0" smtClean="0"/>
+              <a:t>, który ma być wykorzystywany przez </a:t>
+            </a:r>
+            <a:r>
+              <a:rPr lang="pl-PL" dirty="0" err="1" smtClean="0"/>
+              <a:t>Junit</a:t>
+            </a:r>
+            <a:r>
+              <a:rPr lang="pl-PL" dirty="0" smtClean="0"/>
+              <a:t>. Klasa </a:t>
+            </a:r>
+            <a:r>
+              <a:rPr lang="pl-PL" dirty="0" err="1" smtClean="0"/>
+              <a:t>SpringRunner</a:t>
+            </a:r>
+            <a:r>
+              <a:rPr lang="pl-PL" dirty="0" smtClean="0"/>
+              <a:t> jest aliasem </a:t>
+            </a:r>
+            <a:r>
+              <a:rPr lang="pl-PL" dirty="0"/>
+              <a:t>do </a:t>
+            </a:r>
+            <a:r>
+              <a:rPr lang="pl-PL" dirty="0" smtClean="0"/>
+              <a:t>SpringJUnit4ClassRunner. Umożliwia korzystanie z testowego kontekstu </a:t>
+            </a:r>
+            <a:r>
+              <a:rPr lang="pl-PL" dirty="0" err="1" smtClean="0"/>
+              <a:t>Springa</a:t>
+            </a:r>
+            <a:r>
+              <a:rPr lang="pl-PL" dirty="0" smtClean="0"/>
+              <a:t>.</a:t>
+            </a:r>
+          </a:p>
+          <a:p>
+            <a:pPr marL="285750" indent="-285750">
+              <a:buFont typeface="Arial" panose="020B0604020202020204" pitchFamily="34" charset="0"/>
+              <a:buChar char="•"/>
+            </a:pPr>
+            <a:r>
+              <a:rPr lang="pl-PL" dirty="0" smtClean="0"/>
+              <a:t>@</a:t>
+            </a:r>
+            <a:r>
+              <a:rPr lang="pl-PL" dirty="0" err="1" smtClean="0"/>
+              <a:t>SpringBootTest</a:t>
+            </a:r>
+            <a:r>
+              <a:rPr lang="pl-PL" dirty="0" smtClean="0"/>
+              <a:t> </a:t>
+            </a:r>
+            <a:r>
+              <a:rPr lang="pl-PL" dirty="0" smtClean="0"/>
+              <a:t>– Umieszczona nad klasę określa ją jako testową</a:t>
+            </a:r>
+            <a:endParaRPr lang="pl-PL" dirty="0"/>
+          </a:p>
+          <a:p>
+            <a:pPr marL="285750" indent="-285750">
+              <a:buFont typeface="Arial" panose="020B0604020202020204" pitchFamily="34" charset="0"/>
+              <a:buChar char="•"/>
+            </a:pPr>
+            <a:r>
+              <a:rPr lang="pl-PL" dirty="0" smtClean="0"/>
+              <a:t>@</a:t>
+            </a:r>
+            <a:r>
+              <a:rPr lang="pl-PL" dirty="0" err="1" smtClean="0"/>
+              <a:t>AutoConfigureMockMvc</a:t>
+            </a:r>
+            <a:r>
+              <a:rPr lang="pl-PL" dirty="0" smtClean="0"/>
+              <a:t> -  Uruchamia automatyczną konfiguracje </a:t>
+            </a:r>
+            <a:r>
+              <a:rPr lang="pl-PL" dirty="0" err="1" smtClean="0"/>
+              <a:t>MockMvc</a:t>
+            </a:r>
+            <a:endParaRPr lang="pl-PL" dirty="0"/>
+          </a:p>
+        </p:txBody>
+      </p:sp>
       <p:pic>
         <p:nvPicPr>
-          <p:cNvPr id="3" name="Obraz 2"/>
+          <p:cNvPr id="7" name="Obraz 6"/>
           <p:cNvPicPr>
             <a:picLocks noChangeAspect="1"/>
           </p:cNvPicPr>
@@ -6042,151 +6234,14 @@
         </p:blipFill>
         <p:spPr>
           <a:xfrm>
-            <a:off x="1645379" y="1418243"/>
-            <a:ext cx="4999226" cy="1057538"/>
+            <a:off x="1799775" y="1555697"/>
+            <a:ext cx="4690434" cy="1645575"/>
           </a:xfrm>
           <a:prstGeom prst="rect">
             <a:avLst/>
           </a:prstGeom>
         </p:spPr>
       </p:pic>
-      <p:sp>
-        <p:nvSpPr>
-          <p:cNvPr id="5" name="pole tekstowe 4"/>
-          <p:cNvSpPr txBox="1"/>
-          <p:nvPr/>
-        </p:nvSpPr>
-        <p:spPr>
-          <a:xfrm>
-            <a:off x="612474" y="3148642"/>
-            <a:ext cx="7789653" cy="2031325"/>
-          </a:xfrm>
-          <a:prstGeom prst="rect">
-            <a:avLst/>
-          </a:prstGeom>
-          <a:noFill/>
-        </p:spPr>
-        <p:txBody>
-          <a:bodyPr wrap="square" rtlCol="0">
-            <a:spAutoFit/>
-          </a:bodyPr>
-          <a:lstStyle/>
-          <a:p>
-            <a:pPr marL="285750" indent="-285750">
-              <a:buFont typeface="Arial" panose="020B0604020202020204" pitchFamily="34" charset="0"/>
-              <a:buChar char="•"/>
-            </a:pPr>
-            <a:r>
-              <a:rPr lang="pl-PL" dirty="0" smtClean="0"/>
-              <a:t>@</a:t>
-            </a:r>
-            <a:r>
-              <a:rPr lang="pl-PL" dirty="0" err="1" smtClean="0"/>
-              <a:t>RunWith</a:t>
-            </a:r>
-            <a:r>
-              <a:rPr lang="pl-PL" dirty="0" smtClean="0"/>
-              <a:t>(</a:t>
-            </a:r>
-            <a:r>
-              <a:rPr lang="pl-PL" dirty="0" err="1" smtClean="0"/>
-              <a:t>SpringRunner.class</a:t>
-            </a:r>
-            <a:r>
-              <a:rPr lang="pl-PL" dirty="0" smtClean="0"/>
-              <a:t>) – określa </a:t>
-            </a:r>
-            <a:r>
-              <a:rPr lang="pl-PL" dirty="0" err="1" smtClean="0"/>
-              <a:t>Runner</a:t>
-            </a:r>
-            <a:r>
-              <a:rPr lang="pl-PL" dirty="0" smtClean="0"/>
-              <a:t>, który ma być wykorzystywany przez </a:t>
-            </a:r>
-            <a:r>
-              <a:rPr lang="pl-PL" dirty="0" err="1" smtClean="0"/>
-              <a:t>Junit</a:t>
-            </a:r>
-            <a:r>
-              <a:rPr lang="pl-PL" dirty="0" smtClean="0"/>
-              <a:t>. Klasa </a:t>
-            </a:r>
-            <a:r>
-              <a:rPr lang="pl-PL" dirty="0" err="1" smtClean="0"/>
-              <a:t>SpringRunner</a:t>
-            </a:r>
-            <a:r>
-              <a:rPr lang="pl-PL" dirty="0" smtClean="0"/>
-              <a:t> jest aliasem </a:t>
-            </a:r>
-            <a:r>
-              <a:rPr lang="pl-PL" dirty="0"/>
-              <a:t>do </a:t>
-            </a:r>
-            <a:r>
-              <a:rPr lang="pl-PL" dirty="0" smtClean="0"/>
-              <a:t>SpringJUnit4ClassRunner. Umożliwia korzystanie z testowego kontekstu </a:t>
-            </a:r>
-            <a:r>
-              <a:rPr lang="pl-PL" dirty="0" err="1" smtClean="0"/>
-              <a:t>Springa</a:t>
-            </a:r>
-            <a:r>
-              <a:rPr lang="pl-PL" dirty="0" smtClean="0"/>
-              <a:t>.</a:t>
-            </a:r>
-          </a:p>
-          <a:p>
-            <a:pPr marL="285750" indent="-285750">
-              <a:buFont typeface="Arial" panose="020B0604020202020204" pitchFamily="34" charset="0"/>
-              <a:buChar char="•"/>
-            </a:pPr>
-            <a:r>
-              <a:rPr lang="pl-PL" dirty="0" smtClean="0"/>
-              <a:t>@</a:t>
-            </a:r>
-            <a:r>
-              <a:rPr lang="pl-PL" dirty="0" err="1" smtClean="0"/>
-              <a:t>SpringBootTest</a:t>
-            </a:r>
-            <a:r>
-              <a:rPr lang="pl-PL" dirty="0" smtClean="0"/>
-              <a:t> </a:t>
-            </a:r>
-          </a:p>
-          <a:p>
-            <a:pPr marL="285750" indent="-285750">
-              <a:buFont typeface="Arial" panose="020B0604020202020204" pitchFamily="34" charset="0"/>
-              <a:buChar char="•"/>
-            </a:pPr>
-            <a:endParaRPr lang="pl-PL" dirty="0"/>
-          </a:p>
-          <a:p>
-            <a:pPr marL="285750" indent="-285750">
-              <a:buFont typeface="Arial" panose="020B0604020202020204" pitchFamily="34" charset="0"/>
-              <a:buChar char="•"/>
-            </a:pPr>
-            <a:r>
-              <a:rPr lang="pl-PL" dirty="0" smtClean="0"/>
-              <a:t>@</a:t>
-            </a:r>
-            <a:r>
-              <a:rPr lang="pl-PL" dirty="0" err="1" smtClean="0"/>
-              <a:t>AutoConfigureMockMvc</a:t>
-            </a:r>
-            <a:r>
-              <a:rPr lang="pl-PL" dirty="0" smtClean="0"/>
-              <a:t> -  Uruchamia automatyczną konfiguracje </a:t>
-            </a:r>
-            <a:r>
-              <a:rPr lang="pl-PL" dirty="0" err="1" smtClean="0"/>
-              <a:t>MockMvc</a:t>
-            </a:r>
-            <a:endParaRPr lang="pl-PL" dirty="0"/>
-          </a:p>
-        </p:txBody>
-      </p:sp>
     </p:spTree>
     <p:extLst>
       <p:ext uri="{BB962C8B-B14F-4D97-AF65-F5344CB8AC3E}">
@@ -6240,50 +6295,12 @@
           <a:lstStyle/>
           <a:p>
             <a:r>
-              <a:rPr lang="en-US" dirty="0"/>
-              <a:t>Spring </a:t>
-            </a:r>
-            <a:r>
-              <a:rPr lang="en-US" dirty="0" err="1" smtClean="0"/>
-              <a:t>MockMVC</a:t>
-            </a:r>
-            <a:r>
               <a:rPr lang="pl-PL" dirty="0" smtClean="0"/>
-              <a:t> - Konfiguracja</a:t>
-            </a:r>
-            <a:r>
-              <a:rPr lang="en-US" dirty="0" smtClean="0"/>
-              <a:t> </a:t>
+              <a:t>Przykładowy test</a:t>
             </a:r>
             <a:endParaRPr lang="pl-PL" dirty="0">
               <a:latin typeface=""/>
             </a:endParaRPr>
-          </a:p>
-        </p:txBody>
-      </p:sp>
-      <p:sp>
-        <p:nvSpPr>
-          <p:cNvPr id="4" name="pole tekstowe 3"/>
-          <p:cNvSpPr txBox="1"/>
-          <p:nvPr/>
-        </p:nvSpPr>
-        <p:spPr>
-          <a:xfrm>
-            <a:off x="862642" y="1233577"/>
-            <a:ext cx="6564701" cy="369332"/>
-          </a:xfrm>
-          <a:prstGeom prst="rect">
-            <a:avLst/>
-          </a:prstGeom>
-          <a:noFill/>
-        </p:spPr>
-        <p:txBody>
-          <a:bodyPr wrap="square" rtlCol="0">
-            <a:spAutoFit/>
-          </a:bodyPr>
-          <a:lstStyle/>
-          <a:p>
-            <a:endParaRPr lang="pl-PL" dirty="0"/>
           </a:p>
         </p:txBody>
       </p:sp>
@@ -6454,147 +6471,34 @@
           </a:p>
         </p:txBody>
       </p:sp>
-      <p:sp>
-        <p:nvSpPr>
-          <p:cNvPr id="5" name="pole tekstowe 4"/>
-          <p:cNvSpPr txBox="1"/>
+      <p:pic>
+        <p:nvPicPr>
+          <p:cNvPr id="7" name="Obraz 6"/>
+          <p:cNvPicPr>
+            <a:picLocks noChangeAspect="1"/>
+          </p:cNvPicPr>
           <p:nvPr/>
-        </p:nvSpPr>
-        <p:spPr>
-          <a:xfrm>
-            <a:off x="677173" y="1228158"/>
-            <a:ext cx="7789653" cy="2031325"/>
+        </p:nvPicPr>
+        <p:blipFill>
+          <a:blip r:embed="rId2"/>
+          <a:stretch>
+            <a:fillRect/>
+          </a:stretch>
+        </p:blipFill>
+        <p:spPr>
+          <a:xfrm>
+            <a:off x="223837" y="2466975"/>
+            <a:ext cx="8696325" cy="1924050"/>
           </a:xfrm>
           <a:prstGeom prst="rect">
             <a:avLst/>
           </a:prstGeom>
-          <a:noFill/>
-        </p:spPr>
-        <p:txBody>
-          <a:bodyPr wrap="square" rtlCol="0">
-            <a:spAutoFit/>
-          </a:bodyPr>
-          <a:lstStyle/>
-          <a:p>
-            <a:pPr marL="285750" indent="-285750">
-              <a:buFont typeface="Arial" panose="020B0604020202020204" pitchFamily="34" charset="0"/>
-              <a:buChar char="•"/>
-            </a:pPr>
-            <a:r>
-              <a:rPr lang="pl-PL" dirty="0" smtClean="0"/>
-              <a:t>@</a:t>
-            </a:r>
-            <a:r>
-              <a:rPr lang="pl-PL" dirty="0" err="1" smtClean="0"/>
-              <a:t>RunWith</a:t>
-            </a:r>
-            <a:r>
-              <a:rPr lang="pl-PL" dirty="0" smtClean="0"/>
-              <a:t>(</a:t>
-            </a:r>
-            <a:r>
-              <a:rPr lang="pl-PL" dirty="0" err="1" smtClean="0"/>
-              <a:t>SpringRunner.class</a:t>
-            </a:r>
-            <a:r>
-              <a:rPr lang="pl-PL" dirty="0" smtClean="0"/>
-              <a:t>) – określa </a:t>
-            </a:r>
-            <a:r>
-              <a:rPr lang="pl-PL" dirty="0" err="1" smtClean="0"/>
-              <a:t>Runner</a:t>
-            </a:r>
-            <a:r>
-              <a:rPr lang="pl-PL" dirty="0" smtClean="0"/>
-              <a:t>, który ma być wykorzystywany przez </a:t>
-            </a:r>
-            <a:r>
-              <a:rPr lang="pl-PL" dirty="0" err="1" smtClean="0"/>
-              <a:t>Junit</a:t>
-            </a:r>
-            <a:r>
-              <a:rPr lang="pl-PL" dirty="0" smtClean="0"/>
-              <a:t>. Klasa </a:t>
-            </a:r>
-            <a:r>
-              <a:rPr lang="pl-PL" dirty="0" err="1" smtClean="0"/>
-              <a:t>SpringRunner</a:t>
-            </a:r>
-            <a:r>
-              <a:rPr lang="pl-PL" dirty="0" smtClean="0"/>
-              <a:t> jest aliasem </a:t>
-            </a:r>
-            <a:r>
-              <a:rPr lang="pl-PL" dirty="0"/>
-              <a:t>do </a:t>
-            </a:r>
-            <a:r>
-              <a:rPr lang="pl-PL" dirty="0" smtClean="0"/>
-              <a:t>SpringJUnit4ClassRunner. Umożliwia korzystanie z testowego kontekstu </a:t>
-            </a:r>
-            <a:r>
-              <a:rPr lang="pl-PL" dirty="0" err="1" smtClean="0"/>
-              <a:t>Springa</a:t>
-            </a:r>
-            <a:r>
-              <a:rPr lang="pl-PL" dirty="0" smtClean="0"/>
-              <a:t>.</a:t>
-            </a:r>
-          </a:p>
-          <a:p>
-            <a:pPr marL="285750" indent="-285750">
-              <a:buFont typeface="Arial" panose="020B0604020202020204" pitchFamily="34" charset="0"/>
-              <a:buChar char="•"/>
-            </a:pPr>
-            <a:r>
-              <a:rPr lang="pl-PL" dirty="0" smtClean="0"/>
-              <a:t>@</a:t>
-            </a:r>
-            <a:r>
-              <a:rPr lang="pl-PL" dirty="0" err="1" smtClean="0"/>
-              <a:t>SpringBootTest</a:t>
-            </a:r>
-            <a:r>
-              <a:rPr lang="pl-PL" dirty="0" smtClean="0"/>
-              <a:t> </a:t>
-            </a:r>
-          </a:p>
-          <a:p>
-            <a:pPr marL="285750" indent="-285750">
-              <a:buFont typeface="Arial" panose="020B0604020202020204" pitchFamily="34" charset="0"/>
-              <a:buChar char="•"/>
-            </a:pPr>
-            <a:endParaRPr lang="pl-PL" dirty="0"/>
-          </a:p>
-          <a:p>
-            <a:pPr marL="285750" indent="-285750">
-              <a:buFont typeface="Arial" panose="020B0604020202020204" pitchFamily="34" charset="0"/>
-              <a:buChar char="•"/>
-            </a:pPr>
-            <a:r>
-              <a:rPr lang="pl-PL" dirty="0" smtClean="0"/>
-              <a:t>@</a:t>
-            </a:r>
-            <a:r>
-              <a:rPr lang="pl-PL" dirty="0" err="1" smtClean="0"/>
-              <a:t>AutoConfigureMockMvc</a:t>
-            </a:r>
-            <a:r>
-              <a:rPr lang="pl-PL" dirty="0" smtClean="0"/>
-              <a:t> -  Uruchamia automatyczną konfiguracje </a:t>
-            </a:r>
-            <a:r>
-              <a:rPr lang="pl-PL" dirty="0" err="1" smtClean="0"/>
-              <a:t>MockMvc</a:t>
-            </a:r>
-            <a:endParaRPr lang="pl-PL" dirty="0"/>
-          </a:p>
-        </p:txBody>
-      </p:sp>
+        </p:spPr>
+      </p:pic>
     </p:spTree>
     <p:extLst>
       <p:ext uri="{BB962C8B-B14F-4D97-AF65-F5344CB8AC3E}">
-        <p14:creationId xmlns:p14="http://schemas.microsoft.com/office/powerpoint/2010/main" val="1819539165"/>
+        <p14:creationId xmlns:p14="http://schemas.microsoft.com/office/powerpoint/2010/main" val="1123431881"/>
       </p:ext>
     </p:extLst>
   </p:cSld>
@@ -7270,13 +7174,8 @@
             </a:r>
             <a:r>
               <a:rPr lang="pl-PL" dirty="0" smtClean="0"/>
-              <a:t>. </a:t>
-            </a:r>
-            <a:r>
-              <a:rPr lang="pl-PL" dirty="0" smtClean="0"/>
-              <a:t>Zawiera logikę aplikacji</a:t>
-            </a:r>
-            <a:endParaRPr lang="pl-PL" dirty="0" smtClean="0"/>
+              <a:t>. Zawiera logikę aplikacji</a:t>
+            </a:r>
           </a:p>
           <a:p>
             <a:pPr marL="285750" indent="-285750">
@@ -7299,7 +7198,6 @@
               <a:rPr lang="pl-PL" dirty="0" smtClean="0"/>
               <a:t>w określonej formie. </a:t>
             </a:r>
-            <a:endParaRPr lang="pl-PL" dirty="0" smtClean="0"/>
           </a:p>
           <a:p>
             <a:pPr marL="285750" indent="-285750">
@@ -7331,7 +7229,6 @@
               <a:rPr lang="pl-PL" dirty="0" smtClean="0"/>
               <a:t>Wzorzec MVC – Umożliwia odseparowanie od siebie elementów aplikacji dzięki czemu staje się ona bardziej elastyczna i łatwiejsza w zarządzaniu. </a:t>
             </a:r>
-            <a:endParaRPr lang="pl-PL" dirty="0" smtClean="0"/>
           </a:p>
           <a:p>
             <a:pPr marL="285750" indent="-285750">

</xml_diff>